<commit_message>
Updated disclaimer with links to github project site
</commit_message>
<xml_diff>
--- a/Rational_Covid_Data.pptx
+++ b/Rational_Covid_Data.pptx
@@ -6,56 +6,58 @@
   </p:sldMasterIdLst>
   <p:sldIdLst>
     <p:sldId id="262" r:id="rId2"/>
-    <p:sldId id="297" r:id="rId3"/>
-    <p:sldId id="292" r:id="rId4"/>
-    <p:sldId id="293" r:id="rId5"/>
-    <p:sldId id="294" r:id="rId6"/>
-    <p:sldId id="296" r:id="rId7"/>
-    <p:sldId id="287" r:id="rId8"/>
-    <p:sldId id="288" r:id="rId9"/>
-    <p:sldId id="289" r:id="rId10"/>
-    <p:sldId id="290" r:id="rId11"/>
-    <p:sldId id="291" r:id="rId12"/>
-    <p:sldId id="298" r:id="rId13"/>
-    <p:sldId id="318" r:id="rId14"/>
-    <p:sldId id="301" r:id="rId15"/>
-    <p:sldId id="302" r:id="rId16"/>
-    <p:sldId id="303" r:id="rId17"/>
-    <p:sldId id="304" r:id="rId18"/>
-    <p:sldId id="305" r:id="rId19"/>
-    <p:sldId id="306" r:id="rId20"/>
-    <p:sldId id="316" r:id="rId21"/>
-    <p:sldId id="310" r:id="rId22"/>
-    <p:sldId id="309" r:id="rId23"/>
-    <p:sldId id="307" r:id="rId24"/>
-    <p:sldId id="313" r:id="rId25"/>
-    <p:sldId id="314" r:id="rId26"/>
-    <p:sldId id="308" r:id="rId27"/>
-    <p:sldId id="322" r:id="rId28"/>
-    <p:sldId id="324" r:id="rId29"/>
-    <p:sldId id="325" r:id="rId30"/>
-    <p:sldId id="326" r:id="rId31"/>
-    <p:sldId id="327" r:id="rId32"/>
-    <p:sldId id="328" r:id="rId33"/>
-    <p:sldId id="321" r:id="rId34"/>
-    <p:sldId id="329" r:id="rId35"/>
-    <p:sldId id="332" r:id="rId36"/>
-    <p:sldId id="331" r:id="rId37"/>
-    <p:sldId id="347" r:id="rId38"/>
-    <p:sldId id="337" r:id="rId39"/>
-    <p:sldId id="335" r:id="rId40"/>
-    <p:sldId id="336" r:id="rId41"/>
-    <p:sldId id="338" r:id="rId42"/>
-    <p:sldId id="340" r:id="rId43"/>
-    <p:sldId id="342" r:id="rId44"/>
-    <p:sldId id="343" r:id="rId45"/>
-    <p:sldId id="345" r:id="rId46"/>
-    <p:sldId id="346" r:id="rId47"/>
-    <p:sldId id="352" r:id="rId48"/>
-    <p:sldId id="348" r:id="rId49"/>
-    <p:sldId id="350" r:id="rId50"/>
-    <p:sldId id="353" r:id="rId51"/>
-    <p:sldId id="349" r:id="rId52"/>
+    <p:sldId id="354" r:id="rId3"/>
+    <p:sldId id="297" r:id="rId4"/>
+    <p:sldId id="292" r:id="rId5"/>
+    <p:sldId id="293" r:id="rId6"/>
+    <p:sldId id="294" r:id="rId7"/>
+    <p:sldId id="296" r:id="rId8"/>
+    <p:sldId id="287" r:id="rId9"/>
+    <p:sldId id="288" r:id="rId10"/>
+    <p:sldId id="289" r:id="rId11"/>
+    <p:sldId id="290" r:id="rId12"/>
+    <p:sldId id="291" r:id="rId13"/>
+    <p:sldId id="298" r:id="rId14"/>
+    <p:sldId id="318" r:id="rId15"/>
+    <p:sldId id="301" r:id="rId16"/>
+    <p:sldId id="302" r:id="rId17"/>
+    <p:sldId id="303" r:id="rId18"/>
+    <p:sldId id="304" r:id="rId19"/>
+    <p:sldId id="305" r:id="rId20"/>
+    <p:sldId id="306" r:id="rId21"/>
+    <p:sldId id="316" r:id="rId22"/>
+    <p:sldId id="310" r:id="rId23"/>
+    <p:sldId id="309" r:id="rId24"/>
+    <p:sldId id="307" r:id="rId25"/>
+    <p:sldId id="313" r:id="rId26"/>
+    <p:sldId id="314" r:id="rId27"/>
+    <p:sldId id="308" r:id="rId28"/>
+    <p:sldId id="322" r:id="rId29"/>
+    <p:sldId id="324" r:id="rId30"/>
+    <p:sldId id="325" r:id="rId31"/>
+    <p:sldId id="326" r:id="rId32"/>
+    <p:sldId id="327" r:id="rId33"/>
+    <p:sldId id="328" r:id="rId34"/>
+    <p:sldId id="321" r:id="rId35"/>
+    <p:sldId id="329" r:id="rId36"/>
+    <p:sldId id="332" r:id="rId37"/>
+    <p:sldId id="331" r:id="rId38"/>
+    <p:sldId id="347" r:id="rId39"/>
+    <p:sldId id="337" r:id="rId40"/>
+    <p:sldId id="335" r:id="rId41"/>
+    <p:sldId id="336" r:id="rId42"/>
+    <p:sldId id="338" r:id="rId43"/>
+    <p:sldId id="340" r:id="rId44"/>
+    <p:sldId id="342" r:id="rId45"/>
+    <p:sldId id="343" r:id="rId46"/>
+    <p:sldId id="345" r:id="rId47"/>
+    <p:sldId id="346" r:id="rId48"/>
+    <p:sldId id="352" r:id="rId49"/>
+    <p:sldId id="348" r:id="rId50"/>
+    <p:sldId id="350" r:id="rId51"/>
+    <p:sldId id="353" r:id="rId52"/>
+    <p:sldId id="349" r:id="rId53"/>
+    <p:sldId id="355" r:id="rId54"/>
   </p:sldIdLst>
   <p:sldSz cx="7315200" cy="4572000"/>
   <p:notesSz cx="6858000" cy="9144000"/>
@@ -160,6 +162,7 @@
         <p14:section name="Default Section" id="{4C13C597-1CDA-4D11-92B2-3AD416F37457}">
           <p14:sldIdLst>
             <p14:sldId id="262"/>
+            <p14:sldId id="354"/>
             <p14:sldId id="297"/>
             <p14:sldId id="292"/>
             <p14:sldId id="293"/>
@@ -214,6 +217,7 @@
             <p14:sldId id="350"/>
             <p14:sldId id="353"/>
             <p14:sldId id="349"/>
+            <p14:sldId id="355"/>
           </p14:sldIdLst>
         </p14:section>
       </p14:sectionLst>
@@ -5566,6 +5570,11 @@
               </a:ln>
               <a:effectLst/>
             </c:spPr>
+            <c:extLst>
+              <c:ext xmlns:c16="http://schemas.microsoft.com/office/drawing/2014/chart" uri="{C3380CC4-5D6E-409C-BE32-E72D297353CC}">
+                <c16:uniqueId val="{00000001-3297-46D7-A03B-AEFF5958E995}"/>
+              </c:ext>
+            </c:extLst>
           </c:dPt>
           <c:dPt>
             <c:idx val="4"/>
@@ -5580,6 +5589,11 @@
               </a:ln>
               <a:effectLst/>
             </c:spPr>
+            <c:extLst>
+              <c:ext xmlns:c16="http://schemas.microsoft.com/office/drawing/2014/chart" uri="{C3380CC4-5D6E-409C-BE32-E72D297353CC}">
+                <c16:uniqueId val="{00000003-3297-46D7-A03B-AEFF5958E995}"/>
+              </c:ext>
+            </c:extLst>
           </c:dPt>
           <c:dPt>
             <c:idx val="5"/>
@@ -5613,6 +5627,11 @@
               </a:ln>
               <a:effectLst/>
             </c:spPr>
+            <c:extLst>
+              <c:ext xmlns:c16="http://schemas.microsoft.com/office/drawing/2014/chart" uri="{C3380CC4-5D6E-409C-BE32-E72D297353CC}">
+                <c16:uniqueId val="{00000007-3297-46D7-A03B-AEFF5958E995}"/>
+              </c:ext>
+            </c:extLst>
           </c:dPt>
           <c:dPt>
             <c:idx val="11"/>
@@ -5627,6 +5646,11 @@
               </a:ln>
               <a:effectLst/>
             </c:spPr>
+            <c:extLst>
+              <c:ext xmlns:c16="http://schemas.microsoft.com/office/drawing/2014/chart" uri="{C3380CC4-5D6E-409C-BE32-E72D297353CC}">
+                <c16:uniqueId val="{00000009-3297-46D7-A03B-AEFF5958E995}"/>
+              </c:ext>
+            </c:extLst>
           </c:dPt>
           <c:dPt>
             <c:idx val="14"/>
@@ -5682,6 +5706,11 @@
               <c:showSerName val="0"/>
               <c:showPercent val="0"/>
               <c:showBubbleSize val="0"/>
+              <c:extLst>
+                <c:ext xmlns:c16="http://schemas.microsoft.com/office/drawing/2014/chart" uri="{C3380CC4-5D6E-409C-BE32-E72D297353CC}">
+                  <c16:uniqueId val="{00000001-3297-46D7-A03B-AEFF5958E995}"/>
+                </c:ext>
+              </c:extLst>
             </c:dLbl>
             <c:dLbl>
               <c:idx val="4"/>
@@ -5717,6 +5746,11 @@
               <c:showSerName val="0"/>
               <c:showPercent val="0"/>
               <c:showBubbleSize val="0"/>
+              <c:extLst>
+                <c:ext xmlns:c16="http://schemas.microsoft.com/office/drawing/2014/chart" uri="{C3380CC4-5D6E-409C-BE32-E72D297353CC}">
+                  <c16:uniqueId val="{00000003-3297-46D7-A03B-AEFF5958E995}"/>
+                </c:ext>
+              </c:extLst>
             </c:dLbl>
             <c:dLbl>
               <c:idx val="7"/>
@@ -5752,6 +5786,11 @@
               <c:showSerName val="0"/>
               <c:showPercent val="0"/>
               <c:showBubbleSize val="0"/>
+              <c:extLst>
+                <c:ext xmlns:c16="http://schemas.microsoft.com/office/drawing/2014/chart" uri="{C3380CC4-5D6E-409C-BE32-E72D297353CC}">
+                  <c16:uniqueId val="{00000007-3297-46D7-A03B-AEFF5958E995}"/>
+                </c:ext>
+              </c:extLst>
             </c:dLbl>
             <c:dLbl>
               <c:idx val="11"/>
@@ -5787,6 +5826,11 @@
               <c:showSerName val="0"/>
               <c:showPercent val="0"/>
               <c:showBubbleSize val="0"/>
+              <c:extLst>
+                <c:ext xmlns:c16="http://schemas.microsoft.com/office/drawing/2014/chart" uri="{C3380CC4-5D6E-409C-BE32-E72D297353CC}">
+                  <c16:uniqueId val="{00000009-3297-46D7-A03B-AEFF5958E995}"/>
+                </c:ext>
+              </c:extLst>
             </c:dLbl>
             <c:dLbl>
               <c:idx val="14"/>
@@ -14888,29 +14932,6 @@
       </p:grpSpPr>
       <p:sp>
         <p:nvSpPr>
-          <p:cNvPr id="2" name="Date Placeholder 1"/>
-          <p:cNvSpPr>
-            <a:spLocks noGrp="1"/>
-          </p:cNvSpPr>
-          <p:nvPr>
-            <p:ph type="dt" sz="half" idx="10"/>
-          </p:nvPr>
-        </p:nvSpPr>
-        <p:spPr/>
-        <p:txBody>
-          <a:bodyPr/>
-          <a:lstStyle/>
-          <a:p>
-            <a:fld id="{040A9F85-DB90-4103-AF81-7F368867726C}" type="datetimeFigureOut">
-              <a:rPr lang="en-US" smtClean="0"/>
-              <a:t>9/17/2021</a:t>
-            </a:fld>
-            <a:endParaRPr lang="en-US"/>
-          </a:p>
-        </p:txBody>
-      </p:sp>
-      <p:sp>
-        <p:nvSpPr>
           <p:cNvPr id="3" name="Footer Placeholder 2"/>
           <p:cNvSpPr>
             <a:spLocks noGrp="1"/>
@@ -14919,35 +14940,44 @@
             <p:ph type="ftr" sz="quarter" idx="11"/>
           </p:nvPr>
         </p:nvSpPr>
-        <p:spPr/>
+        <p:spPr>
+          <a:xfrm>
+            <a:off x="4905893" y="4385060"/>
+            <a:ext cx="2468880" cy="243417"/>
+          </a:xfrm>
+        </p:spPr>
         <p:txBody>
           <a:bodyPr/>
-          <a:lstStyle/>
-          <a:p>
-            <a:endParaRPr lang="en-US"/>
-          </a:p>
-        </p:txBody>
-      </p:sp>
-      <p:sp>
-        <p:nvSpPr>
-          <p:cNvPr id="4" name="Slide Number Placeholder 3"/>
-          <p:cNvSpPr>
-            <a:spLocks noGrp="1"/>
-          </p:cNvSpPr>
-          <p:nvPr>
-            <p:ph type="sldNum" sz="quarter" idx="12"/>
-          </p:nvPr>
-        </p:nvSpPr>
-        <p:spPr/>
-        <p:txBody>
-          <a:bodyPr/>
-          <a:lstStyle/>
-          <a:p>
-            <a:fld id="{6EA4AE78-90E6-496F-A71C-30CA1F02D82C}" type="slidenum">
-              <a:rPr lang="en-US" smtClean="0"/>
-              <a:t>‹#›</a:t>
-            </a:fld>
-            <a:endParaRPr lang="en-US"/>
+          <a:lstStyle>
+            <a:lvl1pPr>
+              <a:defRPr>
+                <a:solidFill>
+                  <a:schemeClr val="bg1">
+                    <a:lumMod val="65000"/>
+                    <a:lumOff val="35000"/>
+                  </a:schemeClr>
+                </a:solidFill>
+              </a:defRPr>
+            </a:lvl1pPr>
+          </a:lstStyle>
+          <a:p>
+            <a:r>
+              <a:rPr lang="en-US" sz="800" i="1" dirty="0">
+                <a:hlinkClick r:id="rId2">
+                  <a:extLst>
+                    <a:ext uri="{A12FA001-AC4F-418D-AE19-62706E023703}">
+                      <ahyp:hlinkClr xmlns:ahyp="http://schemas.microsoft.com/office/drawing/2018/hyperlinkcolor" val="tx"/>
+                    </a:ext>
+                  </a:extLst>
+                </a:hlinkClick>
+              </a:rPr>
+              <a:t>https://github.com/TruthData/CovidDeaths</a:t>
+            </a:r>
+            <a:r>
+              <a:rPr lang="en-US" sz="800" i="1" dirty="0"/>
+              <a:t> v 1.0</a:t>
+            </a:r>
+            <a:endParaRPr lang="en-US" dirty="0"/>
           </a:p>
         </p:txBody>
       </p:sp>
@@ -16082,7 +16112,7 @@
         <p:spPr>
           <a:xfrm>
             <a:off x="90686" y="101416"/>
-            <a:ext cx="7224514" cy="4124206"/>
+            <a:ext cx="7224514" cy="4555093"/>
           </a:xfrm>
           <a:prstGeom prst="rect">
             <a:avLst/>
@@ -16143,11 +16173,75 @@
             <a:br>
               <a:rPr lang="en-US" sz="4800" i="1" dirty="0"/>
             </a:br>
-            <a:r>
-              <a:rPr lang="en-US" sz="1400" i="1" dirty="0"/>
-              <a:t>Raw Data &amp; Analysis available: </a:t>
-            </a:r>
             <a:endParaRPr lang="en-US" sz="4800" i="1" dirty="0"/>
+          </a:p>
+        </p:txBody>
+      </p:sp>
+      <p:sp>
+        <p:nvSpPr>
+          <p:cNvPr id="4" name="TextBox 3">
+            <a:extLst>
+              <a:ext uri="{FF2B5EF4-FFF2-40B4-BE49-F238E27FC236}">
+                <a16:creationId xmlns:a16="http://schemas.microsoft.com/office/drawing/2014/main" id="{5A1087A7-8DE9-4652-B768-1644573DA259}"/>
+              </a:ext>
+            </a:extLst>
+          </p:cNvPr>
+          <p:cNvSpPr txBox="1"/>
+          <p:nvPr/>
+        </p:nvSpPr>
+        <p:spPr>
+          <a:xfrm>
+            <a:off x="4493942" y="4318084"/>
+            <a:ext cx="2916044" cy="253916"/>
+          </a:xfrm>
+          <a:prstGeom prst="rect">
+            <a:avLst/>
+          </a:prstGeom>
+          <a:noFill/>
+        </p:spPr>
+        <p:txBody>
+          <a:bodyPr wrap="square">
+            <a:spAutoFit/>
+          </a:bodyPr>
+          <a:lstStyle/>
+          <a:p>
+            <a:r>
+              <a:rPr lang="en-US" sz="1050" i="1" dirty="0">
+                <a:solidFill>
+                  <a:schemeClr val="bg1">
+                    <a:lumMod val="65000"/>
+                    <a:lumOff val="35000"/>
+                  </a:schemeClr>
+                </a:solidFill>
+                <a:hlinkClick r:id="rId2">
+                  <a:extLst>
+                    <a:ext uri="{A12FA001-AC4F-418D-AE19-62706E023703}">
+                      <ahyp:hlinkClr xmlns:ahyp="http://schemas.microsoft.com/office/drawing/2018/hyperlinkcolor" val="tx"/>
+                    </a:ext>
+                  </a:extLst>
+                </a:hlinkClick>
+              </a:rPr>
+              <a:t>https://github.com/TruthData/CovidDeaths</a:t>
+            </a:r>
+            <a:r>
+              <a:rPr lang="en-US" sz="1050" i="1" dirty="0">
+                <a:solidFill>
+                  <a:schemeClr val="bg1">
+                    <a:lumMod val="65000"/>
+                    <a:lumOff val="35000"/>
+                  </a:schemeClr>
+                </a:solidFill>
+              </a:rPr>
+              <a:t>  v 1.0</a:t>
+            </a:r>
+            <a:endParaRPr lang="en-US" sz="1050" dirty="0">
+              <a:solidFill>
+                <a:schemeClr val="bg1">
+                  <a:lumMod val="65000"/>
+                  <a:lumOff val="35000"/>
+                </a:schemeClr>
+              </a:solidFill>
+            </a:endParaRPr>
           </a:p>
         </p:txBody>
       </p:sp>
@@ -16214,49 +16308,70 @@
           <a:p>
             <a:pPr algn="ctr"/>
             <a:r>
-              <a:rPr lang="en-US" sz="4000" dirty="0"/>
-              <a:t>If you dig… you can pull monthly COVID Death data from the CDC </a:t>
+              <a:rPr lang="en-US" sz="16600" dirty="0"/>
+              <a:t>666,440</a:t>
             </a:r>
             <a:br>
-              <a:rPr lang="en-US" sz="4000" dirty="0"/>
+              <a:rPr lang="en-US" sz="16600" dirty="0"/>
             </a:br>
             <a:r>
-              <a:rPr lang="en-US" sz="1400" dirty="0">
+              <a:rPr lang="en-US" sz="3600" dirty="0"/>
+              <a:t> “COVID Deaths</a:t>
+            </a:r>
+            <a:r>
+              <a:rPr lang="en-US" sz="3600" dirty="0">
+                <a:solidFill>
+                  <a:srgbClr val="FF0000"/>
+                </a:solidFill>
+              </a:rPr>
+              <a:t>*</a:t>
+            </a:r>
+            <a:r>
+              <a:rPr lang="en-US" sz="3600" dirty="0"/>
+              <a:t>” in the USA</a:t>
+            </a:r>
+            <a:br>
+              <a:rPr lang="en-US" sz="3600" dirty="0"/>
+            </a:br>
+            <a:r>
+              <a:rPr lang="en-US" sz="4000" u="sng" dirty="0"/>
+              <a:t>since the start of the pandemic</a:t>
+            </a:r>
+            <a:br>
+              <a:rPr lang="en-US" sz="4000" u="sng" dirty="0"/>
+            </a:br>
+            <a:r>
+              <a:rPr lang="en-US" dirty="0"/>
+              <a:t>[as of 9/17/2021]</a:t>
+            </a:r>
+            <a:br>
+              <a:rPr lang="en-US" dirty="0"/>
+            </a:br>
+            <a:r>
+              <a:rPr lang="en-US" sz="1800" b="0" i="0" u="none" strike="noStrike" dirty="0">
+                <a:solidFill>
+                  <a:srgbClr val="000000"/>
+                </a:solidFill>
+                <a:effectLst/>
+                <a:latin typeface="Calibri" panose="020F0502020204030204" pitchFamily="34" charset="0"/>
                 <a:hlinkClick r:id="rId2"/>
               </a:rPr>
-              <a:t>https://data.cdc.gov/NCHS/Monthly-Provisional-Counts-of-Deaths-by-Select-Cau/9dzk-mvmi</a:t>
-            </a:r>
-            <a:endParaRPr lang="en-US" sz="1400" dirty="0"/>
-          </a:p>
-          <a:p>
-            <a:pPr algn="ctr"/>
-            <a:r>
-              <a:rPr lang="en-US" sz="4000" dirty="0"/>
-              <a:t>and extract only the most recent 12-month period…… </a:t>
-            </a:r>
-            <a:br>
-              <a:rPr lang="en-US" sz="4000" dirty="0"/>
-            </a:br>
-            <a:r>
-              <a:rPr lang="en-US" sz="4000" dirty="0"/>
-              <a:t>and you get </a:t>
-            </a:r>
-            <a:r>
-              <a:rPr lang="en-US" sz="4000" u="sng" dirty="0"/>
-              <a:t>ANNUAL</a:t>
-            </a:r>
-            <a:r>
-              <a:rPr lang="en-US" sz="4000" dirty="0"/>
-              <a:t>-IZED data.</a:t>
-            </a:r>
-            <a:endParaRPr lang="en-US" sz="16600" dirty="0"/>
+              <a:t>https://covid.cdc.gov/covid-data-tracker/#datatracker-home</a:t>
+            </a:r>
+            <a:endParaRPr lang="en-US" sz="1800" b="0" i="0" u="none" strike="noStrike" dirty="0">
+              <a:solidFill>
+                <a:srgbClr val="000000"/>
+              </a:solidFill>
+              <a:effectLst/>
+              <a:latin typeface="Calibri" panose="020F0502020204030204" pitchFamily="34" charset="0"/>
+            </a:endParaRPr>
           </a:p>
         </p:txBody>
       </p:sp>
     </p:spTree>
     <p:extLst>
       <p:ext uri="{BB962C8B-B14F-4D97-AF65-F5344CB8AC3E}">
-        <p14:creationId xmlns:p14="http://schemas.microsoft.com/office/powerpoint/2010/main" val="1212764723"/>
+        <p14:creationId xmlns:p14="http://schemas.microsoft.com/office/powerpoint/2010/main" val="1517252660"/>
       </p:ext>
     </p:extLst>
   </p:cSld>
@@ -16310,55 +16425,55 @@
         </p:spPr>
         <p:txBody>
           <a:bodyPr wrap="square" anchor="ctr">
-            <a:normAutofit fontScale="92500"/>
+            <a:normAutofit/>
           </a:bodyPr>
           <a:lstStyle/>
           <a:p>
             <a:pPr algn="ctr"/>
             <a:r>
-              <a:rPr lang="en-US" sz="16600" dirty="0"/>
-              <a:t> 406,557</a:t>
+              <a:rPr lang="en-US" sz="4000" dirty="0"/>
+              <a:t>If you dig… you can pull monthly COVID Death data from the CDC </a:t>
             </a:r>
             <a:br>
-              <a:rPr lang="en-US" sz="16600" dirty="0"/>
+              <a:rPr lang="en-US" sz="4000" dirty="0"/>
             </a:br>
             <a:r>
-              <a:rPr lang="en-US" sz="3600" dirty="0"/>
-              <a:t> “COVID Deaths”</a:t>
+              <a:rPr lang="en-US" sz="1400" dirty="0">
+                <a:hlinkClick r:id="rId2"/>
+              </a:rPr>
+              <a:t>https://data.cdc.gov/NCHS/Monthly-Provisional-Counts-of-Deaths-by-Select-Cau/9dzk-mvmi</a:t>
+            </a:r>
+            <a:endParaRPr lang="en-US" sz="1400" dirty="0"/>
+          </a:p>
+          <a:p>
+            <a:pPr algn="ctr"/>
+            <a:r>
+              <a:rPr lang="en-US" sz="4000" dirty="0"/>
+              <a:t>and extract only the most recent 12-month period…… </a:t>
             </a:r>
             <a:br>
-              <a:rPr lang="en-US" sz="3600" dirty="0"/>
+              <a:rPr lang="en-US" sz="4000" dirty="0"/>
             </a:br>
             <a:r>
-              <a:rPr lang="en-US" sz="5200" dirty="0"/>
-              <a:t>ANNUALIZED</a:t>
-            </a:r>
-            <a:br>
-              <a:rPr lang="en-US" sz="5200" dirty="0"/>
-            </a:br>
-            <a:r>
-              <a:rPr lang="en-US" sz="4000" u="sng" dirty="0" err="1"/>
-              <a:t>i.e</a:t>
+              <a:rPr lang="en-US" sz="4000" dirty="0"/>
+              <a:t>and you get </a:t>
             </a:r>
             <a:r>
               <a:rPr lang="en-US" sz="4000" u="sng" dirty="0"/>
-              <a:t> deaths in the last 12 months</a:t>
-            </a:r>
-            <a:br>
-              <a:rPr lang="en-US" sz="4000" u="sng" dirty="0"/>
-            </a:br>
-            <a:r>
-              <a:rPr lang="en-US" dirty="0"/>
-              <a:t>[September 2020 – August 2021]</a:t>
-            </a:r>
-            <a:endParaRPr lang="en-US" sz="7200" dirty="0"/>
+              <a:t>ANNUAL</a:t>
+            </a:r>
+            <a:r>
+              <a:rPr lang="en-US" sz="4000" dirty="0"/>
+              <a:t>-IZED data.</a:t>
+            </a:r>
+            <a:endParaRPr lang="en-US" sz="16600" dirty="0"/>
           </a:p>
         </p:txBody>
       </p:sp>
     </p:spTree>
     <p:extLst>
       <p:ext uri="{BB962C8B-B14F-4D97-AF65-F5344CB8AC3E}">
-        <p14:creationId xmlns:p14="http://schemas.microsoft.com/office/powerpoint/2010/main" val="1044286888"/>
+        <p14:creationId xmlns:p14="http://schemas.microsoft.com/office/powerpoint/2010/main" val="1212764723"/>
       </p:ext>
     </p:extLst>
   </p:cSld>
@@ -16412,6 +16527,108 @@
         </p:spPr>
         <p:txBody>
           <a:bodyPr wrap="square" anchor="ctr">
+            <a:normAutofit fontScale="92500"/>
+          </a:bodyPr>
+          <a:lstStyle/>
+          <a:p>
+            <a:pPr algn="ctr"/>
+            <a:r>
+              <a:rPr lang="en-US" sz="16600" dirty="0"/>
+              <a:t> 406,557</a:t>
+            </a:r>
+            <a:br>
+              <a:rPr lang="en-US" sz="16600" dirty="0"/>
+            </a:br>
+            <a:r>
+              <a:rPr lang="en-US" sz="3600" dirty="0"/>
+              <a:t> “COVID Deaths”</a:t>
+            </a:r>
+            <a:br>
+              <a:rPr lang="en-US" sz="3600" dirty="0"/>
+            </a:br>
+            <a:r>
+              <a:rPr lang="en-US" sz="5200" dirty="0"/>
+              <a:t>ANNUALIZED</a:t>
+            </a:r>
+            <a:br>
+              <a:rPr lang="en-US" sz="5200" dirty="0"/>
+            </a:br>
+            <a:r>
+              <a:rPr lang="en-US" sz="4000" u="sng" dirty="0" err="1"/>
+              <a:t>i.e</a:t>
+            </a:r>
+            <a:r>
+              <a:rPr lang="en-US" sz="4000" u="sng" dirty="0"/>
+              <a:t> deaths in the last 12 months</a:t>
+            </a:r>
+            <a:br>
+              <a:rPr lang="en-US" sz="4000" u="sng" dirty="0"/>
+            </a:br>
+            <a:r>
+              <a:rPr lang="en-US" dirty="0"/>
+              <a:t>[September 2020 – August 2021]</a:t>
+            </a:r>
+            <a:endParaRPr lang="en-US" sz="7200" dirty="0"/>
+          </a:p>
+        </p:txBody>
+      </p:sp>
+    </p:spTree>
+    <p:extLst>
+      <p:ext uri="{BB962C8B-B14F-4D97-AF65-F5344CB8AC3E}">
+        <p14:creationId xmlns:p14="http://schemas.microsoft.com/office/powerpoint/2010/main" val="1044286888"/>
+      </p:ext>
+    </p:extLst>
+  </p:cSld>
+  <p:clrMapOvr>
+    <a:masterClrMapping/>
+  </p:clrMapOvr>
+  <p:transition spd="slow" advClick="0" advTm="5000">
+    <p:fade thruBlk="1"/>
+  </p:transition>
+</p:sld>
+</file>
+
+<file path=ppt/slides/slide13.xml><?xml version="1.0" encoding="utf-8"?>
+<p:sld xmlns:a="http://schemas.openxmlformats.org/drawingml/2006/main" xmlns:r="http://schemas.openxmlformats.org/officeDocument/2006/relationships" xmlns:p="http://schemas.openxmlformats.org/presentationml/2006/main">
+  <p:cSld>
+    <p:spTree>
+      <p:nvGrpSpPr>
+        <p:cNvPr id="1" name=""/>
+        <p:cNvGrpSpPr/>
+        <p:nvPr/>
+      </p:nvGrpSpPr>
+      <p:grpSpPr>
+        <a:xfrm>
+          <a:off x="0" y="0"/>
+          <a:ext cx="0" cy="0"/>
+          <a:chOff x="0" y="0"/>
+          <a:chExt cx="0" cy="0"/>
+        </a:xfrm>
+      </p:grpSpPr>
+      <p:sp>
+        <p:nvSpPr>
+          <p:cNvPr id="3" name="TextBox 2">
+            <a:extLst>
+              <a:ext uri="{FF2B5EF4-FFF2-40B4-BE49-F238E27FC236}">
+                <a16:creationId xmlns:a16="http://schemas.microsoft.com/office/drawing/2014/main" id="{E9BCD9FD-98E7-4688-AABB-18382A5D765E}"/>
+              </a:ext>
+            </a:extLst>
+          </p:cNvPr>
+          <p:cNvSpPr txBox="1"/>
+          <p:nvPr/>
+        </p:nvSpPr>
+        <p:spPr>
+          <a:xfrm>
+            <a:off x="0" y="0"/>
+            <a:ext cx="7315199" cy="4572000"/>
+          </a:xfrm>
+          <a:prstGeom prst="rect">
+            <a:avLst/>
+          </a:prstGeom>
+          <a:noFill/>
+        </p:spPr>
+        <p:txBody>
+          <a:bodyPr wrap="square" anchor="ctr">
             <a:normAutofit/>
           </a:bodyPr>
           <a:lstStyle/>
@@ -16466,7 +16683,7 @@
 </p:sld>
 </file>
 
-<file path=ppt/slides/slide13.xml><?xml version="1.0" encoding="utf-8"?>
+<file path=ppt/slides/slide14.xml><?xml version="1.0" encoding="utf-8"?>
 <p:sld xmlns:a="http://schemas.openxmlformats.org/drawingml/2006/main" xmlns:r="http://schemas.openxmlformats.org/officeDocument/2006/relationships" xmlns:p="http://schemas.openxmlformats.org/presentationml/2006/main">
   <p:cSld>
     <p:spTree>
@@ -16529,7 +16746,7 @@
 </p:sld>
 </file>
 
-<file path=ppt/slides/slide14.xml><?xml version="1.0" encoding="utf-8"?>
+<file path=ppt/slides/slide15.xml><?xml version="1.0" encoding="utf-8"?>
 <p:sld xmlns:a="http://schemas.openxmlformats.org/drawingml/2006/main" xmlns:r="http://schemas.openxmlformats.org/officeDocument/2006/relationships" xmlns:p="http://schemas.openxmlformats.org/presentationml/2006/main">
   <p:cSld>
     <p:spTree>
@@ -16613,107 +16830,6 @@
     <p:extLst>
       <p:ext uri="{BB962C8B-B14F-4D97-AF65-F5344CB8AC3E}">
         <p14:creationId xmlns:p14="http://schemas.microsoft.com/office/powerpoint/2010/main" val="1774223924"/>
-      </p:ext>
-    </p:extLst>
-  </p:cSld>
-  <p:clrMapOvr>
-    <a:masterClrMapping/>
-  </p:clrMapOvr>
-  <p:transition spd="slow" advClick="0" advTm="5000">
-    <p:fade thruBlk="1"/>
-  </p:transition>
-</p:sld>
-</file>
-
-<file path=ppt/slides/slide15.xml><?xml version="1.0" encoding="utf-8"?>
-<p:sld xmlns:a="http://schemas.openxmlformats.org/drawingml/2006/main" xmlns:r="http://schemas.openxmlformats.org/officeDocument/2006/relationships" xmlns:p="http://schemas.openxmlformats.org/presentationml/2006/main">
-  <p:cSld>
-    <p:spTree>
-      <p:nvGrpSpPr>
-        <p:cNvPr id="1" name=""/>
-        <p:cNvGrpSpPr/>
-        <p:nvPr/>
-      </p:nvGrpSpPr>
-      <p:grpSpPr>
-        <a:xfrm>
-          <a:off x="0" y="0"/>
-          <a:ext cx="0" cy="0"/>
-          <a:chOff x="0" y="0"/>
-          <a:chExt cx="0" cy="0"/>
-        </a:xfrm>
-      </p:grpSpPr>
-      <p:sp>
-        <p:nvSpPr>
-          <p:cNvPr id="3" name="TextBox 2">
-            <a:extLst>
-              <a:ext uri="{FF2B5EF4-FFF2-40B4-BE49-F238E27FC236}">
-                <a16:creationId xmlns:a16="http://schemas.microsoft.com/office/drawing/2014/main" id="{E9BCD9FD-98E7-4688-AABB-18382A5D765E}"/>
-              </a:ext>
-            </a:extLst>
-          </p:cNvPr>
-          <p:cNvSpPr txBox="1"/>
-          <p:nvPr/>
-        </p:nvSpPr>
-        <p:spPr>
-          <a:xfrm>
-            <a:off x="-12700" y="-25400"/>
-            <a:ext cx="7315199" cy="4572000"/>
-          </a:xfrm>
-          <a:prstGeom prst="rect">
-            <a:avLst/>
-          </a:prstGeom>
-          <a:noFill/>
-        </p:spPr>
-        <p:txBody>
-          <a:bodyPr wrap="square" anchor="ctr">
-            <a:normAutofit lnSpcReduction="10000"/>
-          </a:bodyPr>
-          <a:lstStyle/>
-          <a:p>
-            <a:pPr algn="ctr"/>
-            <a:r>
-              <a:rPr lang="en-US" sz="4800" dirty="0"/>
-              <a:t>Although </a:t>
-            </a:r>
-            <a:br>
-              <a:rPr lang="en-US" sz="4800" dirty="0"/>
-            </a:br>
-            <a:r>
-              <a:rPr lang="en-US" sz="4800" i="1" u="sng" dirty="0"/>
-              <a:t>The Trusted News Initiative</a:t>
-            </a:r>
-            <a:br>
-              <a:rPr lang="en-US" sz="4800" i="1" u="sng" dirty="0"/>
-            </a:br>
-            <a:r>
-              <a:rPr lang="en-US" sz="2400" dirty="0"/>
-              <a:t>(a formal alliance of Big Media and Big Tech)</a:t>
-            </a:r>
-            <a:endParaRPr lang="en-US" sz="4800" dirty="0"/>
-          </a:p>
-          <a:p>
-            <a:pPr algn="ctr"/>
-            <a:r>
-              <a:rPr lang="en-US" sz="4800" dirty="0"/>
-              <a:t>has long battled to keep the world in the dark about effective COVID treatments..</a:t>
-            </a:r>
-            <a:br>
-              <a:rPr lang="en-US" sz="4800" dirty="0"/>
-            </a:br>
-            <a:r>
-              <a:rPr lang="en-US" sz="1600" dirty="0">
-                <a:hlinkClick r:id="rId2"/>
-              </a:rPr>
-              <a:t>https://theexpose.uk/2021/08/29/the-trusted-news-initiative-a-bbc-led-organisation-censoring-public-health-experts-who-oppose-the-official-narrative-on-covid-19/</a:t>
-            </a:r>
-            <a:endParaRPr lang="en-US" sz="1600" dirty="0"/>
-          </a:p>
-        </p:txBody>
-      </p:sp>
-    </p:spTree>
-    <p:extLst>
-      <p:ext uri="{BB962C8B-B14F-4D97-AF65-F5344CB8AC3E}">
-        <p14:creationId xmlns:p14="http://schemas.microsoft.com/office/powerpoint/2010/main" val="526631042"/>
       </p:ext>
     </p:extLst>
   </p:cSld>
@@ -16767,127 +16883,54 @@
         </p:spPr>
         <p:txBody>
           <a:bodyPr wrap="square" anchor="ctr">
-            <a:normAutofit fontScale="92500" lnSpcReduction="10000"/>
+            <a:normAutofit lnSpcReduction="10000"/>
           </a:bodyPr>
           <a:lstStyle/>
           <a:p>
             <a:pPr algn="ctr"/>
             <a:r>
-              <a:rPr lang="en-US" sz="3200" dirty="0"/>
-              <a:t>The hundreds of studies and population wide impacts of COVID treatment protocols cannot be ignored.</a:t>
+              <a:rPr lang="en-US" sz="4800" dirty="0"/>
+              <a:t>Although </a:t>
             </a:r>
             <a:br>
-              <a:rPr lang="en-US" sz="3200" dirty="0"/>
+              <a:rPr lang="en-US" sz="4800" dirty="0"/>
             </a:br>
             <a:r>
-              <a:rPr lang="en-US" sz="1200" dirty="0">
+              <a:rPr lang="en-US" sz="4800" i="1" u="sng" dirty="0"/>
+              <a:t>The Trusted News Initiative</a:t>
+            </a:r>
+            <a:br>
+              <a:rPr lang="en-US" sz="4800" i="1" u="sng" dirty="0"/>
+            </a:br>
+            <a:r>
+              <a:rPr lang="en-US" sz="2400" dirty="0"/>
+              <a:t>(a formal alliance of Big Media and Big Tech)</a:t>
+            </a:r>
+            <a:endParaRPr lang="en-US" sz="4800" dirty="0"/>
+          </a:p>
+          <a:p>
+            <a:pPr algn="ctr"/>
+            <a:r>
+              <a:rPr lang="en-US" sz="4800" dirty="0"/>
+              <a:t>has long battled to keep the world in the dark about effective COVID treatments..</a:t>
+            </a:r>
+            <a:br>
+              <a:rPr lang="en-US" sz="4800" dirty="0"/>
+            </a:br>
+            <a:r>
+              <a:rPr lang="en-US" sz="1600" dirty="0">
                 <a:hlinkClick r:id="rId2"/>
               </a:rPr>
-              <a:t>https://covid19criticalcare.com/ivermectin-in-covid-19/epidemiologic-analyses-on-covid19-and-ivermectin/</a:t>
+              <a:t>https://theexpose.uk/2021/08/29/the-trusted-news-initiative-a-bbc-led-organisation-censoring-public-health-experts-who-oppose-the-official-narrative-on-covid-19/</a:t>
             </a:r>
             <a:endParaRPr lang="en-US" sz="1600" dirty="0"/>
-          </a:p>
-          <a:p>
-            <a:pPr algn="ctr"/>
-            <a:r>
-              <a:rPr lang="en-US" sz="1600" dirty="0">
-                <a:hlinkClick r:id="rId3"/>
-              </a:rPr>
-              <a:t>https://c19protocols.com/</a:t>
-            </a:r>
-            <a:endParaRPr lang="en-US" sz="1600" dirty="0"/>
-          </a:p>
-          <a:p>
-            <a:pPr algn="ctr"/>
-            <a:endParaRPr lang="en-US" sz="1600" dirty="0"/>
-          </a:p>
-          <a:p>
-            <a:pPr algn="ctr"/>
-            <a:r>
-              <a:rPr lang="en-US" sz="2400" dirty="0"/>
-              <a:t>Individual drugs demonstrate in large trails a </a:t>
-            </a:r>
-            <a:r>
-              <a:rPr lang="en-US" sz="2400" u="sng" dirty="0"/>
-              <a:t>75%</a:t>
-            </a:r>
-            <a:r>
-              <a:rPr lang="en-US" sz="2400" dirty="0"/>
-              <a:t> reduction in mortality</a:t>
-            </a:r>
-          </a:p>
-          <a:p>
-            <a:pPr algn="ctr"/>
-            <a:r>
-              <a:rPr lang="en-US" sz="1400" dirty="0">
-                <a:hlinkClick r:id="rId4"/>
-              </a:rPr>
-              <a:t>https://c19early.com/</a:t>
-            </a:r>
-            <a:br>
-              <a:rPr lang="en-US" sz="1400" dirty="0"/>
-            </a:br>
-            <a:br>
-              <a:rPr lang="en-US" sz="2800" dirty="0"/>
-            </a:br>
-            <a:r>
-              <a:rPr lang="en-US" sz="2400" dirty="0"/>
-              <a:t>Multi-drug approaches reduce mortality by </a:t>
-            </a:r>
-            <a:r>
-              <a:rPr lang="en-US" sz="2400" u="sng" dirty="0"/>
-              <a:t>85%</a:t>
-            </a:r>
-            <a:r>
-              <a:rPr lang="en-US" sz="2400" dirty="0"/>
-              <a:t> in high-risk patients.</a:t>
-            </a:r>
-            <a:br>
-              <a:rPr lang="en-US" sz="2400" dirty="0"/>
-            </a:br>
-            <a:r>
-              <a:rPr lang="en-US" sz="1200" dirty="0">
-                <a:hlinkClick r:id="rId5"/>
-              </a:rPr>
-              <a:t>https://www.youtube.com/watch?v=QAHi3lX3oGM</a:t>
-            </a:r>
-            <a:endParaRPr lang="en-US" sz="1200" dirty="0"/>
-          </a:p>
-          <a:p>
-            <a:pPr algn="ctr"/>
-            <a:endParaRPr lang="en-US" sz="1200" dirty="0"/>
-          </a:p>
-          <a:p>
-            <a:pPr algn="ctr"/>
-            <a:r>
-              <a:rPr lang="en-US" sz="2800" dirty="0"/>
-              <a:t>Some Doctors claim a </a:t>
-            </a:r>
-            <a:r>
-              <a:rPr lang="en-US" sz="2800" u="sng" dirty="0"/>
-              <a:t>99%+</a:t>
-            </a:r>
-            <a:r>
-              <a:rPr lang="en-US" sz="2800" dirty="0"/>
-              <a:t> effectivity rate</a:t>
-            </a:r>
-            <a:br>
-              <a:rPr lang="en-US" sz="2800" dirty="0"/>
-            </a:br>
-            <a:r>
-              <a:rPr lang="en-US" sz="1100" dirty="0">
-                <a:hlinkClick r:id="rId6"/>
-              </a:rPr>
-              <a:t>https://www.covid-19forum.org/index.php?topic=18.0</a:t>
-            </a:r>
-            <a:endParaRPr lang="en-US" sz="1100" dirty="0"/>
           </a:p>
         </p:txBody>
       </p:sp>
     </p:spTree>
     <p:extLst>
       <p:ext uri="{BB962C8B-B14F-4D97-AF65-F5344CB8AC3E}">
-        <p14:creationId xmlns:p14="http://schemas.microsoft.com/office/powerpoint/2010/main" val="782329607"/>
+        <p14:creationId xmlns:p14="http://schemas.microsoft.com/office/powerpoint/2010/main" val="526631042"/>
       </p:ext>
     </p:extLst>
   </p:cSld>
@@ -16931,6 +16974,180 @@
         </p:nvSpPr>
         <p:spPr>
           <a:xfrm>
+            <a:off x="-12700" y="-25400"/>
+            <a:ext cx="7315199" cy="4572000"/>
+          </a:xfrm>
+          <a:prstGeom prst="rect">
+            <a:avLst/>
+          </a:prstGeom>
+          <a:noFill/>
+        </p:spPr>
+        <p:txBody>
+          <a:bodyPr wrap="square" anchor="ctr">
+            <a:normAutofit fontScale="92500" lnSpcReduction="10000"/>
+          </a:bodyPr>
+          <a:lstStyle/>
+          <a:p>
+            <a:pPr algn="ctr"/>
+            <a:r>
+              <a:rPr lang="en-US" sz="3200" dirty="0"/>
+              <a:t>The hundreds of studies and population wide impacts of COVID treatment protocols cannot be ignored.</a:t>
+            </a:r>
+            <a:br>
+              <a:rPr lang="en-US" sz="3200" dirty="0"/>
+            </a:br>
+            <a:r>
+              <a:rPr lang="en-US" sz="1200" dirty="0">
+                <a:hlinkClick r:id="rId2"/>
+              </a:rPr>
+              <a:t>https://covid19criticalcare.com/ivermectin-in-covid-19/epidemiologic-analyses-on-covid19-and-ivermectin/</a:t>
+            </a:r>
+            <a:endParaRPr lang="en-US" sz="1600" dirty="0"/>
+          </a:p>
+          <a:p>
+            <a:pPr algn="ctr"/>
+            <a:r>
+              <a:rPr lang="en-US" sz="1600" dirty="0">
+                <a:hlinkClick r:id="rId3"/>
+              </a:rPr>
+              <a:t>https://c19protocols.com/</a:t>
+            </a:r>
+            <a:endParaRPr lang="en-US" sz="1600" dirty="0"/>
+          </a:p>
+          <a:p>
+            <a:pPr algn="ctr"/>
+            <a:endParaRPr lang="en-US" sz="1600" dirty="0"/>
+          </a:p>
+          <a:p>
+            <a:pPr algn="ctr"/>
+            <a:r>
+              <a:rPr lang="en-US" sz="2400" dirty="0"/>
+              <a:t>Individual drugs demonstrate in large trails a </a:t>
+            </a:r>
+            <a:r>
+              <a:rPr lang="en-US" sz="2400" u="sng" dirty="0"/>
+              <a:t>75%</a:t>
+            </a:r>
+            <a:r>
+              <a:rPr lang="en-US" sz="2400" dirty="0"/>
+              <a:t> reduction in mortality</a:t>
+            </a:r>
+          </a:p>
+          <a:p>
+            <a:pPr algn="ctr"/>
+            <a:r>
+              <a:rPr lang="en-US" sz="1400" dirty="0">
+                <a:hlinkClick r:id="rId4"/>
+              </a:rPr>
+              <a:t>https://c19early.com/</a:t>
+            </a:r>
+            <a:br>
+              <a:rPr lang="en-US" sz="1400" dirty="0"/>
+            </a:br>
+            <a:br>
+              <a:rPr lang="en-US" sz="2800" dirty="0"/>
+            </a:br>
+            <a:r>
+              <a:rPr lang="en-US" sz="2400" dirty="0"/>
+              <a:t>Multi-drug approaches reduce mortality by </a:t>
+            </a:r>
+            <a:r>
+              <a:rPr lang="en-US" sz="2400" u="sng" dirty="0"/>
+              <a:t>85%</a:t>
+            </a:r>
+            <a:r>
+              <a:rPr lang="en-US" sz="2400" dirty="0"/>
+              <a:t> in high-risk patients.</a:t>
+            </a:r>
+            <a:br>
+              <a:rPr lang="en-US" sz="2400" dirty="0"/>
+            </a:br>
+            <a:r>
+              <a:rPr lang="en-US" sz="1200" dirty="0">
+                <a:hlinkClick r:id="rId5"/>
+              </a:rPr>
+              <a:t>https://www.youtube.com/watch?v=QAHi3lX3oGM</a:t>
+            </a:r>
+            <a:endParaRPr lang="en-US" sz="1200" dirty="0"/>
+          </a:p>
+          <a:p>
+            <a:pPr algn="ctr"/>
+            <a:endParaRPr lang="en-US" sz="1200" dirty="0"/>
+          </a:p>
+          <a:p>
+            <a:pPr algn="ctr"/>
+            <a:r>
+              <a:rPr lang="en-US" sz="2800" dirty="0"/>
+              <a:t>Some Doctors claim a </a:t>
+            </a:r>
+            <a:r>
+              <a:rPr lang="en-US" sz="2800" u="sng" dirty="0"/>
+              <a:t>99%+</a:t>
+            </a:r>
+            <a:r>
+              <a:rPr lang="en-US" sz="2800" dirty="0"/>
+              <a:t> effectivity rate</a:t>
+            </a:r>
+            <a:br>
+              <a:rPr lang="en-US" sz="2800" dirty="0"/>
+            </a:br>
+            <a:r>
+              <a:rPr lang="en-US" sz="1100" dirty="0">
+                <a:hlinkClick r:id="rId6"/>
+              </a:rPr>
+              <a:t>https://www.covid-19forum.org/index.php?topic=18.0</a:t>
+            </a:r>
+            <a:endParaRPr lang="en-US" sz="1100" dirty="0"/>
+          </a:p>
+        </p:txBody>
+      </p:sp>
+    </p:spTree>
+    <p:extLst>
+      <p:ext uri="{BB962C8B-B14F-4D97-AF65-F5344CB8AC3E}">
+        <p14:creationId xmlns:p14="http://schemas.microsoft.com/office/powerpoint/2010/main" val="782329607"/>
+      </p:ext>
+    </p:extLst>
+  </p:cSld>
+  <p:clrMapOvr>
+    <a:masterClrMapping/>
+  </p:clrMapOvr>
+  <p:transition spd="slow" advClick="0" advTm="5000">
+    <p:fade thruBlk="1"/>
+  </p:transition>
+</p:sld>
+</file>
+
+<file path=ppt/slides/slide18.xml><?xml version="1.0" encoding="utf-8"?>
+<p:sld xmlns:a="http://schemas.openxmlformats.org/drawingml/2006/main" xmlns:r="http://schemas.openxmlformats.org/officeDocument/2006/relationships" xmlns:p="http://schemas.openxmlformats.org/presentationml/2006/main">
+  <p:cSld>
+    <p:spTree>
+      <p:nvGrpSpPr>
+        <p:cNvPr id="1" name=""/>
+        <p:cNvGrpSpPr/>
+        <p:nvPr/>
+      </p:nvGrpSpPr>
+      <p:grpSpPr>
+        <a:xfrm>
+          <a:off x="0" y="0"/>
+          <a:ext cx="0" cy="0"/>
+          <a:chOff x="0" y="0"/>
+          <a:chExt cx="0" cy="0"/>
+        </a:xfrm>
+      </p:grpSpPr>
+      <p:sp>
+        <p:nvSpPr>
+          <p:cNvPr id="3" name="TextBox 2">
+            <a:extLst>
+              <a:ext uri="{FF2B5EF4-FFF2-40B4-BE49-F238E27FC236}">
+                <a16:creationId xmlns:a16="http://schemas.microsoft.com/office/drawing/2014/main" id="{E9BCD9FD-98E7-4688-AABB-18382A5D765E}"/>
+              </a:ext>
+            </a:extLst>
+          </p:cNvPr>
+          <p:cNvSpPr txBox="1"/>
+          <p:nvPr/>
+        </p:nvSpPr>
+        <p:spPr>
+          <a:xfrm>
             <a:off x="0" y="0"/>
             <a:ext cx="7315199" cy="4572000"/>
           </a:xfrm>
@@ -17002,7 +17219,7 @@
 </p:sld>
 </file>
 
-<file path=ppt/slides/slide18.xml><?xml version="1.0" encoding="utf-8"?>
+<file path=ppt/slides/slide19.xml><?xml version="1.0" encoding="utf-8"?>
 <p:sld xmlns:a="http://schemas.openxmlformats.org/drawingml/2006/main" xmlns:r="http://schemas.openxmlformats.org/officeDocument/2006/relationships" xmlns:p="http://schemas.openxmlformats.org/presentationml/2006/main">
   <p:cSld>
     <p:spTree>
@@ -17679,100 +17896,6 @@
 </p:sld>
 </file>
 
-<file path=ppt/slides/slide19.xml><?xml version="1.0" encoding="utf-8"?>
-<p:sld xmlns:a="http://schemas.openxmlformats.org/drawingml/2006/main" xmlns:r="http://schemas.openxmlformats.org/officeDocument/2006/relationships" xmlns:p="http://schemas.openxmlformats.org/presentationml/2006/main">
-  <p:cSld>
-    <p:spTree>
-      <p:nvGrpSpPr>
-        <p:cNvPr id="1" name=""/>
-        <p:cNvGrpSpPr/>
-        <p:nvPr/>
-      </p:nvGrpSpPr>
-      <p:grpSpPr>
-        <a:xfrm>
-          <a:off x="0" y="0"/>
-          <a:ext cx="0" cy="0"/>
-          <a:chOff x="0" y="0"/>
-          <a:chExt cx="0" cy="0"/>
-        </a:xfrm>
-      </p:grpSpPr>
-      <p:sp>
-        <p:nvSpPr>
-          <p:cNvPr id="3" name="TextBox 2">
-            <a:extLst>
-              <a:ext uri="{FF2B5EF4-FFF2-40B4-BE49-F238E27FC236}">
-                <a16:creationId xmlns:a16="http://schemas.microsoft.com/office/drawing/2014/main" id="{E9BCD9FD-98E7-4688-AABB-18382A5D765E}"/>
-              </a:ext>
-            </a:extLst>
-          </p:cNvPr>
-          <p:cNvSpPr txBox="1"/>
-          <p:nvPr/>
-        </p:nvSpPr>
-        <p:spPr>
-          <a:xfrm>
-            <a:off x="0" y="0"/>
-            <a:ext cx="7315199" cy="4572000"/>
-          </a:xfrm>
-          <a:prstGeom prst="rect">
-            <a:avLst/>
-          </a:prstGeom>
-          <a:noFill/>
-        </p:spPr>
-        <p:txBody>
-          <a:bodyPr wrap="square" anchor="ctr">
-            <a:normAutofit fontScale="77500" lnSpcReduction="20000"/>
-          </a:bodyPr>
-          <a:lstStyle/>
-          <a:p>
-            <a:pPr algn="ctr"/>
-            <a:r>
-              <a:rPr lang="en-US" sz="7800" dirty="0"/>
-              <a:t>ANNUALIZED</a:t>
-            </a:r>
-          </a:p>
-          <a:p>
-            <a:pPr algn="ctr"/>
-            <a:r>
-              <a:rPr lang="en-US" sz="4700" dirty="0"/>
-              <a:t> “COVID Deaths” IF TREATED</a:t>
-            </a:r>
-            <a:br>
-              <a:rPr lang="en-US" sz="4700" dirty="0"/>
-            </a:br>
-            <a:endParaRPr lang="en-US" sz="5600" dirty="0"/>
-          </a:p>
-          <a:p>
-            <a:pPr algn="ctr"/>
-            <a:r>
-              <a:rPr lang="en-US" sz="16700" dirty="0"/>
-              <a:t>60,984</a:t>
-            </a:r>
-            <a:br>
-              <a:rPr lang="en-US" sz="16700" dirty="0"/>
-            </a:br>
-            <a:br>
-              <a:rPr lang="en-US" sz="3600" dirty="0"/>
-            </a:br>
-            <a:endParaRPr lang="en-US" sz="7200" dirty="0"/>
-          </a:p>
-        </p:txBody>
-      </p:sp>
-    </p:spTree>
-    <p:extLst>
-      <p:ext uri="{BB962C8B-B14F-4D97-AF65-F5344CB8AC3E}">
-        <p14:creationId xmlns:p14="http://schemas.microsoft.com/office/powerpoint/2010/main" val="504580322"/>
-      </p:ext>
-    </p:extLst>
-  </p:cSld>
-  <p:clrMapOvr>
-    <a:masterClrMapping/>
-  </p:clrMapOvr>
-  <p:transition spd="slow" advClick="0" advTm="5000">
-    <p:fade thruBlk="1"/>
-  </p:transition>
-</p:sld>
-</file>
-
 <file path=ppt/slides/slide2.xml><?xml version="1.0" encoding="utf-8"?>
 <p:sld xmlns:a="http://schemas.openxmlformats.org/drawingml/2006/main" xmlns:r="http://schemas.openxmlformats.org/officeDocument/2006/relationships" xmlns:p="http://schemas.openxmlformats.org/presentationml/2006/main">
   <p:cSld>
@@ -17804,8 +17927,8 @@
         </p:nvSpPr>
         <p:spPr>
           <a:xfrm>
-            <a:off x="224501" y="436004"/>
-            <a:ext cx="7224514" cy="3539430"/>
+            <a:off x="90686" y="101416"/>
+            <a:ext cx="7224514" cy="4062651"/>
           </a:xfrm>
           <a:prstGeom prst="rect">
             <a:avLst/>
@@ -17818,79 +17941,80 @@
           </a:bodyPr>
           <a:lstStyle/>
           <a:p>
-            <a:pPr marL="571500" indent="-571500">
-              <a:buFont typeface="Arial" panose="020B0604020202020204" pitchFamily="34" charset="0"/>
-              <a:buChar char="•"/>
-            </a:pPr>
-            <a:r>
-              <a:rPr lang="en-US" sz="3200" dirty="0"/>
-              <a:t>Can we get </a:t>
-            </a:r>
-            <a:r>
-              <a:rPr lang="en-US" sz="3200" u="sng" dirty="0"/>
-              <a:t>rational data</a:t>
-            </a:r>
-            <a:r>
-              <a:rPr lang="en-US" sz="3200" dirty="0"/>
-              <a:t>?</a:t>
+            <a:pPr algn="ctr"/>
+            <a:r>
+              <a:rPr lang="en-US" sz="6600" dirty="0">
+                <a:solidFill>
+                  <a:srgbClr val="FF0000"/>
+                </a:solidFill>
+              </a:rPr>
+              <a:t>*</a:t>
             </a:r>
             <a:br>
-              <a:rPr lang="en-US" sz="3200" dirty="0"/>
+              <a:rPr lang="en-US" sz="6600" dirty="0"/>
             </a:br>
-            <a:endParaRPr lang="en-US" sz="3200" dirty="0"/>
-          </a:p>
-          <a:p>
-            <a:pPr marL="571500" indent="-571500">
-              <a:buFont typeface="Arial" panose="020B0604020202020204" pitchFamily="34" charset="0"/>
-              <a:buChar char="•"/>
-            </a:pPr>
-            <a:r>
-              <a:rPr lang="en-US" sz="3200" dirty="0"/>
-              <a:t>How does </a:t>
-            </a:r>
-            <a:r>
-              <a:rPr lang="en-US" sz="3200" u="sng" dirty="0"/>
-              <a:t>Treatment</a:t>
-            </a:r>
-            <a:r>
-              <a:rPr lang="en-US" sz="3200" dirty="0"/>
-              <a:t> affect the data?</a:t>
+            <a:r>
+              <a:rPr lang="en-US" sz="2800" i="1" dirty="0"/>
+              <a:t>This is a work in progress…</a:t>
             </a:r>
             <a:br>
-              <a:rPr lang="en-US" sz="3200" dirty="0"/>
+              <a:rPr lang="en-US" sz="2800" i="1" dirty="0"/>
             </a:br>
-            <a:endParaRPr lang="en-US" sz="3200" dirty="0"/>
-          </a:p>
-          <a:p>
-            <a:pPr marL="571500" indent="-571500">
-              <a:buFont typeface="Arial" panose="020B0604020202020204" pitchFamily="34" charset="0"/>
-              <a:buChar char="•"/>
-            </a:pPr>
-            <a:r>
-              <a:rPr lang="en-US" sz="3200" dirty="0"/>
-              <a:t>How does </a:t>
-            </a:r>
-            <a:r>
-              <a:rPr lang="en-US" sz="3200" u="sng" dirty="0"/>
-              <a:t>Age </a:t>
-            </a:r>
-            <a:r>
-              <a:rPr lang="en-US" sz="3200" dirty="0"/>
-              <a:t>affect the data?</a:t>
+            <a:r>
+              <a:rPr lang="en-US" sz="1600" i="1" dirty="0"/>
+              <a:t>Verify before you share…</a:t>
+            </a:r>
+          </a:p>
+          <a:p>
+            <a:pPr algn="ctr"/>
+            <a:endParaRPr lang="en-US" sz="2800" i="1" dirty="0"/>
+          </a:p>
+          <a:p>
+            <a:pPr algn="ctr"/>
+            <a:r>
+              <a:rPr lang="en-US" sz="1400" i="1" dirty="0"/>
+              <a:t>Raw Data &amp; Analysis used for this presentation are available here: </a:t>
+            </a:r>
+            <a:r>
+              <a:rPr lang="en-US" sz="1400" i="1" dirty="0">
+                <a:hlinkClick r:id="rId2"/>
+              </a:rPr>
+              <a:t>https://github.com/TruthData/CovidDeaths</a:t>
             </a:r>
             <a:br>
-              <a:rPr lang="en-US" sz="3200" dirty="0"/>
+              <a:rPr lang="en-US" sz="1400" i="1" dirty="0"/>
             </a:br>
-            <a:endParaRPr lang="en-US" sz="3200" dirty="0"/>
-          </a:p>
-          <a:p>
-            <a:pPr marL="571500" indent="-571500">
-              <a:buFont typeface="Arial" panose="020B0604020202020204" pitchFamily="34" charset="0"/>
-              <a:buChar char="•"/>
-            </a:pPr>
-            <a:r>
-              <a:rPr lang="en-US" sz="3200" dirty="0"/>
-              <a:t>Rationally:  How “Deadly” is COVID</a:t>
+            <a:br>
+              <a:rPr lang="en-US" sz="1400" i="1" dirty="0"/>
+            </a:br>
+            <a:r>
+              <a:rPr lang="en-US" sz="1400" i="1" dirty="0"/>
+              <a:t>Peer review, corrections and or feed back  is appreciated:</a:t>
+            </a:r>
+            <a:br>
+              <a:rPr lang="en-US" sz="1400" i="1" dirty="0"/>
+            </a:br>
+            <a:r>
+              <a:rPr lang="en-US" sz="1600" i="1" dirty="0">
+                <a:hlinkClick r:id="rId3"/>
+              </a:rPr>
+              <a:t>TruthData@protonmail.com</a:t>
+            </a:r>
+            <a:endParaRPr lang="en-US" sz="1600" i="1" dirty="0"/>
+          </a:p>
+          <a:p>
+            <a:pPr algn="ctr"/>
+            <a:endParaRPr lang="en-US" sz="1600" i="1" dirty="0"/>
+          </a:p>
+          <a:p>
+            <a:pPr algn="ctr"/>
+            <a:endParaRPr lang="en-US" sz="1600" i="1" dirty="0"/>
+          </a:p>
+          <a:p>
+            <a:pPr algn="ctr"/>
+            <a:r>
+              <a:rPr lang="en-US" sz="1600" i="1" dirty="0"/>
+              <a:t>You are free to use the data and/or slides as you see fit</a:t>
             </a:r>
           </a:p>
         </p:txBody>
@@ -17898,7 +18022,7 @@
     </p:spTree>
     <p:extLst>
       <p:ext uri="{BB962C8B-B14F-4D97-AF65-F5344CB8AC3E}">
-        <p14:creationId xmlns:p14="http://schemas.microsoft.com/office/powerpoint/2010/main" val="1803760681"/>
+        <p14:creationId xmlns:p14="http://schemas.microsoft.com/office/powerpoint/2010/main" val="4077372122"/>
       </p:ext>
     </p:extLst>
   </p:cSld>
@@ -17952,49 +18076,47 @@
         </p:spPr>
         <p:txBody>
           <a:bodyPr wrap="square" anchor="ctr">
-            <a:normAutofit/>
+            <a:normAutofit fontScale="77500" lnSpcReduction="20000"/>
           </a:bodyPr>
           <a:lstStyle/>
           <a:p>
             <a:pPr algn="ctr"/>
-            <a:endParaRPr lang="en-US" sz="4800" dirty="0"/>
+            <a:r>
+              <a:rPr lang="en-US" sz="7800" dirty="0"/>
+              <a:t>ANNUALIZED</a:t>
+            </a:r>
+          </a:p>
+          <a:p>
+            <a:pPr algn="ctr"/>
+            <a:r>
+              <a:rPr lang="en-US" sz="4700" dirty="0"/>
+              <a:t> “COVID Deaths” IF TREATED</a:t>
+            </a:r>
+            <a:br>
+              <a:rPr lang="en-US" sz="4700" dirty="0"/>
+            </a:br>
+            <a:endParaRPr lang="en-US" sz="5600" dirty="0"/>
+          </a:p>
+          <a:p>
+            <a:pPr algn="ctr"/>
+            <a:r>
+              <a:rPr lang="en-US" sz="16700" dirty="0"/>
+              <a:t>60,984</a:t>
+            </a:r>
+            <a:br>
+              <a:rPr lang="en-US" sz="16700" dirty="0"/>
+            </a:br>
+            <a:br>
+              <a:rPr lang="en-US" sz="3600" dirty="0"/>
+            </a:br>
+            <a:endParaRPr lang="en-US" sz="7200" dirty="0"/>
           </a:p>
         </p:txBody>
       </p:sp>
-      <p:graphicFrame>
-        <p:nvGraphicFramePr>
-          <p:cNvPr id="6" name="Chart 5">
-            <a:extLst>
-              <a:ext uri="{FF2B5EF4-FFF2-40B4-BE49-F238E27FC236}">
-                <a16:creationId xmlns:a16="http://schemas.microsoft.com/office/drawing/2014/main" id="{8C04D2F5-82F5-42AD-ABB3-A4A7ED586217}"/>
-              </a:ext>
-            </a:extLst>
-          </p:cNvPr>
-          <p:cNvGraphicFramePr>
-            <a:graphicFrameLocks/>
-          </p:cNvGraphicFramePr>
-          <p:nvPr>
-            <p:extLst>
-              <p:ext uri="{D42A27DB-BD31-4B8C-83A1-F6EECF244321}">
-                <p14:modId xmlns:p14="http://schemas.microsoft.com/office/powerpoint/2010/main" val="3582685509"/>
-              </p:ext>
-            </p:extLst>
-          </p:nvPr>
-        </p:nvGraphicFramePr>
-        <p:xfrm>
-          <a:off x="0" y="0"/>
-          <a:ext cx="7315198" cy="4572000"/>
-        </p:xfrm>
-        <a:graphic>
-          <a:graphicData uri="http://schemas.openxmlformats.org/drawingml/2006/chart">
-            <c:chart xmlns:c="http://schemas.openxmlformats.org/drawingml/2006/chart" xmlns:r="http://schemas.openxmlformats.org/officeDocument/2006/relationships" r:id="rId2"/>
-          </a:graphicData>
-        </a:graphic>
-      </p:graphicFrame>
     </p:spTree>
     <p:extLst>
       <p:ext uri="{BB962C8B-B14F-4D97-AF65-F5344CB8AC3E}">
-        <p14:creationId xmlns:p14="http://schemas.microsoft.com/office/powerpoint/2010/main" val="530870189"/>
+        <p14:creationId xmlns:p14="http://schemas.microsoft.com/office/powerpoint/2010/main" val="504580322"/>
       </p:ext>
     </p:extLst>
   </p:cSld>
@@ -18053,6 +18175,102 @@
           <a:lstStyle/>
           <a:p>
             <a:pPr algn="ctr"/>
+            <a:endParaRPr lang="en-US" sz="4800" dirty="0"/>
+          </a:p>
+        </p:txBody>
+      </p:sp>
+      <p:graphicFrame>
+        <p:nvGraphicFramePr>
+          <p:cNvPr id="6" name="Chart 5">
+            <a:extLst>
+              <a:ext uri="{FF2B5EF4-FFF2-40B4-BE49-F238E27FC236}">
+                <a16:creationId xmlns:a16="http://schemas.microsoft.com/office/drawing/2014/main" id="{8C04D2F5-82F5-42AD-ABB3-A4A7ED586217}"/>
+              </a:ext>
+            </a:extLst>
+          </p:cNvPr>
+          <p:cNvGraphicFramePr>
+            <a:graphicFrameLocks/>
+          </p:cNvGraphicFramePr>
+          <p:nvPr>
+            <p:extLst>
+              <p:ext uri="{D42A27DB-BD31-4B8C-83A1-F6EECF244321}">
+                <p14:modId xmlns:p14="http://schemas.microsoft.com/office/powerpoint/2010/main" val="3582685509"/>
+              </p:ext>
+            </p:extLst>
+          </p:nvPr>
+        </p:nvGraphicFramePr>
+        <p:xfrm>
+          <a:off x="0" y="0"/>
+          <a:ext cx="7315198" cy="4572000"/>
+        </p:xfrm>
+        <a:graphic>
+          <a:graphicData uri="http://schemas.openxmlformats.org/drawingml/2006/chart">
+            <c:chart xmlns:c="http://schemas.openxmlformats.org/drawingml/2006/chart" xmlns:r="http://schemas.openxmlformats.org/officeDocument/2006/relationships" r:id="rId2"/>
+          </a:graphicData>
+        </a:graphic>
+      </p:graphicFrame>
+    </p:spTree>
+    <p:extLst>
+      <p:ext uri="{BB962C8B-B14F-4D97-AF65-F5344CB8AC3E}">
+        <p14:creationId xmlns:p14="http://schemas.microsoft.com/office/powerpoint/2010/main" val="530870189"/>
+      </p:ext>
+    </p:extLst>
+  </p:cSld>
+  <p:clrMapOvr>
+    <a:masterClrMapping/>
+  </p:clrMapOvr>
+  <p:transition spd="slow" advClick="0" advTm="5000">
+    <p:fade thruBlk="1"/>
+  </p:transition>
+</p:sld>
+</file>
+
+<file path=ppt/slides/slide22.xml><?xml version="1.0" encoding="utf-8"?>
+<p:sld xmlns:a="http://schemas.openxmlformats.org/drawingml/2006/main" xmlns:r="http://schemas.openxmlformats.org/officeDocument/2006/relationships" xmlns:p="http://schemas.openxmlformats.org/presentationml/2006/main">
+  <p:cSld>
+    <p:spTree>
+      <p:nvGrpSpPr>
+        <p:cNvPr id="1" name=""/>
+        <p:cNvGrpSpPr/>
+        <p:nvPr/>
+      </p:nvGrpSpPr>
+      <p:grpSpPr>
+        <a:xfrm>
+          <a:off x="0" y="0"/>
+          <a:ext cx="0" cy="0"/>
+          <a:chOff x="0" y="0"/>
+          <a:chExt cx="0" cy="0"/>
+        </a:xfrm>
+      </p:grpSpPr>
+      <p:sp>
+        <p:nvSpPr>
+          <p:cNvPr id="3" name="TextBox 2">
+            <a:extLst>
+              <a:ext uri="{FF2B5EF4-FFF2-40B4-BE49-F238E27FC236}">
+                <a16:creationId xmlns:a16="http://schemas.microsoft.com/office/drawing/2014/main" id="{E9BCD9FD-98E7-4688-AABB-18382A5D765E}"/>
+              </a:ext>
+            </a:extLst>
+          </p:cNvPr>
+          <p:cNvSpPr txBox="1"/>
+          <p:nvPr/>
+        </p:nvSpPr>
+        <p:spPr>
+          <a:xfrm>
+            <a:off x="0" y="0"/>
+            <a:ext cx="7315199" cy="4572000"/>
+          </a:xfrm>
+          <a:prstGeom prst="rect">
+            <a:avLst/>
+          </a:prstGeom>
+          <a:noFill/>
+        </p:spPr>
+        <p:txBody>
+          <a:bodyPr wrap="square" anchor="ctr">
+            <a:normAutofit/>
+          </a:bodyPr>
+          <a:lstStyle/>
+          <a:p>
+            <a:pPr algn="ctr"/>
             <a:r>
               <a:rPr lang="en-US" sz="6500" u="sng" dirty="0"/>
               <a:t>What about age?</a:t>
@@ -18090,7 +18308,7 @@
 </p:sld>
 </file>
 
-<file path=ppt/slides/slide22.xml><?xml version="1.0" encoding="utf-8"?>
+<file path=ppt/slides/slide23.xml><?xml version="1.0" encoding="utf-8"?>
 <p:sld xmlns:a="http://schemas.openxmlformats.org/drawingml/2006/main" xmlns:r="http://schemas.openxmlformats.org/officeDocument/2006/relationships" xmlns:p="http://schemas.openxmlformats.org/presentationml/2006/main">
   <p:cSld>
     <p:spTree>
@@ -18153,7 +18371,7 @@
 </p:sld>
 </file>
 
-<file path=ppt/slides/slide23.xml><?xml version="1.0" encoding="utf-8"?>
+<file path=ppt/slides/slide24.xml><?xml version="1.0" encoding="utf-8"?>
 <p:sld xmlns:a="http://schemas.openxmlformats.org/drawingml/2006/main" xmlns:r="http://schemas.openxmlformats.org/officeDocument/2006/relationships" xmlns:p="http://schemas.openxmlformats.org/presentationml/2006/main">
   <p:cSld>
     <p:spTree>
@@ -18272,7 +18490,7 @@
 </p:sld>
 </file>
 
-<file path=ppt/slides/slide24.xml><?xml version="1.0" encoding="utf-8"?>
+<file path=ppt/slides/slide25.xml><?xml version="1.0" encoding="utf-8"?>
 <p:sld xmlns:a="http://schemas.openxmlformats.org/drawingml/2006/main" xmlns:r="http://schemas.openxmlformats.org/officeDocument/2006/relationships" xmlns:p="http://schemas.openxmlformats.org/presentationml/2006/main">
   <p:cSld>
     <p:spTree>
@@ -18495,7 +18713,7 @@
 </p:sld>
 </file>
 
-<file path=ppt/slides/slide25.xml><?xml version="1.0" encoding="utf-8"?>
+<file path=ppt/slides/slide26.xml><?xml version="1.0" encoding="utf-8"?>
 <p:sld xmlns:a="http://schemas.openxmlformats.org/drawingml/2006/main" xmlns:r="http://schemas.openxmlformats.org/officeDocument/2006/relationships" xmlns:p="http://schemas.openxmlformats.org/presentationml/2006/main">
   <p:cSld>
     <p:spTree>
@@ -18705,93 +18923,6 @@
 </p:sld>
 </file>
 
-<file path=ppt/slides/slide26.xml><?xml version="1.0" encoding="utf-8"?>
-<p:sld xmlns:a="http://schemas.openxmlformats.org/drawingml/2006/main" xmlns:r="http://schemas.openxmlformats.org/officeDocument/2006/relationships" xmlns:p="http://schemas.openxmlformats.org/presentationml/2006/main">
-  <p:cSld>
-    <p:spTree>
-      <p:nvGrpSpPr>
-        <p:cNvPr id="1" name=""/>
-        <p:cNvGrpSpPr/>
-        <p:nvPr/>
-      </p:nvGrpSpPr>
-      <p:grpSpPr>
-        <a:xfrm>
-          <a:off x="0" y="0"/>
-          <a:ext cx="0" cy="0"/>
-          <a:chOff x="0" y="0"/>
-          <a:chExt cx="0" cy="0"/>
-        </a:xfrm>
-      </p:grpSpPr>
-      <p:sp>
-        <p:nvSpPr>
-          <p:cNvPr id="3" name="TextBox 2">
-            <a:extLst>
-              <a:ext uri="{FF2B5EF4-FFF2-40B4-BE49-F238E27FC236}">
-                <a16:creationId xmlns:a16="http://schemas.microsoft.com/office/drawing/2014/main" id="{E9BCD9FD-98E7-4688-AABB-18382A5D765E}"/>
-              </a:ext>
-            </a:extLst>
-          </p:cNvPr>
-          <p:cNvSpPr txBox="1"/>
-          <p:nvPr/>
-        </p:nvSpPr>
-        <p:spPr>
-          <a:xfrm>
-            <a:off x="0" y="0"/>
-            <a:ext cx="7315199" cy="4572000"/>
-          </a:xfrm>
-          <a:prstGeom prst="rect">
-            <a:avLst/>
-          </a:prstGeom>
-          <a:noFill/>
-        </p:spPr>
-        <p:txBody>
-          <a:bodyPr wrap="square" anchor="ctr">
-            <a:normAutofit/>
-          </a:bodyPr>
-          <a:lstStyle/>
-          <a:p>
-            <a:pPr algn="ctr"/>
-            <a:r>
-              <a:rPr lang="en-US" sz="6500" dirty="0"/>
-              <a:t>AGE &amp; Treatment</a:t>
-            </a:r>
-            <a:br>
-              <a:rPr lang="en-US" sz="6500" dirty="0"/>
-            </a:br>
-            <a:r>
-              <a:rPr lang="en-US" sz="5200" dirty="0"/>
-              <a:t>must be a consideration when rationally looking at </a:t>
-            </a:r>
-            <a:br>
-              <a:rPr lang="en-US" sz="5200" dirty="0"/>
-            </a:br>
-            <a:r>
-              <a:rPr lang="en-US" sz="6500" dirty="0"/>
-              <a:t>Covid Deaths </a:t>
-            </a:r>
-            <a:br>
-              <a:rPr lang="en-US" sz="6500" dirty="0"/>
-            </a:br>
-            <a:endParaRPr lang="en-US" sz="4800" dirty="0"/>
-          </a:p>
-        </p:txBody>
-      </p:sp>
-    </p:spTree>
-    <p:extLst>
-      <p:ext uri="{BB962C8B-B14F-4D97-AF65-F5344CB8AC3E}">
-        <p14:creationId xmlns:p14="http://schemas.microsoft.com/office/powerpoint/2010/main" val="1702191534"/>
-      </p:ext>
-    </p:extLst>
-  </p:cSld>
-  <p:clrMapOvr>
-    <a:masterClrMapping/>
-  </p:clrMapOvr>
-  <p:transition spd="slow" advClick="0" advTm="5000">
-    <p:fade thruBlk="1"/>
-  </p:transition>
-</p:sld>
-</file>
-
 <file path=ppt/slides/slide27.xml><?xml version="1.0" encoding="utf-8"?>
 <p:sld xmlns:a="http://schemas.openxmlformats.org/drawingml/2006/main" xmlns:r="http://schemas.openxmlformats.org/officeDocument/2006/relationships" xmlns:p="http://schemas.openxmlformats.org/presentationml/2006/main">
   <p:cSld>
@@ -18839,38 +18970,34 @@
           <a:p>
             <a:pPr algn="ctr"/>
             <a:r>
-              <a:rPr lang="en-US" sz="5400" u="sng" dirty="0"/>
-              <a:t>How Deadly is COVID?</a:t>
+              <a:rPr lang="en-US" sz="6500" dirty="0"/>
+              <a:t>AGE &amp; Treatment</a:t>
             </a:r>
             <a:br>
-              <a:rPr lang="en-US" sz="5400" dirty="0"/>
+              <a:rPr lang="en-US" sz="6500" dirty="0"/>
             </a:br>
-            <a:endParaRPr lang="en-US" sz="5400" dirty="0"/>
-          </a:p>
-          <a:p>
-            <a:pPr algn="ctr"/>
-            <a:r>
-              <a:rPr lang="en-US" sz="4800" dirty="0"/>
-              <a:t>“XXX Deaths Per 1 Million”</a:t>
+            <a:r>
+              <a:rPr lang="en-US" sz="5200" dirty="0"/>
+              <a:t>must be a consideration when rationally looking at </a:t>
             </a:r>
             <a:br>
-              <a:rPr lang="en-US" sz="4800" dirty="0"/>
+              <a:rPr lang="en-US" sz="5200" dirty="0"/>
+            </a:br>
+            <a:r>
+              <a:rPr lang="en-US" sz="6500" dirty="0"/>
+              <a:t>Covid Deaths </a:t>
+            </a:r>
+            <a:br>
+              <a:rPr lang="en-US" sz="6500" dirty="0"/>
             </a:br>
             <a:endParaRPr lang="en-US" sz="4800" dirty="0"/>
-          </a:p>
-          <a:p>
-            <a:pPr algn="ctr"/>
-            <a:r>
-              <a:rPr lang="en-US" sz="4800" dirty="0"/>
-              <a:t>is a bit hard to grasp…</a:t>
-            </a:r>
           </a:p>
         </p:txBody>
       </p:sp>
     </p:spTree>
     <p:extLst>
       <p:ext uri="{BB962C8B-B14F-4D97-AF65-F5344CB8AC3E}">
-        <p14:creationId xmlns:p14="http://schemas.microsoft.com/office/powerpoint/2010/main" val="379259250"/>
+        <p14:creationId xmlns:p14="http://schemas.microsoft.com/office/powerpoint/2010/main" val="1702191534"/>
       </p:ext>
     </p:extLst>
   </p:cSld>
@@ -18930,61 +19057,38 @@
           <a:p>
             <a:pPr algn="ctr"/>
             <a:r>
-              <a:rPr lang="en-US" sz="6500" dirty="0"/>
-              <a:t>Let’s ‘rationalize’</a:t>
-            </a:r>
+              <a:rPr lang="en-US" sz="5400" u="sng" dirty="0"/>
+              <a:t>How Deadly is COVID?</a:t>
+            </a:r>
+            <a:br>
+              <a:rPr lang="en-US" sz="5400" dirty="0"/>
+            </a:br>
+            <a:endParaRPr lang="en-US" sz="5400" dirty="0"/>
           </a:p>
           <a:p>
             <a:pPr algn="ctr"/>
             <a:r>
-              <a:rPr lang="en-US" sz="5200" dirty="0"/>
-              <a:t>By looking at some historical “Pandemics” </a:t>
-            </a:r>
+              <a:rPr lang="en-US" sz="4800" dirty="0"/>
+              <a:t>“XXX Deaths Per 1 Million”</a:t>
+            </a:r>
+            <a:br>
+              <a:rPr lang="en-US" sz="4800" dirty="0"/>
+            </a:br>
+            <a:endParaRPr lang="en-US" sz="4800" dirty="0"/>
           </a:p>
           <a:p>
             <a:pPr algn="ctr"/>
-            <a:endParaRPr lang="en-US" sz="1200" dirty="0"/>
-          </a:p>
-          <a:p>
-            <a:pPr algn="ctr"/>
-            <a:endParaRPr lang="en-US" sz="1200" dirty="0"/>
-          </a:p>
-          <a:p>
-            <a:pPr algn="ctr"/>
-            <a:r>
-              <a:rPr lang="en-US" sz="1200" dirty="0">
-                <a:hlinkClick r:id="rId2"/>
-              </a:rPr>
-              <a:t>https://www.history.com/topics/middle-ages/pandemics-timeline</a:t>
-            </a:r>
-            <a:endParaRPr lang="en-US" sz="1200" dirty="0"/>
-          </a:p>
-          <a:p>
-            <a:pPr algn="ctr"/>
-            <a:r>
-              <a:rPr lang="en-US" sz="1200" dirty="0">
-                <a:hlinkClick r:id="rId3"/>
-              </a:rPr>
-              <a:t>https://www.washingtonpost.com/graphics/2020/local/retropolis/coronavirus-deadliest-pandemics/</a:t>
-            </a:r>
-            <a:endParaRPr lang="en-US" sz="1200" dirty="0"/>
-          </a:p>
-          <a:p>
-            <a:pPr algn="ctr"/>
-            <a:r>
-              <a:rPr lang="en-US" sz="1200" dirty="0">
-                <a:hlinkClick r:id="rId4"/>
-              </a:rPr>
-              <a:t>https://www.worldometers.info/world-population/world-population-by-year/</a:t>
-            </a:r>
-            <a:endParaRPr lang="en-US" sz="4800" dirty="0"/>
+            <a:r>
+              <a:rPr lang="en-US" sz="4800" dirty="0"/>
+              <a:t>is a bit hard to grasp…</a:t>
+            </a:r>
           </a:p>
         </p:txBody>
       </p:sp>
     </p:spTree>
     <p:extLst>
       <p:ext uri="{BB962C8B-B14F-4D97-AF65-F5344CB8AC3E}">
-        <p14:creationId xmlns:p14="http://schemas.microsoft.com/office/powerpoint/2010/main" val="3530824324"/>
+        <p14:creationId xmlns:p14="http://schemas.microsoft.com/office/powerpoint/2010/main" val="379259250"/>
       </p:ext>
     </p:extLst>
   </p:cSld>
@@ -19044,46 +19148,61 @@
           <a:p>
             <a:pPr algn="ctr"/>
             <a:r>
+              <a:rPr lang="en-US" sz="6500" dirty="0"/>
+              <a:t>Let’s ‘rationalize’</a:t>
+            </a:r>
+          </a:p>
+          <a:p>
+            <a:pPr algn="ctr"/>
+            <a:r>
               <a:rPr lang="en-US" sz="5200" dirty="0"/>
-              <a:t>Plague of Justinian </a:t>
-            </a:r>
-            <a:r>
-              <a:rPr lang="en-US" sz="3200" dirty="0"/>
-              <a:t>( 541)</a:t>
-            </a:r>
-            <a:r>
-              <a:rPr lang="en-US" sz="5200" dirty="0"/>
-              <a:t>:</a:t>
-            </a:r>
-            <a:br>
-              <a:rPr lang="en-US" sz="5200" dirty="0"/>
-            </a:br>
-            <a:r>
-              <a:rPr lang="en-US" sz="2400" dirty="0"/>
-              <a:t>it is estimated that:</a:t>
-            </a:r>
-            <a:endParaRPr lang="en-US" sz="5200" dirty="0"/>
+              <a:t>By looking at some historical “Pandemics” </a:t>
+            </a:r>
           </a:p>
           <a:p>
             <a:pPr algn="ctr"/>
-            <a:r>
-              <a:rPr lang="en-US" sz="6600" b="1" dirty="0"/>
-              <a:t>1 out of every 4 </a:t>
-            </a:r>
+            <a:endParaRPr lang="en-US" sz="1200" dirty="0"/>
           </a:p>
           <a:p>
             <a:pPr algn="ctr"/>
-            <a:r>
-              <a:rPr lang="en-US" sz="5200" dirty="0"/>
-              <a:t>people perished.</a:t>
-            </a:r>
+            <a:endParaRPr lang="en-US" sz="1200" dirty="0"/>
+          </a:p>
+          <a:p>
+            <a:pPr algn="ctr"/>
+            <a:r>
+              <a:rPr lang="en-US" sz="1200" dirty="0">
+                <a:hlinkClick r:id="rId2"/>
+              </a:rPr>
+              <a:t>https://www.history.com/topics/middle-ages/pandemics-timeline</a:t>
+            </a:r>
+            <a:endParaRPr lang="en-US" sz="1200" dirty="0"/>
+          </a:p>
+          <a:p>
+            <a:pPr algn="ctr"/>
+            <a:r>
+              <a:rPr lang="en-US" sz="1200" dirty="0">
+                <a:hlinkClick r:id="rId3"/>
+              </a:rPr>
+              <a:t>https://www.washingtonpost.com/graphics/2020/local/retropolis/coronavirus-deadliest-pandemics/</a:t>
+            </a:r>
+            <a:endParaRPr lang="en-US" sz="1200" dirty="0"/>
+          </a:p>
+          <a:p>
+            <a:pPr algn="ctr"/>
+            <a:r>
+              <a:rPr lang="en-US" sz="1200" dirty="0">
+                <a:hlinkClick r:id="rId4"/>
+              </a:rPr>
+              <a:t>https://www.worldometers.info/world-population/world-population-by-year/</a:t>
+            </a:r>
+            <a:endParaRPr lang="en-US" sz="4800" dirty="0"/>
           </a:p>
         </p:txBody>
       </p:sp>
     </p:spTree>
     <p:extLst>
       <p:ext uri="{BB962C8B-B14F-4D97-AF65-F5344CB8AC3E}">
-        <p14:creationId xmlns:p14="http://schemas.microsoft.com/office/powerpoint/2010/main" val="3977944331"/>
+        <p14:creationId xmlns:p14="http://schemas.microsoft.com/office/powerpoint/2010/main" val="3530824324"/>
       </p:ext>
     </p:extLst>
   </p:cSld>
@@ -19127,8 +19246,8 @@
         </p:nvSpPr>
         <p:spPr>
           <a:xfrm>
-            <a:off x="0" y="0"/>
-            <a:ext cx="7315199" cy="4572000"/>
+            <a:off x="224501" y="436004"/>
+            <a:ext cx="7224514" cy="3539430"/>
           </a:xfrm>
           <a:prstGeom prst="rect">
             <a:avLst/>
@@ -19136,59 +19255,92 @@
           <a:noFill/>
         </p:spPr>
         <p:txBody>
-          <a:bodyPr wrap="square" anchor="ctr">
-            <a:normAutofit/>
+          <a:bodyPr wrap="square">
+            <a:spAutoFit/>
           </a:bodyPr>
           <a:lstStyle/>
           <a:p>
-            <a:pPr algn="ctr"/>
-            <a:r>
-              <a:rPr lang="en-US" sz="5400" dirty="0"/>
-              <a:t>“COVID Deaths</a:t>
-            </a:r>
-            <a:r>
-              <a:rPr lang="en-US" sz="5400" dirty="0">
-                <a:solidFill>
-                  <a:srgbClr val="FF0000"/>
-                </a:solidFill>
-              </a:rPr>
-              <a:t>*</a:t>
-            </a:r>
-            <a:r>
-              <a:rPr lang="en-US" sz="5400" dirty="0"/>
-              <a:t>”</a:t>
-            </a:r>
-          </a:p>
-          <a:p>
-            <a:pPr algn="ctr"/>
-            <a:r>
-              <a:rPr lang="en-US" sz="5400" dirty="0">
-                <a:solidFill>
-                  <a:srgbClr val="FF0000"/>
-                </a:solidFill>
-              </a:rPr>
-              <a:t>*</a:t>
-            </a:r>
-            <a:r>
-              <a:rPr lang="en-US" sz="3600" dirty="0">
-                <a:solidFill>
-                  <a:srgbClr val="FF0000"/>
-                </a:solidFill>
-              </a:rPr>
-              <a:t>What constitutes a ‘COVID Death’ is quite squishy….. And controversial</a:t>
-            </a:r>
-            <a:endParaRPr lang="en-US" sz="3600" dirty="0"/>
-          </a:p>
-          <a:p>
-            <a:pPr algn="ctr"/>
-            <a:endParaRPr lang="en-US" sz="5400" dirty="0"/>
+            <a:pPr marL="571500" indent="-571500">
+              <a:buFont typeface="Arial" panose="020B0604020202020204" pitchFamily="34" charset="0"/>
+              <a:buChar char="•"/>
+            </a:pPr>
+            <a:r>
+              <a:rPr lang="en-US" sz="3200" dirty="0"/>
+              <a:t>Can we get </a:t>
+            </a:r>
+            <a:r>
+              <a:rPr lang="en-US" sz="3200" u="sng" dirty="0"/>
+              <a:t>rational data</a:t>
+            </a:r>
+            <a:r>
+              <a:rPr lang="en-US" sz="3200" dirty="0"/>
+              <a:t>?</a:t>
+            </a:r>
+            <a:br>
+              <a:rPr lang="en-US" sz="3200" dirty="0"/>
+            </a:br>
+            <a:endParaRPr lang="en-US" sz="3200" dirty="0"/>
+          </a:p>
+          <a:p>
+            <a:pPr marL="571500" indent="-571500">
+              <a:buFont typeface="Arial" panose="020B0604020202020204" pitchFamily="34" charset="0"/>
+              <a:buChar char="•"/>
+            </a:pPr>
+            <a:r>
+              <a:rPr lang="en-US" sz="3200" dirty="0"/>
+              <a:t>How does </a:t>
+            </a:r>
+            <a:r>
+              <a:rPr lang="en-US" sz="3200" u="sng" dirty="0"/>
+              <a:t>Treatment</a:t>
+            </a:r>
+            <a:r>
+              <a:rPr lang="en-US" sz="3200" dirty="0"/>
+              <a:t> affect the data?</a:t>
+            </a:r>
+            <a:br>
+              <a:rPr lang="en-US" sz="3200" dirty="0"/>
+            </a:br>
+            <a:endParaRPr lang="en-US" sz="3200" dirty="0"/>
+          </a:p>
+          <a:p>
+            <a:pPr marL="571500" indent="-571500">
+              <a:buFont typeface="Arial" panose="020B0604020202020204" pitchFamily="34" charset="0"/>
+              <a:buChar char="•"/>
+            </a:pPr>
+            <a:r>
+              <a:rPr lang="en-US" sz="3200" dirty="0"/>
+              <a:t>How does </a:t>
+            </a:r>
+            <a:r>
+              <a:rPr lang="en-US" sz="3200" u="sng" dirty="0"/>
+              <a:t>Age </a:t>
+            </a:r>
+            <a:r>
+              <a:rPr lang="en-US" sz="3200" dirty="0"/>
+              <a:t>affect the data?</a:t>
+            </a:r>
+            <a:br>
+              <a:rPr lang="en-US" sz="3200" dirty="0"/>
+            </a:br>
+            <a:endParaRPr lang="en-US" sz="3200" dirty="0"/>
+          </a:p>
+          <a:p>
+            <a:pPr marL="571500" indent="-571500">
+              <a:buFont typeface="Arial" panose="020B0604020202020204" pitchFamily="34" charset="0"/>
+              <a:buChar char="•"/>
+            </a:pPr>
+            <a:r>
+              <a:rPr lang="en-US" sz="3200" dirty="0"/>
+              <a:t>Rationally:  How “Deadly” is COVID</a:t>
+            </a:r>
           </a:p>
         </p:txBody>
       </p:sp>
     </p:spTree>
     <p:extLst>
       <p:ext uri="{BB962C8B-B14F-4D97-AF65-F5344CB8AC3E}">
-        <p14:creationId xmlns:p14="http://schemas.microsoft.com/office/powerpoint/2010/main" val="986359583"/>
+        <p14:creationId xmlns:p14="http://schemas.microsoft.com/office/powerpoint/2010/main" val="1803760681"/>
       </p:ext>
     </p:extLst>
   </p:cSld>
@@ -19249,11 +19401,11 @@
             <a:pPr algn="ctr"/>
             <a:r>
               <a:rPr lang="en-US" sz="5200" dirty="0"/>
-              <a:t>Black Death </a:t>
-            </a:r>
-            <a:r>
-              <a:rPr lang="en-US" sz="3600" dirty="0"/>
-              <a:t>(1347)</a:t>
+              <a:t>Plague of Justinian </a:t>
+            </a:r>
+            <a:r>
+              <a:rPr lang="en-US" sz="3200" dirty="0"/>
+              <a:t>( 541)</a:t>
             </a:r>
             <a:r>
               <a:rPr lang="en-US" sz="5200" dirty="0"/>
@@ -19272,7 +19424,7 @@
             <a:pPr algn="ctr"/>
             <a:r>
               <a:rPr lang="en-US" sz="6600" b="1" dirty="0"/>
-              <a:t>1 out of every 2 </a:t>
+              <a:t>1 out of every 4 </a:t>
             </a:r>
           </a:p>
           <a:p>
@@ -19287,7 +19439,7 @@
     </p:spTree>
     <p:extLst>
       <p:ext uri="{BB962C8B-B14F-4D97-AF65-F5344CB8AC3E}">
-        <p14:creationId xmlns:p14="http://schemas.microsoft.com/office/powerpoint/2010/main" val="139684214"/>
+        <p14:creationId xmlns:p14="http://schemas.microsoft.com/office/powerpoint/2010/main" val="3977944331"/>
       </p:ext>
     </p:extLst>
   </p:cSld>
@@ -19348,11 +19500,11 @@
             <a:pPr algn="ctr"/>
             <a:r>
               <a:rPr lang="en-US" sz="5200" dirty="0"/>
-              <a:t>New World smallpox </a:t>
+              <a:t>Black Death </a:t>
             </a:r>
             <a:r>
               <a:rPr lang="en-US" sz="3600" dirty="0"/>
-              <a:t>(1520)</a:t>
+              <a:t>(1347)</a:t>
             </a:r>
             <a:r>
               <a:rPr lang="en-US" sz="5200" dirty="0"/>
@@ -19371,7 +19523,7 @@
             <a:pPr algn="ctr"/>
             <a:r>
               <a:rPr lang="en-US" sz="6600" b="1" dirty="0"/>
-              <a:t>9 out of 10 </a:t>
+              <a:t>1 out of every 2 </a:t>
             </a:r>
           </a:p>
           <a:p>
@@ -19386,7 +19538,7 @@
     </p:spTree>
     <p:extLst>
       <p:ext uri="{BB962C8B-B14F-4D97-AF65-F5344CB8AC3E}">
-        <p14:creationId xmlns:p14="http://schemas.microsoft.com/office/powerpoint/2010/main" val="4008228140"/>
+        <p14:creationId xmlns:p14="http://schemas.microsoft.com/office/powerpoint/2010/main" val="139684214"/>
       </p:ext>
     </p:extLst>
   </p:cSld>
@@ -19440,6 +19592,105 @@
         </p:spPr>
         <p:txBody>
           <a:bodyPr wrap="square" anchor="ctr">
+            <a:normAutofit/>
+          </a:bodyPr>
+          <a:lstStyle/>
+          <a:p>
+            <a:pPr algn="ctr"/>
+            <a:r>
+              <a:rPr lang="en-US" sz="5200" dirty="0"/>
+              <a:t>New World smallpox </a:t>
+            </a:r>
+            <a:r>
+              <a:rPr lang="en-US" sz="3600" dirty="0"/>
+              <a:t>(1520)</a:t>
+            </a:r>
+            <a:r>
+              <a:rPr lang="en-US" sz="5200" dirty="0"/>
+              <a:t>:</a:t>
+            </a:r>
+            <a:br>
+              <a:rPr lang="en-US" sz="5200" dirty="0"/>
+            </a:br>
+            <a:r>
+              <a:rPr lang="en-US" sz="2400" dirty="0"/>
+              <a:t>it is estimated that:</a:t>
+            </a:r>
+            <a:endParaRPr lang="en-US" sz="5200" dirty="0"/>
+          </a:p>
+          <a:p>
+            <a:pPr algn="ctr"/>
+            <a:r>
+              <a:rPr lang="en-US" sz="6600" b="1" dirty="0"/>
+              <a:t>9 out of 10 </a:t>
+            </a:r>
+          </a:p>
+          <a:p>
+            <a:pPr algn="ctr"/>
+            <a:r>
+              <a:rPr lang="en-US" sz="5200" dirty="0"/>
+              <a:t>people perished.</a:t>
+            </a:r>
+          </a:p>
+        </p:txBody>
+      </p:sp>
+    </p:spTree>
+    <p:extLst>
+      <p:ext uri="{BB962C8B-B14F-4D97-AF65-F5344CB8AC3E}">
+        <p14:creationId xmlns:p14="http://schemas.microsoft.com/office/powerpoint/2010/main" val="4008228140"/>
+      </p:ext>
+    </p:extLst>
+  </p:cSld>
+  <p:clrMapOvr>
+    <a:masterClrMapping/>
+  </p:clrMapOvr>
+  <p:transition spd="slow" advClick="0" advTm="5000">
+    <p:fade thruBlk="1"/>
+  </p:transition>
+</p:sld>
+</file>
+
+<file path=ppt/slides/slide33.xml><?xml version="1.0" encoding="utf-8"?>
+<p:sld xmlns:a="http://schemas.openxmlformats.org/drawingml/2006/main" xmlns:r="http://schemas.openxmlformats.org/officeDocument/2006/relationships" xmlns:p="http://schemas.openxmlformats.org/presentationml/2006/main">
+  <p:cSld>
+    <p:spTree>
+      <p:nvGrpSpPr>
+        <p:cNvPr id="1" name=""/>
+        <p:cNvGrpSpPr/>
+        <p:nvPr/>
+      </p:nvGrpSpPr>
+      <p:grpSpPr>
+        <a:xfrm>
+          <a:off x="0" y="0"/>
+          <a:ext cx="0" cy="0"/>
+          <a:chOff x="0" y="0"/>
+          <a:chExt cx="0" cy="0"/>
+        </a:xfrm>
+      </p:grpSpPr>
+      <p:sp>
+        <p:nvSpPr>
+          <p:cNvPr id="3" name="TextBox 2">
+            <a:extLst>
+              <a:ext uri="{FF2B5EF4-FFF2-40B4-BE49-F238E27FC236}">
+                <a16:creationId xmlns:a16="http://schemas.microsoft.com/office/drawing/2014/main" id="{E9BCD9FD-98E7-4688-AABB-18382A5D765E}"/>
+              </a:ext>
+            </a:extLst>
+          </p:cNvPr>
+          <p:cNvSpPr txBox="1"/>
+          <p:nvPr/>
+        </p:nvSpPr>
+        <p:spPr>
+          <a:xfrm>
+            <a:off x="0" y="0"/>
+            <a:ext cx="7315199" cy="4572000"/>
+          </a:xfrm>
+          <a:prstGeom prst="rect">
+            <a:avLst/>
+          </a:prstGeom>
+          <a:noFill/>
+        </p:spPr>
+        <p:txBody>
+          <a:bodyPr wrap="square" anchor="ctr">
             <a:normAutofit fontScale="92500" lnSpcReduction="20000"/>
           </a:bodyPr>
           <a:lstStyle/>
@@ -19492,7 +19743,7 @@
 </p:sld>
 </file>
 
-<file path=ppt/slides/slide33.xml><?xml version="1.0" encoding="utf-8"?>
+<file path=ppt/slides/slide34.xml><?xml version="1.0" encoding="utf-8"?>
 <p:sld xmlns:a="http://schemas.openxmlformats.org/drawingml/2006/main" xmlns:r="http://schemas.openxmlformats.org/officeDocument/2006/relationships" xmlns:p="http://schemas.openxmlformats.org/presentationml/2006/main">
   <p:cSld>
     <p:spTree>
@@ -19524,14 +19775,14 @@
           <p:nvPr>
             <p:extLst>
               <p:ext uri="{D42A27DB-BD31-4B8C-83A1-F6EECF244321}">
-                <p14:modId xmlns:p14="http://schemas.microsoft.com/office/powerpoint/2010/main" val="2917794334"/>
+                <p14:modId xmlns:p14="http://schemas.microsoft.com/office/powerpoint/2010/main" val="1518638656"/>
               </p:ext>
             </p:extLst>
           </p:nvPr>
         </p:nvGraphicFramePr>
         <p:xfrm>
-          <a:off x="126206" y="421481"/>
-          <a:ext cx="7062788" cy="3729038"/>
+          <a:off x="0" y="0"/>
+          <a:ext cx="7315200" cy="4572000"/>
         </p:xfrm>
         <a:graphic>
           <a:graphicData uri="http://schemas.openxmlformats.org/drawingml/2006/chart">
@@ -19555,7 +19806,7 @@
 </p:sld>
 </file>
 
-<file path=ppt/slides/slide34.xml><?xml version="1.0" encoding="utf-8"?>
+<file path=ppt/slides/slide35.xml><?xml version="1.0" encoding="utf-8"?>
 <p:sld xmlns:a="http://schemas.openxmlformats.org/drawingml/2006/main" xmlns:r="http://schemas.openxmlformats.org/officeDocument/2006/relationships" xmlns:p="http://schemas.openxmlformats.org/presentationml/2006/main">
   <p:cSld>
     <p:spTree>
@@ -19648,7 +19899,7 @@
 </p:sld>
 </file>
 
-<file path=ppt/slides/slide35.xml><?xml version="1.0" encoding="utf-8"?>
+<file path=ppt/slides/slide36.xml><?xml version="1.0" encoding="utf-8"?>
 <p:sld xmlns:a="http://schemas.openxmlformats.org/drawingml/2006/main" xmlns:r="http://schemas.openxmlformats.org/officeDocument/2006/relationships" xmlns:p="http://schemas.openxmlformats.org/presentationml/2006/main">
   <p:cSld>
     <p:spTree>
@@ -19711,7 +19962,7 @@
 </p:sld>
 </file>
 
-<file path=ppt/slides/slide36.xml><?xml version="1.0" encoding="utf-8"?>
+<file path=ppt/slides/slide37.xml><?xml version="1.0" encoding="utf-8"?>
 <p:sld xmlns:a="http://schemas.openxmlformats.org/drawingml/2006/main" xmlns:r="http://schemas.openxmlformats.org/officeDocument/2006/relationships" xmlns:p="http://schemas.openxmlformats.org/presentationml/2006/main">
   <p:cSld>
     <p:spTree>
@@ -19816,7 +20067,7 @@
 </p:sld>
 </file>
 
-<file path=ppt/slides/slide37.xml><?xml version="1.0" encoding="utf-8"?>
+<file path=ppt/slides/slide38.xml><?xml version="1.0" encoding="utf-8"?>
 <p:sld xmlns:a="http://schemas.openxmlformats.org/drawingml/2006/main" xmlns:r="http://schemas.openxmlformats.org/officeDocument/2006/relationships" xmlns:p="http://schemas.openxmlformats.org/presentationml/2006/main">
   <p:cSld>
     <p:spTree>
@@ -19879,7 +20130,7 @@
 </p:sld>
 </file>
 
-<file path=ppt/slides/slide38.xml><?xml version="1.0" encoding="utf-8"?>
+<file path=ppt/slides/slide39.xml><?xml version="1.0" encoding="utf-8"?>
 <p:sld xmlns:a="http://schemas.openxmlformats.org/drawingml/2006/main" xmlns:r="http://schemas.openxmlformats.org/officeDocument/2006/relationships" xmlns:p="http://schemas.openxmlformats.org/presentationml/2006/main">
   <p:cSld>
     <p:spTree>
@@ -19979,168 +20230,6 @@
     <p:extLst>
       <p:ext uri="{BB962C8B-B14F-4D97-AF65-F5344CB8AC3E}">
         <p14:creationId xmlns:p14="http://schemas.microsoft.com/office/powerpoint/2010/main" val="3835360091"/>
-      </p:ext>
-    </p:extLst>
-  </p:cSld>
-  <p:clrMapOvr>
-    <a:masterClrMapping/>
-  </p:clrMapOvr>
-  <p:transition spd="slow" advClick="0" advTm="5000">
-    <p:fade thruBlk="1"/>
-  </p:transition>
-</p:sld>
-</file>
-
-<file path=ppt/slides/slide39.xml><?xml version="1.0" encoding="utf-8"?>
-<p:sld xmlns:a="http://schemas.openxmlformats.org/drawingml/2006/main" xmlns:r="http://schemas.openxmlformats.org/officeDocument/2006/relationships" xmlns:p="http://schemas.openxmlformats.org/presentationml/2006/main">
-  <p:cSld>
-    <p:spTree>
-      <p:nvGrpSpPr>
-        <p:cNvPr id="1" name=""/>
-        <p:cNvGrpSpPr/>
-        <p:nvPr/>
-      </p:nvGrpSpPr>
-      <p:grpSpPr>
-        <a:xfrm>
-          <a:off x="0" y="0"/>
-          <a:ext cx="0" cy="0"/>
-          <a:chOff x="0" y="0"/>
-          <a:chExt cx="0" cy="0"/>
-        </a:xfrm>
-      </p:grpSpPr>
-      <p:sp>
-        <p:nvSpPr>
-          <p:cNvPr id="3" name="TextBox 2">
-            <a:extLst>
-              <a:ext uri="{FF2B5EF4-FFF2-40B4-BE49-F238E27FC236}">
-                <a16:creationId xmlns:a16="http://schemas.microsoft.com/office/drawing/2014/main" id="{E9BCD9FD-98E7-4688-AABB-18382A5D765E}"/>
-              </a:ext>
-            </a:extLst>
-          </p:cNvPr>
-          <p:cNvSpPr txBox="1"/>
-          <p:nvPr/>
-        </p:nvSpPr>
-        <p:spPr>
-          <a:xfrm>
-            <a:off x="0" y="0"/>
-            <a:ext cx="7315199" cy="4572000"/>
-          </a:xfrm>
-          <a:prstGeom prst="rect">
-            <a:avLst/>
-          </a:prstGeom>
-          <a:noFill/>
-        </p:spPr>
-        <p:txBody>
-          <a:bodyPr wrap="square" anchor="ctr">
-            <a:normAutofit/>
-          </a:bodyPr>
-          <a:lstStyle/>
-          <a:p>
-            <a:pPr algn="ctr"/>
-            <a:r>
-              <a:rPr lang="en-US" sz="3200" dirty="0">
-                <a:solidFill>
-                  <a:srgbClr val="FF0000"/>
-                </a:solidFill>
-              </a:rPr>
-              <a:t>*</a:t>
-            </a:r>
-            <a:r>
-              <a:rPr lang="en-US" sz="3200" dirty="0"/>
-              <a:t>VAERS Database</a:t>
-            </a:r>
-            <a:endParaRPr lang="en-US" sz="1900" dirty="0"/>
-          </a:p>
-          <a:p>
-            <a:pPr marL="571500" indent="-571500">
-              <a:buFont typeface="Arial" panose="020B0604020202020204" pitchFamily="34" charset="0"/>
-              <a:buChar char="•"/>
-            </a:pPr>
-            <a:r>
-              <a:rPr lang="en-US" sz="2400" dirty="0"/>
-              <a:t>The only ‘data’ we have to analyze in the US is from the CDC V</a:t>
-            </a:r>
-            <a:r>
-              <a:rPr lang="en-US" sz="1600" dirty="0"/>
-              <a:t>accine </a:t>
-            </a:r>
-            <a:r>
-              <a:rPr lang="en-US" sz="2400" dirty="0"/>
-              <a:t>A</a:t>
-            </a:r>
-            <a:r>
-              <a:rPr lang="en-US" sz="1600" dirty="0"/>
-              <a:t>dverse</a:t>
-            </a:r>
-            <a:r>
-              <a:rPr lang="en-US" sz="2400" dirty="0"/>
-              <a:t> E</a:t>
-            </a:r>
-            <a:r>
-              <a:rPr lang="en-US" sz="1600" dirty="0"/>
-              <a:t>ffect </a:t>
-            </a:r>
-            <a:r>
-              <a:rPr lang="en-US" sz="2400" dirty="0"/>
-              <a:t>R</a:t>
-            </a:r>
-            <a:r>
-              <a:rPr lang="en-US" sz="1600" dirty="0"/>
-              <a:t>eporting </a:t>
-            </a:r>
-            <a:r>
-              <a:rPr lang="en-US" sz="2400" dirty="0"/>
-              <a:t>S</a:t>
-            </a:r>
-            <a:r>
-              <a:rPr lang="en-US" sz="1600" dirty="0"/>
-              <a:t>ystem</a:t>
-            </a:r>
-            <a:r>
-              <a:rPr lang="en-US" sz="2400" dirty="0"/>
-              <a:t> (VAERS) Database  </a:t>
-            </a:r>
-            <a:r>
-              <a:rPr lang="en-US" sz="1200" dirty="0">
-                <a:hlinkClick r:id="rId2"/>
-              </a:rPr>
-              <a:t>https://www.openvaers.com/covid-data</a:t>
-            </a:r>
-            <a:endParaRPr lang="en-US" sz="1200" dirty="0"/>
-          </a:p>
-          <a:p>
-            <a:pPr marL="571500" indent="-571500">
-              <a:buFont typeface="Arial" panose="020B0604020202020204" pitchFamily="34" charset="0"/>
-              <a:buChar char="•"/>
-            </a:pPr>
-            <a:r>
-              <a:rPr lang="en-US" sz="2200" dirty="0"/>
-              <a:t>Although this is the best data we have, This data comes with a warning:</a:t>
-            </a:r>
-            <a:br>
-              <a:rPr lang="en-US" sz="1200" dirty="0"/>
-            </a:br>
-            <a:r>
-              <a:rPr lang="en-US" sz="1400" b="0" i="0" dirty="0">
-                <a:solidFill>
-                  <a:srgbClr val="777777"/>
-                </a:solidFill>
-                <a:effectLst/>
-                <a:latin typeface="Montserrat" panose="00000500000000000000" pitchFamily="2" charset="0"/>
-              </a:rPr>
-              <a:t>VAERS reports alone cannot be used to determine if a vaccine caused or contributed to an adverse event or illness. The reports may contain information that is incomplete, inaccurate, coincidental, or unverifiable. In large part, reports to VAERS are voluntary, which means they are subject to biases. This creates specific limitations on how the data can be used scientifically. Data from VAERS reports should always be interpreted with these limitations in mind.</a:t>
-            </a:r>
-            <a:endParaRPr lang="en-US" sz="1400" dirty="0"/>
-          </a:p>
-          <a:p>
-            <a:endParaRPr lang="en-US" sz="2400" dirty="0"/>
-          </a:p>
-        </p:txBody>
-      </p:sp>
-    </p:spTree>
-    <p:extLst>
-      <p:ext uri="{BB962C8B-B14F-4D97-AF65-F5344CB8AC3E}">
-        <p14:creationId xmlns:p14="http://schemas.microsoft.com/office/powerpoint/2010/main" val="2797554543"/>
       </p:ext>
     </p:extLst>
   </p:cSld>
@@ -20200,26 +20289,52 @@
           <a:p>
             <a:pPr algn="ctr"/>
             <a:r>
-              <a:rPr lang="en-US" sz="3600" dirty="0"/>
-              <a:t>Sadly,  CDC’s special reporting rules introduced for COVID may have significantly tainted any attempts at a ‘rational’ look at their data… But we’ll ignore this and try our best…</a:t>
-            </a:r>
-            <a:br>
-              <a:rPr lang="en-US" sz="4400" dirty="0"/>
-            </a:br>
-            <a:r>
-              <a:rPr lang="en-US" sz="1700" dirty="0">
-                <a:hlinkClick r:id="rId2"/>
+              <a:rPr lang="en-US" sz="5400" dirty="0"/>
+              <a:t>“COVID Deaths</a:t>
+            </a:r>
+            <a:r>
+              <a:rPr lang="en-US" sz="5400" dirty="0">
+                <a:solidFill>
+                  <a:srgbClr val="FF0000"/>
+                </a:solidFill>
               </a:rPr>
-              <a:t>https://jdfor2020.com/wp-content/uploads/2020/11/adf864_165a103206974fdbb14ada6bf8af1541.pdf</a:t>
-            </a:r>
-            <a:endParaRPr lang="en-US" sz="2800" dirty="0"/>
+              <a:t>*</a:t>
+            </a:r>
+            <a:r>
+              <a:rPr lang="en-US" sz="5400" dirty="0"/>
+              <a:t>”</a:t>
+            </a:r>
+          </a:p>
+          <a:p>
+            <a:pPr algn="ctr"/>
+            <a:r>
+              <a:rPr lang="en-US" sz="5400" dirty="0">
+                <a:solidFill>
+                  <a:srgbClr val="FF0000"/>
+                </a:solidFill>
+              </a:rPr>
+              <a:t>*</a:t>
+            </a:r>
+            <a:r>
+              <a:rPr lang="en-US" sz="3600" dirty="0">
+                <a:solidFill>
+                  <a:srgbClr val="FF0000"/>
+                </a:solidFill>
+              </a:rPr>
+              <a:t>What constitutes a ‘COVID Death’ is quite squishy….. And controversial</a:t>
+            </a:r>
+            <a:endParaRPr lang="en-US" sz="3600" dirty="0"/>
+          </a:p>
+          <a:p>
+            <a:pPr algn="ctr"/>
+            <a:endParaRPr lang="en-US" sz="5400" dirty="0"/>
           </a:p>
         </p:txBody>
       </p:sp>
     </p:spTree>
     <p:extLst>
       <p:ext uri="{BB962C8B-B14F-4D97-AF65-F5344CB8AC3E}">
-        <p14:creationId xmlns:p14="http://schemas.microsoft.com/office/powerpoint/2010/main" val="1428930035"/>
+        <p14:creationId xmlns:p14="http://schemas.microsoft.com/office/powerpoint/2010/main" val="986359583"/>
       </p:ext>
     </p:extLst>
   </p:cSld>
@@ -20273,6 +20388,168 @@
         </p:spPr>
         <p:txBody>
           <a:bodyPr wrap="square" anchor="ctr">
+            <a:normAutofit/>
+          </a:bodyPr>
+          <a:lstStyle/>
+          <a:p>
+            <a:pPr algn="ctr"/>
+            <a:r>
+              <a:rPr lang="en-US" sz="3200" dirty="0">
+                <a:solidFill>
+                  <a:srgbClr val="FF0000"/>
+                </a:solidFill>
+              </a:rPr>
+              <a:t>*</a:t>
+            </a:r>
+            <a:r>
+              <a:rPr lang="en-US" sz="3200" dirty="0"/>
+              <a:t>VAERS Database</a:t>
+            </a:r>
+            <a:endParaRPr lang="en-US" sz="1900" dirty="0"/>
+          </a:p>
+          <a:p>
+            <a:pPr marL="571500" indent="-571500">
+              <a:buFont typeface="Arial" panose="020B0604020202020204" pitchFamily="34" charset="0"/>
+              <a:buChar char="•"/>
+            </a:pPr>
+            <a:r>
+              <a:rPr lang="en-US" sz="2400" dirty="0"/>
+              <a:t>The only ‘data’ we have to analyze in the US is from the CDC V</a:t>
+            </a:r>
+            <a:r>
+              <a:rPr lang="en-US" sz="1600" dirty="0"/>
+              <a:t>accine </a:t>
+            </a:r>
+            <a:r>
+              <a:rPr lang="en-US" sz="2400" dirty="0"/>
+              <a:t>A</a:t>
+            </a:r>
+            <a:r>
+              <a:rPr lang="en-US" sz="1600" dirty="0"/>
+              <a:t>dverse</a:t>
+            </a:r>
+            <a:r>
+              <a:rPr lang="en-US" sz="2400" dirty="0"/>
+              <a:t> E</a:t>
+            </a:r>
+            <a:r>
+              <a:rPr lang="en-US" sz="1600" dirty="0"/>
+              <a:t>ffect </a:t>
+            </a:r>
+            <a:r>
+              <a:rPr lang="en-US" sz="2400" dirty="0"/>
+              <a:t>R</a:t>
+            </a:r>
+            <a:r>
+              <a:rPr lang="en-US" sz="1600" dirty="0"/>
+              <a:t>eporting </a:t>
+            </a:r>
+            <a:r>
+              <a:rPr lang="en-US" sz="2400" dirty="0"/>
+              <a:t>S</a:t>
+            </a:r>
+            <a:r>
+              <a:rPr lang="en-US" sz="1600" dirty="0"/>
+              <a:t>ystem</a:t>
+            </a:r>
+            <a:r>
+              <a:rPr lang="en-US" sz="2400" dirty="0"/>
+              <a:t> (VAERS) Database  </a:t>
+            </a:r>
+            <a:r>
+              <a:rPr lang="en-US" sz="1200" dirty="0">
+                <a:hlinkClick r:id="rId2"/>
+              </a:rPr>
+              <a:t>https://www.openvaers.com/covid-data</a:t>
+            </a:r>
+            <a:endParaRPr lang="en-US" sz="1200" dirty="0"/>
+          </a:p>
+          <a:p>
+            <a:pPr marL="571500" indent="-571500">
+              <a:buFont typeface="Arial" panose="020B0604020202020204" pitchFamily="34" charset="0"/>
+              <a:buChar char="•"/>
+            </a:pPr>
+            <a:r>
+              <a:rPr lang="en-US" sz="2200" dirty="0"/>
+              <a:t>Although this is the best data we have, This data comes with a warning:</a:t>
+            </a:r>
+            <a:br>
+              <a:rPr lang="en-US" sz="1200" dirty="0"/>
+            </a:br>
+            <a:r>
+              <a:rPr lang="en-US" sz="1400" b="0" i="0" dirty="0">
+                <a:solidFill>
+                  <a:srgbClr val="777777"/>
+                </a:solidFill>
+                <a:effectLst/>
+                <a:latin typeface="Montserrat" panose="00000500000000000000" pitchFamily="2" charset="0"/>
+              </a:rPr>
+              <a:t>VAERS reports alone cannot be used to determine if a vaccine caused or contributed to an adverse event or illness. The reports may contain information that is incomplete, inaccurate, coincidental, or unverifiable. In large part, reports to VAERS are voluntary, which means they are subject to biases. This creates specific limitations on how the data can be used scientifically. Data from VAERS reports should always be interpreted with these limitations in mind.</a:t>
+            </a:r>
+            <a:endParaRPr lang="en-US" sz="1400" dirty="0"/>
+          </a:p>
+          <a:p>
+            <a:endParaRPr lang="en-US" sz="2400" dirty="0"/>
+          </a:p>
+        </p:txBody>
+      </p:sp>
+    </p:spTree>
+    <p:extLst>
+      <p:ext uri="{BB962C8B-B14F-4D97-AF65-F5344CB8AC3E}">
+        <p14:creationId xmlns:p14="http://schemas.microsoft.com/office/powerpoint/2010/main" val="2797554543"/>
+      </p:ext>
+    </p:extLst>
+  </p:cSld>
+  <p:clrMapOvr>
+    <a:masterClrMapping/>
+  </p:clrMapOvr>
+  <p:transition spd="slow" advClick="0" advTm="5000">
+    <p:fade thruBlk="1"/>
+  </p:transition>
+</p:sld>
+</file>
+
+<file path=ppt/slides/slide41.xml><?xml version="1.0" encoding="utf-8"?>
+<p:sld xmlns:a="http://schemas.openxmlformats.org/drawingml/2006/main" xmlns:r="http://schemas.openxmlformats.org/officeDocument/2006/relationships" xmlns:p="http://schemas.openxmlformats.org/presentationml/2006/main">
+  <p:cSld>
+    <p:spTree>
+      <p:nvGrpSpPr>
+        <p:cNvPr id="1" name=""/>
+        <p:cNvGrpSpPr/>
+        <p:nvPr/>
+      </p:nvGrpSpPr>
+      <p:grpSpPr>
+        <a:xfrm>
+          <a:off x="0" y="0"/>
+          <a:ext cx="0" cy="0"/>
+          <a:chOff x="0" y="0"/>
+          <a:chExt cx="0" cy="0"/>
+        </a:xfrm>
+      </p:grpSpPr>
+      <p:sp>
+        <p:nvSpPr>
+          <p:cNvPr id="3" name="TextBox 2">
+            <a:extLst>
+              <a:ext uri="{FF2B5EF4-FFF2-40B4-BE49-F238E27FC236}">
+                <a16:creationId xmlns:a16="http://schemas.microsoft.com/office/drawing/2014/main" id="{E9BCD9FD-98E7-4688-AABB-18382A5D765E}"/>
+              </a:ext>
+            </a:extLst>
+          </p:cNvPr>
+          <p:cNvSpPr txBox="1"/>
+          <p:nvPr/>
+        </p:nvSpPr>
+        <p:spPr>
+          <a:xfrm>
+            <a:off x="0" y="0"/>
+            <a:ext cx="7315199" cy="4572000"/>
+          </a:xfrm>
+          <a:prstGeom prst="rect">
+            <a:avLst/>
+          </a:prstGeom>
+          <a:noFill/>
+        </p:spPr>
+        <p:txBody>
+          <a:bodyPr wrap="square" anchor="ctr">
             <a:normAutofit fontScale="92500" lnSpcReduction="20000"/>
           </a:bodyPr>
           <a:lstStyle/>
@@ -20466,7 +20743,7 @@
 </p:sld>
 </file>
 
-<file path=ppt/slides/slide41.xml><?xml version="1.0" encoding="utf-8"?>
+<file path=ppt/slides/slide42.xml><?xml version="1.0" encoding="utf-8"?>
 <p:sld xmlns:a="http://schemas.openxmlformats.org/drawingml/2006/main" xmlns:r="http://schemas.openxmlformats.org/officeDocument/2006/relationships" xmlns:p="http://schemas.openxmlformats.org/presentationml/2006/main">
   <p:cSld>
     <p:spTree>
@@ -20655,7 +20932,7 @@
 </p:sld>
 </file>
 
-<file path=ppt/slides/slide42.xml><?xml version="1.0" encoding="utf-8"?>
+<file path=ppt/slides/slide43.xml><?xml version="1.0" encoding="utf-8"?>
 <p:sld xmlns:a="http://schemas.openxmlformats.org/drawingml/2006/main" xmlns:r="http://schemas.openxmlformats.org/officeDocument/2006/relationships" xmlns:p="http://schemas.openxmlformats.org/presentationml/2006/main">
   <p:cSld>
     <p:spTree>
@@ -20800,7 +21077,7 @@
 </p:sld>
 </file>
 
-<file path=ppt/slides/slide43.xml><?xml version="1.0" encoding="utf-8"?>
+<file path=ppt/slides/slide44.xml><?xml version="1.0" encoding="utf-8"?>
 <p:sld xmlns:a="http://schemas.openxmlformats.org/drawingml/2006/main" xmlns:r="http://schemas.openxmlformats.org/officeDocument/2006/relationships" xmlns:p="http://schemas.openxmlformats.org/presentationml/2006/main">
   <p:cSld>
     <p:spTree>
@@ -20969,7 +21246,7 @@
 </p:sld>
 </file>
 
-<file path=ppt/slides/slide44.xml><?xml version="1.0" encoding="utf-8"?>
+<file path=ppt/slides/slide45.xml><?xml version="1.0" encoding="utf-8"?>
 <p:sld xmlns:a="http://schemas.openxmlformats.org/drawingml/2006/main" xmlns:r="http://schemas.openxmlformats.org/officeDocument/2006/relationships" xmlns:p="http://schemas.openxmlformats.org/presentationml/2006/main">
   <p:cSld>
     <p:spTree>
@@ -21064,7 +21341,7 @@
 </p:sld>
 </file>
 
-<file path=ppt/slides/slide45.xml><?xml version="1.0" encoding="utf-8"?>
+<file path=ppt/slides/slide46.xml><?xml version="1.0" encoding="utf-8"?>
 <p:sld xmlns:a="http://schemas.openxmlformats.org/drawingml/2006/main" xmlns:r="http://schemas.openxmlformats.org/officeDocument/2006/relationships" xmlns:p="http://schemas.openxmlformats.org/presentationml/2006/main">
   <p:cSld>
     <p:spTree>
@@ -21209,7 +21486,7 @@
 </p:sld>
 </file>
 
-<file path=ppt/slides/slide46.xml><?xml version="1.0" encoding="utf-8"?>
+<file path=ppt/slides/slide47.xml><?xml version="1.0" encoding="utf-8"?>
 <p:sld xmlns:a="http://schemas.openxmlformats.org/drawingml/2006/main" xmlns:r="http://schemas.openxmlformats.org/officeDocument/2006/relationships" xmlns:p="http://schemas.openxmlformats.org/presentationml/2006/main">
   <p:cSld>
     <p:spTree>
@@ -21413,7 +21690,7 @@
 </p:sld>
 </file>
 
-<file path=ppt/slides/slide47.xml><?xml version="1.0" encoding="utf-8"?>
+<file path=ppt/slides/slide48.xml><?xml version="1.0" encoding="utf-8"?>
 <p:sld xmlns:a="http://schemas.openxmlformats.org/drawingml/2006/main" xmlns:r="http://schemas.openxmlformats.org/officeDocument/2006/relationships" xmlns:p="http://schemas.openxmlformats.org/presentationml/2006/main">
   <p:cSld>
     <p:spTree>
@@ -21641,7 +21918,7 @@
 </p:sld>
 </file>
 
-<file path=ppt/slides/slide48.xml><?xml version="1.0" encoding="utf-8"?>
+<file path=ppt/slides/slide49.xml><?xml version="1.0" encoding="utf-8"?>
 <p:sld xmlns:a="http://schemas.openxmlformats.org/drawingml/2006/main" xmlns:r="http://schemas.openxmlformats.org/officeDocument/2006/relationships" xmlns:p="http://schemas.openxmlformats.org/presentationml/2006/main">
   <p:cSld>
     <p:spTree>
@@ -21833,7 +22110,86 @@
 </p:sld>
 </file>
 
-<file path=ppt/slides/slide49.xml><?xml version="1.0" encoding="utf-8"?>
+<file path=ppt/slides/slide5.xml><?xml version="1.0" encoding="utf-8"?>
+<p:sld xmlns:a="http://schemas.openxmlformats.org/drawingml/2006/main" xmlns:r="http://schemas.openxmlformats.org/officeDocument/2006/relationships" xmlns:p="http://schemas.openxmlformats.org/presentationml/2006/main">
+  <p:cSld>
+    <p:spTree>
+      <p:nvGrpSpPr>
+        <p:cNvPr id="1" name=""/>
+        <p:cNvGrpSpPr/>
+        <p:nvPr/>
+      </p:nvGrpSpPr>
+      <p:grpSpPr>
+        <a:xfrm>
+          <a:off x="0" y="0"/>
+          <a:ext cx="0" cy="0"/>
+          <a:chOff x="0" y="0"/>
+          <a:chExt cx="0" cy="0"/>
+        </a:xfrm>
+      </p:grpSpPr>
+      <p:sp>
+        <p:nvSpPr>
+          <p:cNvPr id="3" name="TextBox 2">
+            <a:extLst>
+              <a:ext uri="{FF2B5EF4-FFF2-40B4-BE49-F238E27FC236}">
+                <a16:creationId xmlns:a16="http://schemas.microsoft.com/office/drawing/2014/main" id="{E9BCD9FD-98E7-4688-AABB-18382A5D765E}"/>
+              </a:ext>
+            </a:extLst>
+          </p:cNvPr>
+          <p:cNvSpPr txBox="1"/>
+          <p:nvPr/>
+        </p:nvSpPr>
+        <p:spPr>
+          <a:xfrm>
+            <a:off x="0" y="0"/>
+            <a:ext cx="7315199" cy="4572000"/>
+          </a:xfrm>
+          <a:prstGeom prst="rect">
+            <a:avLst/>
+          </a:prstGeom>
+          <a:noFill/>
+        </p:spPr>
+        <p:txBody>
+          <a:bodyPr wrap="square" anchor="ctr">
+            <a:normAutofit/>
+          </a:bodyPr>
+          <a:lstStyle/>
+          <a:p>
+            <a:pPr algn="ctr"/>
+            <a:r>
+              <a:rPr lang="en-US" sz="3600" dirty="0"/>
+              <a:t>Sadly,  CDC’s special reporting rules introduced for COVID may have significantly tainted any attempts at a ‘rational’ look at their data… But we’ll ignore this and try our best…</a:t>
+            </a:r>
+            <a:br>
+              <a:rPr lang="en-US" sz="4400" dirty="0"/>
+            </a:br>
+            <a:r>
+              <a:rPr lang="en-US" sz="1700" dirty="0">
+                <a:hlinkClick r:id="rId2"/>
+              </a:rPr>
+              <a:t>https://jdfor2020.com/wp-content/uploads/2020/11/adf864_165a103206974fdbb14ada6bf8af1541.pdf</a:t>
+            </a:r>
+            <a:endParaRPr lang="en-US" sz="2800" dirty="0"/>
+          </a:p>
+        </p:txBody>
+      </p:sp>
+    </p:spTree>
+    <p:extLst>
+      <p:ext uri="{BB962C8B-B14F-4D97-AF65-F5344CB8AC3E}">
+        <p14:creationId xmlns:p14="http://schemas.microsoft.com/office/powerpoint/2010/main" val="1428930035"/>
+      </p:ext>
+    </p:extLst>
+  </p:cSld>
+  <p:clrMapOvr>
+    <a:masterClrMapping/>
+  </p:clrMapOvr>
+  <p:transition spd="slow" advClick="0" advTm="5000">
+    <p:fade thruBlk="1"/>
+  </p:transition>
+</p:sld>
+</file>
+
+<file path=ppt/slides/slide50.xml><?xml version="1.0" encoding="utf-8"?>
 <p:sld xmlns:a="http://schemas.openxmlformats.org/drawingml/2006/main" xmlns:r="http://schemas.openxmlformats.org/officeDocument/2006/relationships" xmlns:p="http://schemas.openxmlformats.org/presentationml/2006/main">
   <p:cSld>
     <p:spTree>
@@ -21978,7 +22334,7 @@
 </p:sld>
 </file>
 
-<file path=ppt/slides/slide5.xml><?xml version="1.0" encoding="utf-8"?>
+<file path=ppt/slides/slide51.xml><?xml version="1.0" encoding="utf-8"?>
 <p:sld xmlns:a="http://schemas.openxmlformats.org/drawingml/2006/main" xmlns:r="http://schemas.openxmlformats.org/officeDocument/2006/relationships" xmlns:p="http://schemas.openxmlformats.org/presentationml/2006/main">
   <p:cSld>
     <p:spTree>
@@ -22024,168 +22380,6 @@
           <a:lstStyle/>
           <a:p>
             <a:pPr algn="ctr"/>
-            <a:r>
-              <a:rPr lang="en-US" sz="3600" u="sng" dirty="0"/>
-              <a:t>The CDC now reports two different </a:t>
-            </a:r>
-            <a:br>
-              <a:rPr lang="en-US" sz="3600" u="sng" dirty="0"/>
-            </a:br>
-            <a:r>
-              <a:rPr lang="en-US" sz="3600" u="sng" dirty="0"/>
-              <a:t>“COVID Death” numbers:</a:t>
-            </a:r>
-            <a:br>
-              <a:rPr lang="en-US" sz="3600" u="sng" dirty="0"/>
-            </a:br>
-            <a:br>
-              <a:rPr lang="en-US" sz="3200" dirty="0"/>
-            </a:br>
-            <a:r>
-              <a:rPr lang="en-US" sz="3200" dirty="0">
-                <a:solidFill>
-                  <a:srgbClr val="FF0000"/>
-                </a:solidFill>
-              </a:rPr>
-              <a:t>1) COVID-19 (Multiple Causes of Death)	</a:t>
-            </a:r>
-            <a:br>
-              <a:rPr lang="en-US" sz="3200" dirty="0">
-                <a:solidFill>
-                  <a:srgbClr val="FF0000"/>
-                </a:solidFill>
-              </a:rPr>
-            </a:br>
-            <a:r>
-              <a:rPr lang="en-US" sz="3200" dirty="0"/>
-              <a:t>(Died </a:t>
-            </a:r>
-            <a:r>
-              <a:rPr lang="en-US" sz="3200" b="1" u="sng" dirty="0"/>
-              <a:t>with</a:t>
-            </a:r>
-            <a:r>
-              <a:rPr lang="en-US" sz="3200" dirty="0"/>
-              <a:t> COVID)</a:t>
-            </a:r>
-            <a:br>
-              <a:rPr lang="en-US" sz="3200" dirty="0"/>
-            </a:br>
-            <a:br>
-              <a:rPr lang="en-US" sz="3200" dirty="0">
-                <a:solidFill>
-                  <a:srgbClr val="FF0000"/>
-                </a:solidFill>
-              </a:rPr>
-            </a:br>
-            <a:r>
-              <a:rPr lang="en-US" sz="3200" dirty="0">
-                <a:solidFill>
-                  <a:srgbClr val="FF0000"/>
-                </a:solidFill>
-              </a:rPr>
-              <a:t>2) COVID-19 (</a:t>
-            </a:r>
-            <a:r>
-              <a:rPr lang="en-US" sz="3200" b="1" dirty="0">
-                <a:solidFill>
-                  <a:srgbClr val="FF0000"/>
-                </a:solidFill>
-              </a:rPr>
-              <a:t>Underlying Cause </a:t>
-            </a:r>
-            <a:r>
-              <a:rPr lang="en-US" sz="3200" dirty="0">
-                <a:solidFill>
-                  <a:srgbClr val="FF0000"/>
-                </a:solidFill>
-              </a:rPr>
-              <a:t>of Death)</a:t>
-            </a:r>
-          </a:p>
-          <a:p>
-            <a:pPr algn="ctr"/>
-            <a:r>
-              <a:rPr lang="en-US" sz="3200" dirty="0"/>
-              <a:t>(Death “</a:t>
-            </a:r>
-            <a:r>
-              <a:rPr lang="en-US" sz="3200" b="1" u="sng" dirty="0"/>
-              <a:t>caused”</a:t>
-            </a:r>
-            <a:r>
-              <a:rPr lang="en-US" sz="3200" b="1" dirty="0"/>
-              <a:t> </a:t>
-            </a:r>
-            <a:r>
-              <a:rPr lang="en-US" sz="3200" dirty="0"/>
-              <a:t>by COVID)</a:t>
-            </a:r>
-          </a:p>
-        </p:txBody>
-      </p:sp>
-    </p:spTree>
-    <p:extLst>
-      <p:ext uri="{BB962C8B-B14F-4D97-AF65-F5344CB8AC3E}">
-        <p14:creationId xmlns:p14="http://schemas.microsoft.com/office/powerpoint/2010/main" val="694408313"/>
-      </p:ext>
-    </p:extLst>
-  </p:cSld>
-  <p:clrMapOvr>
-    <a:masterClrMapping/>
-  </p:clrMapOvr>
-  <p:transition spd="slow" advClick="0" advTm="5000">
-    <p:fade thruBlk="1"/>
-  </p:transition>
-</p:sld>
-</file>
-
-<file path=ppt/slides/slide50.xml><?xml version="1.0" encoding="utf-8"?>
-<p:sld xmlns:a="http://schemas.openxmlformats.org/drawingml/2006/main" xmlns:r="http://schemas.openxmlformats.org/officeDocument/2006/relationships" xmlns:p="http://schemas.openxmlformats.org/presentationml/2006/main">
-  <p:cSld>
-    <p:spTree>
-      <p:nvGrpSpPr>
-        <p:cNvPr id="1" name=""/>
-        <p:cNvGrpSpPr/>
-        <p:nvPr/>
-      </p:nvGrpSpPr>
-      <p:grpSpPr>
-        <a:xfrm>
-          <a:off x="0" y="0"/>
-          <a:ext cx="0" cy="0"/>
-          <a:chOff x="0" y="0"/>
-          <a:chExt cx="0" cy="0"/>
-        </a:xfrm>
-      </p:grpSpPr>
-      <p:sp>
-        <p:nvSpPr>
-          <p:cNvPr id="3" name="TextBox 2">
-            <a:extLst>
-              <a:ext uri="{FF2B5EF4-FFF2-40B4-BE49-F238E27FC236}">
-                <a16:creationId xmlns:a16="http://schemas.microsoft.com/office/drawing/2014/main" id="{E9BCD9FD-98E7-4688-AABB-18382A5D765E}"/>
-              </a:ext>
-            </a:extLst>
-          </p:cNvPr>
-          <p:cNvSpPr txBox="1"/>
-          <p:nvPr/>
-        </p:nvSpPr>
-        <p:spPr>
-          <a:xfrm>
-            <a:off x="0" y="0"/>
-            <a:ext cx="7315199" cy="4572000"/>
-          </a:xfrm>
-          <a:prstGeom prst="rect">
-            <a:avLst/>
-          </a:prstGeom>
-          <a:noFill/>
-        </p:spPr>
-        <p:txBody>
-          <a:bodyPr wrap="square" anchor="ctr">
-            <a:normAutofit/>
-          </a:bodyPr>
-          <a:lstStyle/>
-          <a:p>
-            <a:pPr algn="ctr"/>
             <a:endParaRPr lang="en-US" sz="2400" dirty="0"/>
           </a:p>
         </p:txBody>
@@ -22300,7 +22494,7 @@
 </p:sld>
 </file>
 
-<file path=ppt/slides/slide51.xml><?xml version="1.0" encoding="utf-8"?>
+<file path=ppt/slides/slide52.xml><?xml version="1.0" encoding="utf-8"?>
 <p:sld xmlns:a="http://schemas.openxmlformats.org/drawingml/2006/main" xmlns:r="http://schemas.openxmlformats.org/officeDocument/2006/relationships" xmlns:p="http://schemas.openxmlformats.org/presentationml/2006/main">
   <p:cSld>
     <p:spTree>
@@ -22446,7 +22640,7 @@
             </a:r>
             <a:r>
               <a:rPr lang="en-US" sz="2400" u="sng" dirty="0"/>
-              <a:t>check the data</a:t>
+              <a:t>verify the data &amp; calculations</a:t>
             </a:r>
             <a:r>
               <a:rPr lang="en-US" sz="2400" dirty="0"/>
@@ -22471,6 +22665,153 @@
     <p:extLst>
       <p:ext uri="{BB962C8B-B14F-4D97-AF65-F5344CB8AC3E}">
         <p14:creationId xmlns:p14="http://schemas.microsoft.com/office/powerpoint/2010/main" val="3781722942"/>
+      </p:ext>
+    </p:extLst>
+  </p:cSld>
+  <p:clrMapOvr>
+    <a:masterClrMapping/>
+  </p:clrMapOvr>
+  <p:transition spd="slow" advClick="0" advTm="5000">
+    <p:fade thruBlk="1"/>
+  </p:transition>
+</p:sld>
+</file>
+
+<file path=ppt/slides/slide53.xml><?xml version="1.0" encoding="utf-8"?>
+<p:sld xmlns:a="http://schemas.openxmlformats.org/drawingml/2006/main" xmlns:r="http://schemas.openxmlformats.org/officeDocument/2006/relationships" xmlns:p="http://schemas.openxmlformats.org/presentationml/2006/main">
+  <p:cSld>
+    <p:spTree>
+      <p:nvGrpSpPr>
+        <p:cNvPr id="1" name=""/>
+        <p:cNvGrpSpPr/>
+        <p:nvPr/>
+      </p:nvGrpSpPr>
+      <p:grpSpPr>
+        <a:xfrm>
+          <a:off x="0" y="0"/>
+          <a:ext cx="0" cy="0"/>
+          <a:chOff x="0" y="0"/>
+          <a:chExt cx="0" cy="0"/>
+        </a:xfrm>
+      </p:grpSpPr>
+      <p:sp>
+        <p:nvSpPr>
+          <p:cNvPr id="3" name="TextBox 2">
+            <a:extLst>
+              <a:ext uri="{FF2B5EF4-FFF2-40B4-BE49-F238E27FC236}">
+                <a16:creationId xmlns:a16="http://schemas.microsoft.com/office/drawing/2014/main" id="{E9BCD9FD-98E7-4688-AABB-18382A5D765E}"/>
+              </a:ext>
+            </a:extLst>
+          </p:cNvPr>
+          <p:cNvSpPr txBox="1"/>
+          <p:nvPr/>
+        </p:nvSpPr>
+        <p:spPr>
+          <a:xfrm>
+            <a:off x="90686" y="101416"/>
+            <a:ext cx="7224514" cy="4308872"/>
+          </a:xfrm>
+          <a:prstGeom prst="rect">
+            <a:avLst/>
+          </a:prstGeom>
+          <a:noFill/>
+        </p:spPr>
+        <p:txBody>
+          <a:bodyPr wrap="square">
+            <a:spAutoFit/>
+          </a:bodyPr>
+          <a:lstStyle/>
+          <a:p>
+            <a:pPr algn="ctr"/>
+            <a:r>
+              <a:rPr lang="en-US" sz="6600" dirty="0">
+                <a:solidFill>
+                  <a:srgbClr val="FF0000"/>
+                </a:solidFill>
+              </a:rPr>
+              <a:t>*</a:t>
+            </a:r>
+            <a:br>
+              <a:rPr lang="en-US" sz="6600" dirty="0"/>
+            </a:br>
+            <a:r>
+              <a:rPr lang="en-US" sz="2800" i="1" dirty="0"/>
+              <a:t>This is a work in progress…</a:t>
+            </a:r>
+            <a:br>
+              <a:rPr lang="en-US" sz="2800" i="1" dirty="0"/>
+            </a:br>
+            <a:r>
+              <a:rPr lang="en-US" sz="1600" i="1" dirty="0"/>
+              <a:t>Verify before you share…</a:t>
+            </a:r>
+          </a:p>
+          <a:p>
+            <a:pPr algn="ctr"/>
+            <a:endParaRPr lang="en-US" sz="2800" i="1" dirty="0"/>
+          </a:p>
+          <a:p>
+            <a:pPr algn="ctr"/>
+            <a:r>
+              <a:rPr lang="en-US" sz="1400" i="1" dirty="0"/>
+              <a:t>Raw Data &amp; Analysis used for this presentation are available here: </a:t>
+            </a:r>
+            <a:r>
+              <a:rPr lang="en-US" sz="1400" i="1" dirty="0">
+                <a:hlinkClick r:id="rId2"/>
+              </a:rPr>
+              <a:t>https://github.com/TruthData/CovidDeaths</a:t>
+            </a:r>
+            <a:br>
+              <a:rPr lang="en-US" sz="1400" i="1" dirty="0"/>
+            </a:br>
+            <a:br>
+              <a:rPr lang="en-US" sz="1400" i="1" dirty="0"/>
+            </a:br>
+            <a:r>
+              <a:rPr lang="en-US" sz="1400" i="1" dirty="0"/>
+              <a:t>Peer review, corrections and or feed back  is appreciated:</a:t>
+            </a:r>
+            <a:br>
+              <a:rPr lang="en-US" sz="1400" i="1" dirty="0"/>
+            </a:br>
+            <a:r>
+              <a:rPr lang="en-US" sz="1600" i="1" dirty="0">
+                <a:hlinkClick r:id="rId3"/>
+              </a:rPr>
+              <a:t>TruthData@protonmail.com</a:t>
+            </a:r>
+            <a:endParaRPr lang="en-US" sz="1600" i="1" dirty="0"/>
+          </a:p>
+          <a:p>
+            <a:pPr algn="ctr"/>
+            <a:endParaRPr lang="en-US" sz="1600" i="1" dirty="0"/>
+          </a:p>
+          <a:p>
+            <a:pPr algn="ctr"/>
+            <a:endParaRPr lang="en-US" sz="1600" i="1" dirty="0"/>
+          </a:p>
+          <a:p>
+            <a:pPr algn="ctr"/>
+            <a:r>
+              <a:rPr lang="en-US" sz="1600" i="1" dirty="0"/>
+              <a:t>You are free to use the data and/or slides as you see fit.</a:t>
+            </a:r>
+            <a:br>
+              <a:rPr lang="en-US" sz="1600" i="1" dirty="0"/>
+            </a:br>
+            <a:r>
+              <a:rPr lang="en-US" sz="1100" i="1" dirty="0"/>
+              <a:t>However, it is recommended to include the source link such that individuals can review the raw data.</a:t>
+            </a:r>
+            <a:endParaRPr lang="en-US" sz="1600" i="1" dirty="0"/>
+          </a:p>
+        </p:txBody>
+      </p:sp>
+    </p:spTree>
+    <p:extLst>
+      <p:ext uri="{BB962C8B-B14F-4D97-AF65-F5344CB8AC3E}">
+        <p14:creationId xmlns:p14="http://schemas.microsoft.com/office/powerpoint/2010/main" val="144725397"/>
       </p:ext>
     </p:extLst>
   </p:cSld>
@@ -22530,6 +22871,60 @@
           <a:p>
             <a:pPr algn="ctr"/>
             <a:r>
+              <a:rPr lang="en-US" sz="3600" u="sng" dirty="0"/>
+              <a:t>The CDC now reports two different </a:t>
+            </a:r>
+            <a:br>
+              <a:rPr lang="en-US" sz="3600" u="sng" dirty="0"/>
+            </a:br>
+            <a:r>
+              <a:rPr lang="en-US" sz="3600" u="sng" dirty="0"/>
+              <a:t>“COVID Death” numbers:</a:t>
+            </a:r>
+            <a:br>
+              <a:rPr lang="en-US" sz="3600" u="sng" dirty="0"/>
+            </a:br>
+            <a:br>
+              <a:rPr lang="en-US" sz="3200" dirty="0"/>
+            </a:br>
+            <a:r>
+              <a:rPr lang="en-US" sz="3200" dirty="0">
+                <a:solidFill>
+                  <a:srgbClr val="FF0000"/>
+                </a:solidFill>
+              </a:rPr>
+              <a:t>1) COVID-19 (Multiple Causes of Death)	</a:t>
+            </a:r>
+            <a:br>
+              <a:rPr lang="en-US" sz="3200" dirty="0">
+                <a:solidFill>
+                  <a:srgbClr val="FF0000"/>
+                </a:solidFill>
+              </a:rPr>
+            </a:br>
+            <a:r>
+              <a:rPr lang="en-US" sz="3200" dirty="0"/>
+              <a:t>(Died </a:t>
+            </a:r>
+            <a:r>
+              <a:rPr lang="en-US" sz="3200" b="1" u="sng" dirty="0"/>
+              <a:t>with</a:t>
+            </a:r>
+            <a:r>
+              <a:rPr lang="en-US" sz="3200" dirty="0"/>
+              <a:t> COVID)</a:t>
+            </a:r>
+            <a:br>
+              <a:rPr lang="en-US" sz="3200" dirty="0"/>
+            </a:br>
+            <a:br>
+              <a:rPr lang="en-US" sz="3200" dirty="0">
+                <a:solidFill>
+                  <a:srgbClr val="FF0000"/>
+                </a:solidFill>
+              </a:rPr>
+            </a:br>
+            <a:r>
               <a:rPr lang="en-US" sz="3200" dirty="0">
                 <a:solidFill>
                   <a:srgbClr val="FF0000"/>
@@ -22558,77 +22953,27 @@
             <a:pPr algn="ctr"/>
             <a:r>
               <a:rPr lang="en-US" sz="3200" dirty="0"/>
-              <a:t>(Death triggered / caused by COVID)</a:t>
-            </a:r>
-          </a:p>
-          <a:p>
-            <a:pPr algn="ctr"/>
-            <a:br>
+              <a:t>(Death “</a:t>
+            </a:r>
+            <a:r>
+              <a:rPr lang="en-US" sz="3200" b="1" u="sng" dirty="0"/>
+              <a:t>caused”</a:t>
+            </a:r>
+            <a:r>
+              <a:rPr lang="en-US" sz="3200" b="1" dirty="0"/>
+              <a:t> </a:t>
+            </a:r>
+            <a:r>
               <a:rPr lang="en-US" sz="3200" dirty="0"/>
-            </a:br>
-            <a:r>
-              <a:rPr lang="en-US" sz="3200" dirty="0"/>
-              <a:t>is the ‘most rational’ data set available and will be we used hereafter.</a:t>
-            </a:r>
-          </a:p>
-        </p:txBody>
-      </p:sp>
-      <p:sp>
-        <p:nvSpPr>
-          <p:cNvPr id="2" name="Rectangle: Rounded Corners 1">
-            <a:extLst>
-              <a:ext uri="{FF2B5EF4-FFF2-40B4-BE49-F238E27FC236}">
-                <a16:creationId xmlns:a16="http://schemas.microsoft.com/office/drawing/2014/main" id="{0F8ED77F-F202-471E-A818-53DADEB635CA}"/>
-              </a:ext>
-            </a:extLst>
-          </p:cNvPr>
-          <p:cNvSpPr/>
-          <p:nvPr/>
-        </p:nvSpPr>
-        <p:spPr>
-          <a:xfrm>
-            <a:off x="88900" y="800100"/>
-            <a:ext cx="7099300" cy="1485900"/>
-          </a:xfrm>
-          <a:prstGeom prst="roundRect">
-            <a:avLst/>
-          </a:prstGeom>
-          <a:noFill/>
-          <a:ln w="38100">
-            <a:solidFill>
-              <a:srgbClr val="00B050"/>
-            </a:solidFill>
-          </a:ln>
-        </p:spPr>
-        <p:style>
-          <a:lnRef idx="2">
-            <a:schemeClr val="accent1">
-              <a:shade val="50000"/>
-            </a:schemeClr>
-          </a:lnRef>
-          <a:fillRef idx="1">
-            <a:schemeClr val="accent1"/>
-          </a:fillRef>
-          <a:effectRef idx="0">
-            <a:schemeClr val="accent1"/>
-          </a:effectRef>
-          <a:fontRef idx="minor">
-            <a:schemeClr val="lt1"/>
-          </a:fontRef>
-        </p:style>
-        <p:txBody>
-          <a:bodyPr rtlCol="0" anchor="ctr"/>
-          <a:lstStyle/>
-          <a:p>
-            <a:pPr algn="ctr"/>
-            <a:endParaRPr lang="en-US"/>
+              <a:t>by COVID)</a:t>
+            </a:r>
           </a:p>
         </p:txBody>
       </p:sp>
     </p:spTree>
     <p:extLst>
       <p:ext uri="{BB962C8B-B14F-4D97-AF65-F5344CB8AC3E}">
-        <p14:creationId xmlns:p14="http://schemas.microsoft.com/office/powerpoint/2010/main" val="2094313746"/>
+        <p14:creationId xmlns:p14="http://schemas.microsoft.com/office/powerpoint/2010/main" val="694408313"/>
       </p:ext>
     </p:extLst>
   </p:cSld>
@@ -22688,27 +23033,105 @@
           <a:p>
             <a:pPr algn="ctr"/>
             <a:r>
-              <a:rPr lang="en-US" sz="6600" dirty="0"/>
-              <a:t>Apples-to-Apples</a:t>
-            </a:r>
+              <a:rPr lang="en-US" sz="3200" dirty="0">
+                <a:solidFill>
+                  <a:srgbClr val="FF0000"/>
+                </a:solidFill>
+              </a:rPr>
+              <a:t>2) COVID-19 (</a:t>
+            </a:r>
+            <a:r>
+              <a:rPr lang="en-US" sz="3200" b="1" dirty="0">
+                <a:solidFill>
+                  <a:srgbClr val="FF0000"/>
+                </a:solidFill>
+              </a:rPr>
+              <a:t>Underlying Cause </a:t>
+            </a:r>
+            <a:r>
+              <a:rPr lang="en-US" sz="3200" dirty="0">
+                <a:solidFill>
+                  <a:srgbClr val="FF0000"/>
+                </a:solidFill>
+              </a:rPr>
+              <a:t>of Death)</a:t>
+            </a:r>
+          </a:p>
+          <a:p>
+            <a:pPr algn="ctr"/>
+            <a:r>
+              <a:rPr lang="en-US" sz="3200" dirty="0"/>
+              <a:t>(Death triggered / caused by COVID)</a:t>
+            </a:r>
+          </a:p>
+          <a:p>
+            <a:pPr algn="ctr"/>
             <a:br>
-              <a:rPr lang="en-US" sz="6600" dirty="0"/>
+              <a:rPr lang="en-US" sz="3200" dirty="0"/>
             </a:br>
-            <a:endParaRPr lang="en-US" sz="6600" dirty="0"/>
-          </a:p>
+            <a:r>
+              <a:rPr lang="en-US" sz="3200" dirty="0"/>
+              <a:t>is the ‘most rational’ data set available and will be we used hereafter.</a:t>
+            </a:r>
+          </a:p>
+        </p:txBody>
+      </p:sp>
+      <p:sp>
+        <p:nvSpPr>
+          <p:cNvPr id="2" name="Rectangle: Rounded Corners 1">
+            <a:extLst>
+              <a:ext uri="{FF2B5EF4-FFF2-40B4-BE49-F238E27FC236}">
+                <a16:creationId xmlns:a16="http://schemas.microsoft.com/office/drawing/2014/main" id="{0F8ED77F-F202-471E-A818-53DADEB635CA}"/>
+              </a:ext>
+            </a:extLst>
+          </p:cNvPr>
+          <p:cNvSpPr/>
+          <p:nvPr/>
+        </p:nvSpPr>
+        <p:spPr>
+          <a:xfrm>
+            <a:off x="88900" y="800100"/>
+            <a:ext cx="7099300" cy="1485900"/>
+          </a:xfrm>
+          <a:prstGeom prst="roundRect">
+            <a:avLst/>
+          </a:prstGeom>
+          <a:noFill/>
+          <a:ln w="38100">
+            <a:solidFill>
+              <a:srgbClr val="00B050"/>
+            </a:solidFill>
+          </a:ln>
+        </p:spPr>
+        <p:style>
+          <a:lnRef idx="2">
+            <a:schemeClr val="accent1">
+              <a:shade val="50000"/>
+            </a:schemeClr>
+          </a:lnRef>
+          <a:fillRef idx="1">
+            <a:schemeClr val="accent1"/>
+          </a:fillRef>
+          <a:effectRef idx="0">
+            <a:schemeClr val="accent1"/>
+          </a:effectRef>
+          <a:fontRef idx="minor">
+            <a:schemeClr val="lt1"/>
+          </a:fontRef>
+        </p:style>
+        <p:txBody>
+          <a:bodyPr rtlCol="0" anchor="ctr"/>
+          <a:lstStyle/>
           <a:p>
             <a:pPr algn="ctr"/>
-            <a:r>
-              <a:rPr lang="en-US" sz="3200" dirty="0"/>
-              <a:t>Most COVID Death Data presented cannot be interpreted at face value because it  never is ….</a:t>
-            </a:r>
+            <a:endParaRPr lang="en-US"/>
           </a:p>
         </p:txBody>
       </p:sp>
     </p:spTree>
     <p:extLst>
       <p:ext uri="{BB962C8B-B14F-4D97-AF65-F5344CB8AC3E}">
-        <p14:creationId xmlns:p14="http://schemas.microsoft.com/office/powerpoint/2010/main" val="492381899"/>
+        <p14:creationId xmlns:p14="http://schemas.microsoft.com/office/powerpoint/2010/main" val="2094313746"/>
       </p:ext>
     </p:extLst>
   </p:cSld>
@@ -22768,29 +23191,19 @@
           <a:p>
             <a:pPr algn="ctr"/>
             <a:r>
-              <a:rPr lang="en-US" sz="8000" dirty="0"/>
-              <a:t>ANNUAL-IZED!</a:t>
-            </a:r>
+              <a:rPr lang="en-US" sz="6600" dirty="0"/>
+              <a:t>Apples-to-Apples</a:t>
+            </a:r>
+            <a:br>
+              <a:rPr lang="en-US" sz="6600" dirty="0"/>
+            </a:br>
+            <a:endParaRPr lang="en-US" sz="6600" dirty="0"/>
           </a:p>
           <a:p>
             <a:pPr algn="ctr"/>
             <a:r>
               <a:rPr lang="en-US" sz="3200" dirty="0"/>
-              <a:t>All disease mortality rate data </a:t>
-            </a:r>
-            <a:br>
-              <a:rPr lang="en-US" sz="3200" dirty="0"/>
-            </a:br>
-            <a:r>
-              <a:rPr lang="en-US" sz="3200" u="sng" dirty="0"/>
-              <a:t>other than COVID-19  </a:t>
-            </a:r>
-            <a:br>
-              <a:rPr lang="en-US" sz="3200" dirty="0"/>
-            </a:br>
-            <a:r>
-              <a:rPr lang="en-US" sz="3200" dirty="0"/>
-              <a:t>is presented for a given 1-year period.</a:t>
+              <a:t>Most COVID Death Data presented cannot be interpreted at face value because it  never is ….</a:t>
             </a:r>
           </a:p>
         </p:txBody>
@@ -22798,7 +23211,7 @@
     </p:spTree>
     <p:extLst>
       <p:ext uri="{BB962C8B-B14F-4D97-AF65-F5344CB8AC3E}">
-        <p14:creationId xmlns:p14="http://schemas.microsoft.com/office/powerpoint/2010/main" val="795036017"/>
+        <p14:creationId xmlns:p14="http://schemas.microsoft.com/office/powerpoint/2010/main" val="492381899"/>
       </p:ext>
     </p:extLst>
   </p:cSld>
@@ -22858,70 +23271,37 @@
           <a:p>
             <a:pPr algn="ctr"/>
             <a:r>
-              <a:rPr lang="en-US" sz="16600" dirty="0"/>
-              <a:t>666,440</a:t>
+              <a:rPr lang="en-US" sz="8000" dirty="0"/>
+              <a:t>ANNUAL-IZED!</a:t>
+            </a:r>
+          </a:p>
+          <a:p>
+            <a:pPr algn="ctr"/>
+            <a:r>
+              <a:rPr lang="en-US" sz="3200" dirty="0"/>
+              <a:t>All disease mortality rate data </a:t>
             </a:r>
             <a:br>
-              <a:rPr lang="en-US" sz="16600" dirty="0"/>
+              <a:rPr lang="en-US" sz="3200" dirty="0"/>
             </a:br>
             <a:r>
-              <a:rPr lang="en-US" sz="3600" dirty="0"/>
-              <a:t> “COVID Deaths</a:t>
-            </a:r>
-            <a:r>
-              <a:rPr lang="en-US" sz="3600" dirty="0">
-                <a:solidFill>
-                  <a:srgbClr val="FF0000"/>
-                </a:solidFill>
-              </a:rPr>
-              <a:t>*</a:t>
-            </a:r>
-            <a:r>
-              <a:rPr lang="en-US" sz="3600" dirty="0"/>
-              <a:t>” in the USA</a:t>
+              <a:rPr lang="en-US" sz="3200" u="sng" dirty="0"/>
+              <a:t>other than COVID-19  </a:t>
             </a:r>
             <a:br>
-              <a:rPr lang="en-US" sz="3600" dirty="0"/>
+              <a:rPr lang="en-US" sz="3200" dirty="0"/>
             </a:br>
             <a:r>
-              <a:rPr lang="en-US" sz="4000" u="sng" dirty="0"/>
-              <a:t>since the start of the pandemic</a:t>
-            </a:r>
-            <a:br>
-              <a:rPr lang="en-US" sz="4000" u="sng" dirty="0"/>
-            </a:br>
-            <a:r>
-              <a:rPr lang="en-US" dirty="0"/>
-              <a:t>[as of 9/17/2021]</a:t>
-            </a:r>
-            <a:br>
-              <a:rPr lang="en-US" dirty="0"/>
-            </a:br>
-            <a:r>
-              <a:rPr lang="en-US" sz="1800" b="0" i="0" u="none" strike="noStrike" dirty="0">
-                <a:solidFill>
-                  <a:srgbClr val="000000"/>
-                </a:solidFill>
-                <a:effectLst/>
-                <a:latin typeface="Calibri" panose="020F0502020204030204" pitchFamily="34" charset="0"/>
-                <a:hlinkClick r:id="rId2"/>
-              </a:rPr>
-              <a:t>https://covid.cdc.gov/covid-data-tracker/#datatracker-home</a:t>
-            </a:r>
-            <a:endParaRPr lang="en-US" sz="1800" b="0" i="0" u="none" strike="noStrike" dirty="0">
-              <a:solidFill>
-                <a:srgbClr val="000000"/>
-              </a:solidFill>
-              <a:effectLst/>
-              <a:latin typeface="Calibri" panose="020F0502020204030204" pitchFamily="34" charset="0"/>
-            </a:endParaRPr>
+              <a:rPr lang="en-US" sz="3200" dirty="0"/>
+              <a:t>is presented for a given 1-year period.</a:t>
+            </a:r>
           </a:p>
         </p:txBody>
       </p:sp>
     </p:spTree>
     <p:extLst>
       <p:ext uri="{BB962C8B-B14F-4D97-AF65-F5344CB8AC3E}">
-        <p14:creationId xmlns:p14="http://schemas.microsoft.com/office/powerpoint/2010/main" val="1517252660"/>
+        <p14:creationId xmlns:p14="http://schemas.microsoft.com/office/powerpoint/2010/main" val="795036017"/>
       </p:ext>
     </p:extLst>
   </p:cSld>

</xml_diff>

<commit_message>
Updated to include Vaccination10x numbers
After coming across and reviewing https://www.skirsch.com/covid/Deaths.pdf  - an extremely thorough analysis of the VAERS numbers felt adding a 10x data point was justified.
</commit_message>
<xml_diff>
--- a/Rational_Covid_Data.pptx
+++ b/Rational_Covid_Data.pptx
@@ -53,11 +53,12 @@
     <p:sldId id="345" r:id="rId47"/>
     <p:sldId id="346" r:id="rId48"/>
     <p:sldId id="352" r:id="rId49"/>
-    <p:sldId id="348" r:id="rId50"/>
-    <p:sldId id="350" r:id="rId51"/>
-    <p:sldId id="353" r:id="rId52"/>
-    <p:sldId id="349" r:id="rId53"/>
-    <p:sldId id="355" r:id="rId54"/>
+    <p:sldId id="356" r:id="rId50"/>
+    <p:sldId id="348" r:id="rId51"/>
+    <p:sldId id="350" r:id="rId52"/>
+    <p:sldId id="353" r:id="rId53"/>
+    <p:sldId id="349" r:id="rId54"/>
+    <p:sldId id="355" r:id="rId55"/>
   </p:sldIdLst>
   <p:sldSz cx="7315200" cy="4572000"/>
   <p:notesSz cx="6858000" cy="9144000"/>
@@ -213,6 +214,7 @@
             <p14:sldId id="345"/>
             <p14:sldId id="346"/>
             <p14:sldId id="352"/>
+            <p14:sldId id="356"/>
             <p14:sldId id="348"/>
             <p14:sldId id="350"/>
             <p14:sldId id="353"/>
@@ -250,7 +252,7 @@
           <a:lstStyle/>
           <a:p>
             <a:pPr>
-              <a:defRPr sz="2000" b="0" i="0" u="none" strike="noStrike" kern="1200" spc="0" baseline="0">
+              <a:defRPr sz="1400" b="0" i="0" u="none" strike="noStrike" kern="1200" spc="0" baseline="0">
                 <a:solidFill>
                   <a:schemeClr val="tx1">
                     <a:lumMod val="65000"/>
@@ -263,16 +265,17 @@
               </a:defRPr>
             </a:pPr>
             <a:r>
-              <a:rPr lang="en-US" sz="2000" b="0" i="0" u="none" strike="noStrike" baseline="0" dirty="0">
-                <a:effectLst/>
-              </a:rPr>
-              <a:t>COVID Deaths Reported vs Annualized</a:t>
-            </a:r>
-            <a:r>
-              <a:rPr lang="en-US" sz="2000" b="0" i="0" u="none" strike="noStrike" baseline="0" dirty="0"/>
-              <a:t>   Per 1 Million</a:t>
-            </a:r>
-            <a:endParaRPr lang="en-US" sz="2000" dirty="0"/>
+              <a:rPr lang="en-US" dirty="0"/>
+              <a:t>Reported</a:t>
+            </a:r>
+            <a:r>
+              <a:rPr lang="en-US" baseline="0" dirty="0"/>
+              <a:t> vs Annualized - </a:t>
+            </a:r>
+            <a:r>
+              <a:rPr lang="en-US" dirty="0"/>
+              <a:t>Deaths Per Million</a:t>
+            </a:r>
           </a:p>
         </c:rich>
       </c:tx>
@@ -289,7 +292,7 @@
         <a:lstStyle/>
         <a:p>
           <a:pPr>
-            <a:defRPr sz="2000" b="0" i="0" u="none" strike="noStrike" kern="1200" spc="0" baseline="0">
+            <a:defRPr sz="1400" b="0" i="0" u="none" strike="noStrike" kern="1200" spc="0" baseline="0">
               <a:solidFill>
                 <a:schemeClr val="tx1">
                   <a:lumMod val="65000"/>
@@ -317,11 +320,11 @@
           <c:order val="0"/>
           <c:tx>
             <c:strRef>
-              <c:f>DataAnalysis!$D$41</c:f>
+              <c:f>DataAnalysis!$F$40</c:f>
               <c:strCache>
                 <c:ptCount val="1"/>
                 <c:pt idx="0">
-                  <c:v>Deaths Per 1 Million</c:v>
+                  <c:v>Deaths Per Million</c:v>
                 </c:pt>
               </c:strCache>
             </c:strRef>
@@ -351,7 +354,7 @@
             </c:spPr>
             <c:extLst>
               <c:ext xmlns:c16="http://schemas.microsoft.com/office/drawing/2014/chart" uri="{C3380CC4-5D6E-409C-BE32-E72D297353CC}">
-                <c16:uniqueId val="{00000001-CB7F-43F5-941D-5F315574146A}"/>
+                <c16:uniqueId val="{00000001-865D-43C0-83B8-C306352D44BB}"/>
               </c:ext>
             </c:extLst>
           </c:dPt>
@@ -370,7 +373,7 @@
             </c:spPr>
             <c:extLst>
               <c:ext xmlns:c16="http://schemas.microsoft.com/office/drawing/2014/chart" uri="{C3380CC4-5D6E-409C-BE32-E72D297353CC}">
-                <c16:uniqueId val="{00000003-CB7F-43F5-941D-5F315574146A}"/>
+                <c16:uniqueId val="{00000003-865D-43C0-83B8-C306352D44BB}"/>
               </c:ext>
             </c:extLst>
           </c:dPt>
@@ -389,7 +392,7 @@
               <a:lstStyle/>
               <a:p>
                 <a:pPr>
-                  <a:defRPr sz="1800" b="0" i="0" u="none" strike="noStrike" kern="1200" baseline="0">
+                  <a:defRPr sz="900" b="1" i="0" u="none" strike="noStrike" kern="1200" baseline="0">
                     <a:solidFill>
                       <a:schemeClr val="tx1">
                         <a:lumMod val="75000"/>
@@ -433,23 +436,23 @@
           </c:dLbls>
           <c:cat>
             <c:strRef>
-              <c:f>DataAnalysis!$C$42:$C$44</c:f>
+              <c:f>DataAnalysis!$E$41:$E$42</c:f>
               <c:strCache>
                 <c:ptCount val="2"/>
                 <c:pt idx="0">
-                  <c:v>COVID Anualized</c:v>
+                  <c:v>COVID Annualized</c:v>
                 </c:pt>
                 <c:pt idx="1">
-                  <c:v>COVID As Reported</c:v>
+                  <c:v>COVID Reported</c:v>
                 </c:pt>
               </c:strCache>
             </c:strRef>
           </c:cat>
           <c:val>
             <c:numRef>
-              <c:f>DataAnalysis!$D$42:$D$44</c:f>
+              <c:f>DataAnalysis!$F$41:$F$42</c:f>
               <c:numCache>
-                <c:formatCode>_(* #,##0.0_);_(* \(#,##0.0\);_(* "-"??_);_(@_)</c:formatCode>
+                <c:formatCode>_(* #,##0_);_(* \(#,##0\);_(* "-"??_);_(@_)</c:formatCode>
                 <c:ptCount val="2"/>
                 <c:pt idx="0">
                   <c:v>1222.3638676003236</c:v>
@@ -462,7 +465,7 @@
           </c:val>
           <c:extLst>
             <c:ext xmlns:c16="http://schemas.microsoft.com/office/drawing/2014/chart" uri="{C3380CC4-5D6E-409C-BE32-E72D297353CC}">
-              <c16:uniqueId val="{00000004-CB7F-43F5-941D-5F315574146A}"/>
+              <c16:uniqueId val="{00000004-865D-43C0-83B8-C306352D44BB}"/>
             </c:ext>
           </c:extLst>
         </c:ser>
@@ -476,11 +479,11 @@
         </c:dLbls>
         <c:gapWidth val="219"/>
         <c:overlap val="-27"/>
-        <c:axId val="316428304"/>
-        <c:axId val="316440368"/>
+        <c:axId val="1976015087"/>
+        <c:axId val="1976015503"/>
       </c:barChart>
       <c:catAx>
-        <c:axId val="316428304"/>
+        <c:axId val="1976015087"/>
         <c:scaling>
           <c:orientation val="minMax"/>
         </c:scaling>
@@ -508,7 +511,7 @@
           <a:lstStyle/>
           <a:p>
             <a:pPr>
-              <a:defRPr sz="1200" b="1" i="0" u="none" strike="noStrike" kern="1200" baseline="0">
+              <a:defRPr sz="1100" b="1" i="0" u="none" strike="noStrike" kern="1200" baseline="0">
                 <a:solidFill>
                   <a:schemeClr val="tx1">
                     <a:lumMod val="65000"/>
@@ -523,7 +526,7 @@
             <a:endParaRPr lang="en-US"/>
           </a:p>
         </c:txPr>
-        <c:crossAx val="316440368"/>
+        <c:crossAx val="1976015503"/>
         <c:crosses val="autoZero"/>
         <c:auto val="1"/>
         <c:lblAlgn val="ctr"/>
@@ -531,9 +534,11 @@
         <c:noMultiLvlLbl val="0"/>
       </c:catAx>
       <c:valAx>
-        <c:axId val="316440368"/>
+        <c:axId val="1976015503"/>
         <c:scaling>
           <c:orientation val="minMax"/>
+          <c:max val="2010"/>
+          <c:min val="0"/>
         </c:scaling>
         <c:delete val="0"/>
         <c:axPos val="l"/>
@@ -541,8 +546,9 @@
           <c:spPr>
             <a:ln w="9525" cap="flat" cmpd="sng" algn="ctr">
               <a:solidFill>
-                <a:schemeClr val="tx2">
-                  <a:lumMod val="25000"/>
+                <a:schemeClr val="bg1">
+                  <a:lumMod val="75000"/>
+                  <a:lumOff val="25000"/>
                 </a:schemeClr>
               </a:solidFill>
               <a:round/>
@@ -550,7 +556,7 @@
             <a:effectLst/>
           </c:spPr>
         </c:majorGridlines>
-        <c:numFmt formatCode="_(* #,##0.0_);_(* \(#,##0.0\);_(* &quot;-&quot;??_);_(@_)" sourceLinked="1"/>
+        <c:numFmt formatCode="_(* #,##0_);_(* \(#,##0\);_(* &quot;-&quot;??_);_(@_)" sourceLinked="1"/>
         <c:majorTickMark val="none"/>
         <c:minorTickMark val="none"/>
         <c:tickLblPos val="nextTo"/>
@@ -581,7 +587,7 @@
             <a:endParaRPr lang="en-US"/>
           </a:p>
         </c:txPr>
-        <c:crossAx val="316428304"/>
+        <c:crossAx val="1976015087"/>
         <c:crosses val="autoZero"/>
         <c:crossBetween val="between"/>
       </c:valAx>
@@ -739,7 +745,7 @@
             </c:spPr>
             <c:extLst>
               <c:ext xmlns:c16="http://schemas.microsoft.com/office/drawing/2014/chart" uri="{C3380CC4-5D6E-409C-BE32-E72D297353CC}">
-                <c16:uniqueId val="{00000001-BA3D-420D-B3AC-27CACACDED63}"/>
+                <c16:uniqueId val="{00000001-DC25-4393-82D1-58E34731BBE0}"/>
               </c:ext>
             </c:extLst>
           </c:dPt>
@@ -758,53 +764,30 @@
             </c:spPr>
             <c:extLst>
               <c:ext xmlns:c16="http://schemas.microsoft.com/office/drawing/2014/chart" uri="{C3380CC4-5D6E-409C-BE32-E72D297353CC}">
-                <c16:uniqueId val="{00000003-BA3D-420D-B3AC-27CACACDED63}"/>
+                <c16:uniqueId val="{00000003-DC25-4393-82D1-58E34731BBE0}"/>
+              </c:ext>
+            </c:extLst>
+          </c:dPt>
+          <c:dPt>
+            <c:idx val="10"/>
+            <c:invertIfNegative val="0"/>
+            <c:bubble3D val="0"/>
+            <c:spPr>
+              <a:solidFill>
+                <a:srgbClr val="FFC000"/>
+              </a:solidFill>
+              <a:ln>
+                <a:noFill/>
+              </a:ln>
+              <a:effectLst/>
+            </c:spPr>
+            <c:extLst>
+              <c:ext xmlns:c16="http://schemas.microsoft.com/office/drawing/2014/chart" uri="{C3380CC4-5D6E-409C-BE32-E72D297353CC}">
+                <c16:uniqueId val="{00000005-DC25-4393-82D1-58E34731BBE0}"/>
               </c:ext>
             </c:extLst>
           </c:dPt>
           <c:dLbls>
-            <c:dLbl>
-              <c:idx val="0"/>
-              <c:layout>
-                <c:manualLayout>
-                  <c:x val="-8.6805555555555716E-3"/>
-                  <c:y val="-2.7777777777778798E-3"/>
-                </c:manualLayout>
-              </c:layout>
-              <c:showLegendKey val="0"/>
-              <c:showVal val="1"/>
-              <c:showCatName val="0"/>
-              <c:showSerName val="0"/>
-              <c:showPercent val="0"/>
-              <c:showBubbleSize val="0"/>
-              <c:extLst>
-                <c:ext xmlns:c15="http://schemas.microsoft.com/office/drawing/2012/chart" uri="{CE6537A1-D6FC-4f65-9D91-7224C49458BB}"/>
-                <c:ext xmlns:c16="http://schemas.microsoft.com/office/drawing/2014/chart" uri="{C3380CC4-5D6E-409C-BE32-E72D297353CC}">
-                  <c16:uniqueId val="{0000000C-BA3D-420D-B3AC-27CACACDED63}"/>
-                </c:ext>
-              </c:extLst>
-            </c:dLbl>
-            <c:dLbl>
-              <c:idx val="1"/>
-              <c:layout>
-                <c:manualLayout>
-                  <c:x val="1.736111111111111E-3"/>
-                  <c:y val="-1.6666666666666666E-2"/>
-                </c:manualLayout>
-              </c:layout>
-              <c:showLegendKey val="0"/>
-              <c:showVal val="1"/>
-              <c:showCatName val="0"/>
-              <c:showSerName val="0"/>
-              <c:showPercent val="0"/>
-              <c:showBubbleSize val="0"/>
-              <c:extLst>
-                <c:ext xmlns:c15="http://schemas.microsoft.com/office/drawing/2012/chart" uri="{CE6537A1-D6FC-4f65-9D91-7224C49458BB}"/>
-                <c:ext xmlns:c16="http://schemas.microsoft.com/office/drawing/2014/chart" uri="{C3380CC4-5D6E-409C-BE32-E72D297353CC}">
-                  <c16:uniqueId val="{0000000B-BA3D-420D-B3AC-27CACACDED63}"/>
-                </c:ext>
-              </c:extLst>
-            </c:dLbl>
             <c:spPr>
               <a:noFill/>
               <a:ln>
@@ -819,7 +802,7 @@
               <a:lstStyle/>
               <a:p>
                 <a:pPr>
-                  <a:defRPr sz="1100" b="0" i="0" u="none" strike="noStrike" kern="1200" baseline="0">
+                  <a:defRPr sz="1050" b="0" i="0" u="none" strike="noStrike" kern="1200" baseline="0">
                     <a:solidFill>
                       <a:schemeClr val="tx1">
                         <a:lumMod val="75000"/>
@@ -863,9 +846,9 @@
           </c:dLbls>
           <c:cat>
             <c:strRef>
-              <c:f>DataAnalysis!$C$248:$C$280</c:f>
+              <c:f>DataAnalysis!$C$259:$C$292</c:f>
               <c:strCache>
-                <c:ptCount val="10"/>
+                <c:ptCount val="11"/>
                 <c:pt idx="0">
                   <c:v>0-17 years</c:v>
                 </c:pt>
@@ -895,16 +878,19 @@
                 </c:pt>
                 <c:pt idx="9">
                   <c:v>Vaccine x5</c:v>
+                </c:pt>
+                <c:pt idx="10">
+                  <c:v>Vaccine x10</c:v>
                 </c:pt>
               </c:strCache>
             </c:strRef>
           </c:cat>
           <c:val>
             <c:numRef>
-              <c:f>DataAnalysis!$J$248:$J$280</c:f>
+              <c:f>DataAnalysis!$J$259:$J$292</c:f>
               <c:numCache>
                 <c:formatCode>_(* #,##0.0_);_(* \(#,##0.0\);_(* "-"??_);_(@_)</c:formatCode>
-                <c:ptCount val="10"/>
+                <c:ptCount val="11"/>
                 <c:pt idx="0">
                   <c:v>3.5870458010371267</c:v>
                 </c:pt>
@@ -934,13 +920,16 @@
                 </c:pt>
                 <c:pt idx="9">
                   <c:v>503.43962333626081</c:v>
+                </c:pt>
+                <c:pt idx="10">
+                  <c:v>1006.8792466725216</c:v>
                 </c:pt>
               </c:numCache>
             </c:numRef>
           </c:val>
           <c:extLst>
             <c:ext xmlns:c16="http://schemas.microsoft.com/office/drawing/2014/chart" uri="{C3380CC4-5D6E-409C-BE32-E72D297353CC}">
-              <c16:uniqueId val="{00000004-BA3D-420D-B3AC-27CACACDED63}"/>
+              <c16:uniqueId val="{00000006-DC25-4393-82D1-58E34731BBE0}"/>
             </c:ext>
           </c:extLst>
         </c:ser>
@@ -975,7 +964,7 @@
             </c:spPr>
             <c:extLst>
               <c:ext xmlns:c16="http://schemas.microsoft.com/office/drawing/2014/chart" uri="{C3380CC4-5D6E-409C-BE32-E72D297353CC}">
-                <c16:uniqueId val="{00000006-BA3D-420D-B3AC-27CACACDED63}"/>
+                <c16:uniqueId val="{00000008-DC25-4393-82D1-58E34731BBE0}"/>
               </c:ext>
             </c:extLst>
           </c:dPt>
@@ -994,16 +983,100 @@
             </c:spPr>
             <c:extLst>
               <c:ext xmlns:c16="http://schemas.microsoft.com/office/drawing/2014/chart" uri="{C3380CC4-5D6E-409C-BE32-E72D297353CC}">
-                <c16:uniqueId val="{00000008-BA3D-420D-B3AC-27CACACDED63}"/>
+                <c16:uniqueId val="{0000000A-DC25-4393-82D1-58E34731BBE0}"/>
               </c:ext>
             </c:extLst>
           </c:dPt>
           <c:dLbls>
             <c:dLbl>
+              <c:idx val="0"/>
+              <c:layout>
+                <c:manualLayout>
+                  <c:x val="1.2152777777777762E-2"/>
+                  <c:y val="5.5555555555554534E-3"/>
+                </c:manualLayout>
+              </c:layout>
+              <c:showLegendKey val="0"/>
+              <c:showVal val="1"/>
+              <c:showCatName val="0"/>
+              <c:showSerName val="0"/>
+              <c:showPercent val="0"/>
+              <c:showBubbleSize val="0"/>
+              <c:extLst>
+                <c:ext xmlns:c15="http://schemas.microsoft.com/office/drawing/2012/chart" uri="{CE6537A1-D6FC-4f65-9D91-7224C49458BB}"/>
+                <c:ext xmlns:c16="http://schemas.microsoft.com/office/drawing/2014/chart" uri="{C3380CC4-5D6E-409C-BE32-E72D297353CC}">
+                  <c16:uniqueId val="{0000000D-DC25-4393-82D1-58E34731BBE0}"/>
+                </c:ext>
+              </c:extLst>
+            </c:dLbl>
+            <c:dLbl>
               <c:idx val="1"/>
               <c:layout>
                 <c:manualLayout>
-                  <c:x val="0"/>
+                  <c:x val="5.208333333333333E-3"/>
+                  <c:y val="8.3333333333333332E-3"/>
+                </c:manualLayout>
+              </c:layout>
+              <c:showLegendKey val="0"/>
+              <c:showVal val="1"/>
+              <c:showCatName val="0"/>
+              <c:showSerName val="0"/>
+              <c:showPercent val="0"/>
+              <c:showBubbleSize val="0"/>
+              <c:extLst>
+                <c:ext xmlns:c15="http://schemas.microsoft.com/office/drawing/2012/chart" uri="{CE6537A1-D6FC-4f65-9D91-7224C49458BB}"/>
+                <c:ext xmlns:c16="http://schemas.microsoft.com/office/drawing/2014/chart" uri="{C3380CC4-5D6E-409C-BE32-E72D297353CC}">
+                  <c16:uniqueId val="{0000000E-DC25-4393-82D1-58E34731BBE0}"/>
+                </c:ext>
+              </c:extLst>
+            </c:dLbl>
+            <c:dLbl>
+              <c:idx val="2"/>
+              <c:layout>
+                <c:manualLayout>
+                  <c:x val="6.9444444444444128E-3"/>
+                  <c:y val="1.3888888888888888E-2"/>
+                </c:manualLayout>
+              </c:layout>
+              <c:showLegendKey val="0"/>
+              <c:showVal val="1"/>
+              <c:showCatName val="0"/>
+              <c:showSerName val="0"/>
+              <c:showPercent val="0"/>
+              <c:showBubbleSize val="0"/>
+              <c:extLst>
+                <c:ext xmlns:c15="http://schemas.microsoft.com/office/drawing/2012/chart" uri="{CE6537A1-D6FC-4f65-9D91-7224C49458BB}"/>
+                <c:ext xmlns:c16="http://schemas.microsoft.com/office/drawing/2014/chart" uri="{C3380CC4-5D6E-409C-BE32-E72D297353CC}">
+                  <c16:uniqueId val="{0000000F-DC25-4393-82D1-58E34731BBE0}"/>
+                </c:ext>
+              </c:extLst>
+            </c:dLbl>
+            <c:dLbl>
+              <c:idx val="3"/>
+              <c:layout>
+                <c:manualLayout>
+                  <c:x val="5.208333333333333E-3"/>
+                  <c:y val="1.1111111111111112E-2"/>
+                </c:manualLayout>
+              </c:layout>
+              <c:showLegendKey val="0"/>
+              <c:showVal val="1"/>
+              <c:showCatName val="0"/>
+              <c:showSerName val="0"/>
+              <c:showPercent val="0"/>
+              <c:showBubbleSize val="0"/>
+              <c:extLst>
+                <c:ext xmlns:c15="http://schemas.microsoft.com/office/drawing/2012/chart" uri="{CE6537A1-D6FC-4f65-9D91-7224C49458BB}"/>
+                <c:ext xmlns:c16="http://schemas.microsoft.com/office/drawing/2014/chart" uri="{C3380CC4-5D6E-409C-BE32-E72D297353CC}">
+                  <c16:uniqueId val="{00000010-DC25-4393-82D1-58E34731BBE0}"/>
+                </c:ext>
+              </c:extLst>
+            </c:dLbl>
+            <c:dLbl>
+              <c:idx val="4"/>
+              <c:layout>
+                <c:manualLayout>
+                  <c:x val="6.9444444444444441E-3"/>
                   <c:y val="1.1111111111111009E-2"/>
                 </c:manualLayout>
               </c:layout>
@@ -1016,16 +1089,16 @@
               <c:extLst>
                 <c:ext xmlns:c15="http://schemas.microsoft.com/office/drawing/2012/chart" uri="{CE6537A1-D6FC-4f65-9D91-7224C49458BB}"/>
                 <c:ext xmlns:c16="http://schemas.microsoft.com/office/drawing/2014/chart" uri="{C3380CC4-5D6E-409C-BE32-E72D297353CC}">
-                  <c16:uniqueId val="{0000000F-BA3D-420D-B3AC-27CACACDED63}"/>
+                  <c16:uniqueId val="{00000011-DC25-4393-82D1-58E34731BBE0}"/>
                 </c:ext>
               </c:extLst>
             </c:dLbl>
             <c:dLbl>
-              <c:idx val="2"/>
+              <c:idx val="5"/>
               <c:layout>
                 <c:manualLayout>
-                  <c:x val="1.736111111111111E-3"/>
-                  <c:y val="1.3888888888888788E-2"/>
+                  <c:x val="1.0416666666666604E-2"/>
+                  <c:y val="-2.7777777777777779E-3"/>
                 </c:manualLayout>
               </c:layout>
               <c:showLegendKey val="0"/>
@@ -1037,16 +1110,16 @@
               <c:extLst>
                 <c:ext xmlns:c15="http://schemas.microsoft.com/office/drawing/2012/chart" uri="{CE6537A1-D6FC-4f65-9D91-7224C49458BB}"/>
                 <c:ext xmlns:c16="http://schemas.microsoft.com/office/drawing/2014/chart" uri="{C3380CC4-5D6E-409C-BE32-E72D297353CC}">
-                  <c16:uniqueId val="{0000000E-BA3D-420D-B3AC-27CACACDED63}"/>
+                  <c16:uniqueId val="{00000012-DC25-4393-82D1-58E34731BBE0}"/>
                 </c:ext>
               </c:extLst>
             </c:dLbl>
             <c:dLbl>
-              <c:idx val="3"/>
+              <c:idx val="6"/>
               <c:layout>
                 <c:manualLayout>
-                  <c:x val="6.9444444444444441E-3"/>
-                  <c:y val="1.3888888888888888E-2"/>
+                  <c:x val="8.6805555555555559E-3"/>
+                  <c:y val="8.3333333333333332E-3"/>
                 </c:manualLayout>
               </c:layout>
               <c:showLegendKey val="0"/>
@@ -1058,7 +1131,28 @@
               <c:extLst>
                 <c:ext xmlns:c15="http://schemas.microsoft.com/office/drawing/2012/chart" uri="{CE6537A1-D6FC-4f65-9D91-7224C49458BB}"/>
                 <c:ext xmlns:c16="http://schemas.microsoft.com/office/drawing/2014/chart" uri="{C3380CC4-5D6E-409C-BE32-E72D297353CC}">
-                  <c16:uniqueId val="{0000000D-BA3D-420D-B3AC-27CACACDED63}"/>
+                  <c16:uniqueId val="{00000013-DC25-4393-82D1-58E34731BBE0}"/>
+                </c:ext>
+              </c:extLst>
+            </c:dLbl>
+            <c:dLbl>
+              <c:idx val="7"/>
+              <c:layout>
+                <c:manualLayout>
+                  <c:x val="1.5625E-2"/>
+                  <c:y val="2.7777777777777779E-3"/>
+                </c:manualLayout>
+              </c:layout>
+              <c:showLegendKey val="0"/>
+              <c:showVal val="1"/>
+              <c:showCatName val="0"/>
+              <c:showSerName val="0"/>
+              <c:showPercent val="0"/>
+              <c:showBubbleSize val="0"/>
+              <c:extLst>
+                <c:ext xmlns:c15="http://schemas.microsoft.com/office/drawing/2012/chart" uri="{CE6537A1-D6FC-4f65-9D91-7224C49458BB}"/>
+                <c:ext xmlns:c16="http://schemas.microsoft.com/office/drawing/2014/chart" uri="{C3380CC4-5D6E-409C-BE32-E72D297353CC}">
+                  <c16:uniqueId val="{00000014-DC25-4393-82D1-58E34731BBE0}"/>
                 </c:ext>
               </c:extLst>
             </c:dLbl>
@@ -1076,7 +1170,7 @@
               <a:lstStyle/>
               <a:p>
                 <a:pPr>
-                  <a:defRPr sz="1100" b="0" i="0" u="none" strike="noStrike" kern="1200" baseline="0">
+                  <a:defRPr sz="1050" b="0" i="0" u="none" strike="noStrike" kern="1200" baseline="0">
                     <a:solidFill>
                       <a:srgbClr val="00B050"/>
                     </a:solidFill>
@@ -1117,9 +1211,9 @@
           </c:dLbls>
           <c:cat>
             <c:strRef>
-              <c:f>DataAnalysis!$C$248:$C$280</c:f>
+              <c:f>DataAnalysis!$C$259:$C$292</c:f>
               <c:strCache>
-                <c:ptCount val="10"/>
+                <c:ptCount val="11"/>
                 <c:pt idx="0">
                   <c:v>0-17 years</c:v>
                 </c:pt>
@@ -1149,16 +1243,19 @@
                 </c:pt>
                 <c:pt idx="9">
                   <c:v>Vaccine x5</c:v>
+                </c:pt>
+                <c:pt idx="10">
+                  <c:v>Vaccine x10</c:v>
                 </c:pt>
               </c:strCache>
             </c:strRef>
           </c:cat>
           <c:val>
             <c:numRef>
-              <c:f>DataAnalysis!$K$248:$K$280</c:f>
+              <c:f>DataAnalysis!$K$259:$K$292</c:f>
               <c:numCache>
                 <c:formatCode>_(* #,##0.0_);_(* \(#,##0.0\);_(* "-"??_);_(@_)</c:formatCode>
-                <c:ptCount val="10"/>
+                <c:ptCount val="11"/>
                 <c:pt idx="0">
                   <c:v>0.53805687015556902</c:v>
                 </c:pt>
@@ -1188,7 +1285,7 @@
           </c:val>
           <c:extLst>
             <c:ext xmlns:c16="http://schemas.microsoft.com/office/drawing/2014/chart" uri="{C3380CC4-5D6E-409C-BE32-E72D297353CC}">
-              <c16:uniqueId val="{00000009-BA3D-420D-B3AC-27CACACDED63}"/>
+              <c16:uniqueId val="{0000000B-DC25-4393-82D1-58E34731BBE0}"/>
             </c:ext>
           </c:extLst>
         </c:ser>
@@ -1234,7 +1331,7 @@
           <a:lstStyle/>
           <a:p>
             <a:pPr>
-              <a:defRPr sz="900" b="0" i="0" u="none" strike="noStrike" kern="1200" baseline="0">
+              <a:defRPr sz="1200" b="0" i="0" u="none" strike="noStrike" kern="1200" baseline="0">
                 <a:solidFill>
                   <a:schemeClr val="tx1">
                     <a:lumMod val="65000"/>
@@ -1269,8 +1366,9 @@
           <c:spPr>
             <a:ln w="9525" cap="flat" cmpd="sng" algn="ctr">
               <a:solidFill>
-                <a:schemeClr val="tx2">
-                  <a:lumMod val="25000"/>
+                <a:schemeClr val="bg1">
+                  <a:lumMod val="75000"/>
+                  <a:lumOff val="25000"/>
                 </a:schemeClr>
               </a:solidFill>
               <a:round/>
@@ -1493,7 +1591,7 @@
             </c:spPr>
             <c:extLst>
               <c:ext xmlns:c16="http://schemas.microsoft.com/office/drawing/2014/chart" uri="{C3380CC4-5D6E-409C-BE32-E72D297353CC}">
-                <c16:uniqueId val="{00000001-FF49-49AA-809F-8A268ACBEE2D}"/>
+                <c16:uniqueId val="{00000001-7DBC-4F9E-A790-B8859ED0454A}"/>
               </c:ext>
             </c:extLst>
           </c:dPt>
@@ -1512,7 +1610,26 @@
             </c:spPr>
             <c:extLst>
               <c:ext xmlns:c16="http://schemas.microsoft.com/office/drawing/2014/chart" uri="{C3380CC4-5D6E-409C-BE32-E72D297353CC}">
-                <c16:uniqueId val="{00000003-FF49-49AA-809F-8A268ACBEE2D}"/>
+                <c16:uniqueId val="{00000003-7DBC-4F9E-A790-B8859ED0454A}"/>
+              </c:ext>
+            </c:extLst>
+          </c:dPt>
+          <c:dPt>
+            <c:idx val="7"/>
+            <c:invertIfNegative val="0"/>
+            <c:bubble3D val="0"/>
+            <c:spPr>
+              <a:solidFill>
+                <a:srgbClr val="FFC000"/>
+              </a:solidFill>
+              <a:ln>
+                <a:noFill/>
+              </a:ln>
+              <a:effectLst/>
+            </c:spPr>
+            <c:extLst>
+              <c:ext xmlns:c16="http://schemas.microsoft.com/office/drawing/2014/chart" uri="{C3380CC4-5D6E-409C-BE32-E72D297353CC}">
+                <c16:uniqueId val="{00000005-7DBC-4F9E-A790-B8859ED0454A}"/>
               </c:ext>
             </c:extLst>
           </c:dPt>
@@ -1531,7 +1648,7 @@
               <a:lstStyle/>
               <a:p>
                 <a:pPr>
-                  <a:defRPr sz="1100" b="0" i="0" u="none" strike="noStrike" kern="1200" baseline="0">
+                  <a:defRPr sz="1050" b="0" i="0" u="none" strike="noStrike" kern="1200" baseline="0">
                     <a:solidFill>
                       <a:schemeClr val="tx1">
                         <a:lumMod val="75000"/>
@@ -1575,9 +1692,9 @@
           </c:dLbls>
           <c:cat>
             <c:strRef>
-              <c:f>DataAnalysis!$C$298:$C$309</c:f>
+              <c:f>DataAnalysis!$C$309:$C$342</c:f>
               <c:strCache>
-                <c:ptCount val="7"/>
+                <c:ptCount val="8"/>
                 <c:pt idx="0">
                   <c:v>0-17 years</c:v>
                 </c:pt>
@@ -1598,16 +1715,19 @@
                 </c:pt>
                 <c:pt idx="6">
                   <c:v>Vaccine x5</c:v>
+                </c:pt>
+                <c:pt idx="7">
+                  <c:v>Vaccine x10</c:v>
                 </c:pt>
               </c:strCache>
             </c:strRef>
           </c:cat>
           <c:val>
             <c:numRef>
-              <c:f>DataAnalysis!$J$298:$J$309</c:f>
+              <c:f>DataAnalysis!$J$309:$J$342</c:f>
               <c:numCache>
                 <c:formatCode>_(* #,##0.0_);_(* \(#,##0.0\);_(* "-"??_);_(@_)</c:formatCode>
-                <c:ptCount val="7"/>
+                <c:ptCount val="8"/>
                 <c:pt idx="0">
                   <c:v>3.5870458010371267</c:v>
                 </c:pt>
@@ -1628,13 +1748,16 @@
                 </c:pt>
                 <c:pt idx="6">
                   <c:v>503.43962333626081</c:v>
+                </c:pt>
+                <c:pt idx="7">
+                  <c:v>1006.8792466725216</c:v>
                 </c:pt>
               </c:numCache>
             </c:numRef>
           </c:val>
           <c:extLst>
             <c:ext xmlns:c16="http://schemas.microsoft.com/office/drawing/2014/chart" uri="{C3380CC4-5D6E-409C-BE32-E72D297353CC}">
-              <c16:uniqueId val="{00000004-FF49-49AA-809F-8A268ACBEE2D}"/>
+              <c16:uniqueId val="{00000006-7DBC-4F9E-A790-B8859ED0454A}"/>
             </c:ext>
           </c:extLst>
         </c:ser>
@@ -1669,7 +1792,7 @@
               <a:lstStyle/>
               <a:p>
                 <a:pPr>
-                  <a:defRPr sz="1100" b="0" i="0" u="none" strike="noStrike" kern="1200" baseline="0">
+                  <a:defRPr sz="1050" b="0" i="0" u="none" strike="noStrike" kern="1200" baseline="0">
                     <a:solidFill>
                       <a:srgbClr val="00B050"/>
                     </a:solidFill>
@@ -1710,9 +1833,9 @@
           </c:dLbls>
           <c:cat>
             <c:strRef>
-              <c:f>DataAnalysis!$C$298:$C$309</c:f>
+              <c:f>DataAnalysis!$C$309:$C$342</c:f>
               <c:strCache>
-                <c:ptCount val="7"/>
+                <c:ptCount val="8"/>
                 <c:pt idx="0">
                   <c:v>0-17 years</c:v>
                 </c:pt>
@@ -1733,16 +1856,19 @@
                 </c:pt>
                 <c:pt idx="6">
                   <c:v>Vaccine x5</c:v>
+                </c:pt>
+                <c:pt idx="7">
+                  <c:v>Vaccine x10</c:v>
                 </c:pt>
               </c:strCache>
             </c:strRef>
           </c:cat>
           <c:val>
             <c:numRef>
-              <c:f>DataAnalysis!$K$298:$K$309</c:f>
+              <c:f>DataAnalysis!$K$309:$K$342</c:f>
               <c:numCache>
                 <c:formatCode>_(* #,##0.0_);_(* \(#,##0.0\);_(* "-"??_);_(@_)</c:formatCode>
-                <c:ptCount val="7"/>
+                <c:ptCount val="8"/>
                 <c:pt idx="0">
                   <c:v>0.53805687015556902</c:v>
                 </c:pt>
@@ -1763,7 +1889,7 @@
           </c:val>
           <c:extLst>
             <c:ext xmlns:c16="http://schemas.microsoft.com/office/drawing/2014/chart" uri="{C3380CC4-5D6E-409C-BE32-E72D297353CC}">
-              <c16:uniqueId val="{00000005-FF49-49AA-809F-8A268ACBEE2D}"/>
+              <c16:uniqueId val="{00000007-7DBC-4F9E-A790-B8859ED0454A}"/>
             </c:ext>
           </c:extLst>
         </c:ser>
@@ -1809,7 +1935,7 @@
           <a:lstStyle/>
           <a:p>
             <a:pPr>
-              <a:defRPr sz="1050" b="0" i="0" u="none" strike="noStrike" kern="1200" baseline="0">
+              <a:defRPr sz="1200" b="0" i="0" u="none" strike="noStrike" kern="1200" baseline="0">
                 <a:solidFill>
                   <a:schemeClr val="tx1">
                     <a:lumMod val="65000"/>
@@ -1844,8 +1970,9 @@
           <c:spPr>
             <a:ln w="9525" cap="flat" cmpd="sng" algn="ctr">
               <a:solidFill>
-                <a:schemeClr val="tx2">
-                  <a:lumMod val="25000"/>
+                <a:schemeClr val="bg1">
+                  <a:lumMod val="75000"/>
+                  <a:lumOff val="25000"/>
                 </a:schemeClr>
               </a:solidFill>
               <a:round/>
@@ -1995,28 +2122,28 @@
               </a:defRPr>
             </a:pPr>
             <a:r>
-              <a:rPr lang="en-US" sz="1400" dirty="0"/>
-              <a:t>Leading Causes of Death vs COVID </a:t>
-            </a:r>
-            <a:r>
-              <a:rPr lang="en-US" sz="1400" baseline="0" dirty="0"/>
-              <a:t> and COVID Vaccine – Deaths Per </a:t>
-            </a:r>
-            <a:r>
-              <a:rPr lang="en-US" sz="1400" dirty="0"/>
-              <a:t>1 Million</a:t>
-            </a:r>
+              <a:rPr lang="en-US" sz="1800" b="0" i="0" baseline="0" dirty="0">
+                <a:effectLst/>
+              </a:rPr>
+              <a:t>Leading Causes of Death vs COVID  and COVID Vaccine</a:t>
+            </a:r>
+            <a:br>
+              <a:rPr lang="en-US" sz="1800" b="0" i="0" baseline="0" dirty="0">
+                <a:effectLst/>
+              </a:rPr>
+            </a:br>
+            <a:r>
+              <a:rPr lang="en-US" sz="1400" b="0" i="0" baseline="0" dirty="0">
+                <a:effectLst/>
+              </a:rPr>
+              <a:t> Deaths Per 1 Million</a:t>
+            </a:r>
+            <a:endParaRPr lang="en-US" dirty="0">
+              <a:effectLst/>
+            </a:endParaRPr>
           </a:p>
         </c:rich>
       </c:tx>
-      <c:layout>
-        <c:manualLayout>
-          <c:xMode val="edge"/>
-          <c:yMode val="edge"/>
-          <c:x val="0.10896694553805775"/>
-          <c:y val="3.7975564923905768E-2"/>
-        </c:manualLayout>
-      </c:layout>
       <c:overlay val="0"/>
       <c:spPr>
         <a:noFill/>
@@ -2058,7 +2185,7 @@
           <c:order val="0"/>
           <c:tx>
             <c:strRef>
-              <c:f>DataAnalysis!$E$349</c:f>
+              <c:f>DataAnalysis!$E$360</c:f>
               <c:strCache>
                 <c:ptCount val="1"/>
                 <c:pt idx="0">
@@ -2092,7 +2219,7 @@
             </c:spPr>
             <c:extLst>
               <c:ext xmlns:c16="http://schemas.microsoft.com/office/drawing/2014/chart" uri="{C3380CC4-5D6E-409C-BE32-E72D297353CC}">
-                <c16:uniqueId val="{00000001-8E47-49E4-89CE-D6553BDDB9BE}"/>
+                <c16:uniqueId val="{00000001-9893-40B5-B6F1-B6335B3DB3F3}"/>
               </c:ext>
             </c:extLst>
           </c:dPt>
@@ -2111,7 +2238,7 @@
             </c:spPr>
             <c:extLst>
               <c:ext xmlns:c16="http://schemas.microsoft.com/office/drawing/2014/chart" uri="{C3380CC4-5D6E-409C-BE32-E72D297353CC}">
-                <c16:uniqueId val="{00000003-8E47-49E4-89CE-D6553BDDB9BE}"/>
+                <c16:uniqueId val="{00000003-9893-40B5-B6F1-B6335B3DB3F3}"/>
               </c:ext>
             </c:extLst>
           </c:dPt>
@@ -2130,7 +2257,7 @@
             </c:spPr>
             <c:extLst>
               <c:ext xmlns:c16="http://schemas.microsoft.com/office/drawing/2014/chart" uri="{C3380CC4-5D6E-409C-BE32-E72D297353CC}">
-                <c16:uniqueId val="{00000005-8E47-49E4-89CE-D6553BDDB9BE}"/>
+                <c16:uniqueId val="{00000005-9893-40B5-B6F1-B6335B3DB3F3}"/>
               </c:ext>
             </c:extLst>
           </c:dPt>
@@ -2149,7 +2276,7 @@
             </c:spPr>
             <c:extLst>
               <c:ext xmlns:c16="http://schemas.microsoft.com/office/drawing/2014/chart" uri="{C3380CC4-5D6E-409C-BE32-E72D297353CC}">
-                <c16:uniqueId val="{00000007-8E47-49E4-89CE-D6553BDDB9BE}"/>
+                <c16:uniqueId val="{00000007-9893-40B5-B6F1-B6335B3DB3F3}"/>
               </c:ext>
             </c:extLst>
           </c:dPt>
@@ -2168,7 +2295,7 @@
             </c:spPr>
             <c:extLst>
               <c:ext xmlns:c16="http://schemas.microsoft.com/office/drawing/2014/chart" uri="{C3380CC4-5D6E-409C-BE32-E72D297353CC}">
-                <c16:uniqueId val="{00000009-8E47-49E4-89CE-D6553BDDB9BE}"/>
+                <c16:uniqueId val="{00000009-9893-40B5-B6F1-B6335B3DB3F3}"/>
               </c:ext>
             </c:extLst>
           </c:dPt>
@@ -2187,12 +2314,31 @@
             </c:spPr>
             <c:extLst>
               <c:ext xmlns:c16="http://schemas.microsoft.com/office/drawing/2014/chart" uri="{C3380CC4-5D6E-409C-BE32-E72D297353CC}">
-                <c16:uniqueId val="{0000000B-8E47-49E4-89CE-D6553BDDB9BE}"/>
+                <c16:uniqueId val="{0000000B-9893-40B5-B6F1-B6335B3DB3F3}"/>
               </c:ext>
             </c:extLst>
           </c:dPt>
           <c:dPt>
             <c:idx val="13"/>
+            <c:invertIfNegative val="0"/>
+            <c:bubble3D val="0"/>
+            <c:spPr>
+              <a:solidFill>
+                <a:srgbClr val="FFC000"/>
+              </a:solidFill>
+              <a:ln>
+                <a:noFill/>
+              </a:ln>
+              <a:effectLst/>
+            </c:spPr>
+            <c:extLst>
+              <c:ext xmlns:c16="http://schemas.microsoft.com/office/drawing/2014/chart" uri="{C3380CC4-5D6E-409C-BE32-E72D297353CC}">
+                <c16:uniqueId val="{0000000D-9893-40B5-B6F1-B6335B3DB3F3}"/>
+              </c:ext>
+            </c:extLst>
+          </c:dPt>
+          <c:dPt>
+            <c:idx val="14"/>
             <c:invertIfNegative val="0"/>
             <c:bubble3D val="0"/>
             <c:spPr>
@@ -2206,12 +2352,12 @@
             </c:spPr>
             <c:extLst>
               <c:ext xmlns:c16="http://schemas.microsoft.com/office/drawing/2014/chart" uri="{C3380CC4-5D6E-409C-BE32-E72D297353CC}">
-                <c16:uniqueId val="{0000000D-8E47-49E4-89CE-D6553BDDB9BE}"/>
+                <c16:uniqueId val="{0000000F-9893-40B5-B6F1-B6335B3DB3F3}"/>
               </c:ext>
             </c:extLst>
           </c:dPt>
           <c:dPt>
-            <c:idx val="16"/>
+            <c:idx val="17"/>
             <c:invertIfNegative val="0"/>
             <c:bubble3D val="0"/>
             <c:spPr>
@@ -2225,7 +2371,7 @@
             </c:spPr>
             <c:extLst>
               <c:ext xmlns:c16="http://schemas.microsoft.com/office/drawing/2014/chart" uri="{C3380CC4-5D6E-409C-BE32-E72D297353CC}">
-                <c16:uniqueId val="{0000000F-8E47-49E4-89CE-D6553BDDB9BE}"/>
+                <c16:uniqueId val="{00000011-9893-40B5-B6F1-B6335B3DB3F3}"/>
               </c:ext>
             </c:extLst>
           </c:dPt>
@@ -2246,7 +2392,7 @@
                 <a:lstStyle/>
                 <a:p>
                   <a:pPr>
-                    <a:defRPr sz="1200" b="0" i="0" u="none" strike="noStrike" kern="1200" baseline="0">
+                    <a:defRPr sz="1050" b="0" i="0" u="none" strike="noStrike" kern="1200" baseline="0">
                       <a:solidFill>
                         <a:srgbClr val="00B050"/>
                       </a:solidFill>
@@ -2266,7 +2412,7 @@
               <c:showBubbleSize val="0"/>
               <c:extLst>
                 <c:ext xmlns:c16="http://schemas.microsoft.com/office/drawing/2014/chart" uri="{C3380CC4-5D6E-409C-BE32-E72D297353CC}">
-                  <c16:uniqueId val="{00000001-8E47-49E4-89CE-D6553BDDB9BE}"/>
+                  <c16:uniqueId val="{00000001-9893-40B5-B6F1-B6335B3DB3F3}"/>
                 </c:ext>
               </c:extLst>
             </c:dLbl>
@@ -2286,7 +2432,7 @@
                 <a:lstStyle/>
                 <a:p>
                   <a:pPr>
-                    <a:defRPr sz="1200" b="0" i="0" u="none" strike="noStrike" kern="1200" baseline="0">
+                    <a:defRPr sz="1050" b="0" i="0" u="none" strike="noStrike" kern="1200" baseline="0">
                       <a:solidFill>
                         <a:srgbClr val="FFC000"/>
                       </a:solidFill>
@@ -2306,7 +2452,7 @@
               <c:showBubbleSize val="0"/>
               <c:extLst>
                 <c:ext xmlns:c16="http://schemas.microsoft.com/office/drawing/2014/chart" uri="{C3380CC4-5D6E-409C-BE32-E72D297353CC}">
-                  <c16:uniqueId val="{00000003-8E47-49E4-89CE-D6553BDDB9BE}"/>
+                  <c16:uniqueId val="{00000003-9893-40B5-B6F1-B6335B3DB3F3}"/>
                 </c:ext>
               </c:extLst>
             </c:dLbl>
@@ -2326,7 +2472,7 @@
                 <a:lstStyle/>
                 <a:p>
                   <a:pPr>
-                    <a:defRPr sz="1200" b="0" i="0" u="none" strike="noStrike" kern="1200" baseline="0">
+                    <a:defRPr sz="1050" b="0" i="0" u="none" strike="noStrike" kern="1200" baseline="0">
                       <a:solidFill>
                         <a:srgbClr val="00B050"/>
                       </a:solidFill>
@@ -2346,7 +2492,7 @@
               <c:showBubbleSize val="0"/>
               <c:extLst>
                 <c:ext xmlns:c16="http://schemas.microsoft.com/office/drawing/2014/chart" uri="{C3380CC4-5D6E-409C-BE32-E72D297353CC}">
-                  <c16:uniqueId val="{00000005-8E47-49E4-89CE-D6553BDDB9BE}"/>
+                  <c16:uniqueId val="{00000005-9893-40B5-B6F1-B6335B3DB3F3}"/>
                 </c:ext>
               </c:extLst>
             </c:dLbl>
@@ -2366,7 +2512,7 @@
                 <a:lstStyle/>
                 <a:p>
                   <a:pPr>
-                    <a:defRPr sz="1200" b="0" i="0" u="none" strike="noStrike" kern="1200" baseline="0">
+                    <a:defRPr sz="1050" b="0" i="0" u="none" strike="noStrike" kern="1200" baseline="0">
                       <a:solidFill>
                         <a:srgbClr val="FF0000"/>
                       </a:solidFill>
@@ -2386,7 +2532,7 @@
               <c:showBubbleSize val="0"/>
               <c:extLst>
                 <c:ext xmlns:c16="http://schemas.microsoft.com/office/drawing/2014/chart" uri="{C3380CC4-5D6E-409C-BE32-E72D297353CC}">
-                  <c16:uniqueId val="{00000009-8E47-49E4-89CE-D6553BDDB9BE}"/>
+                  <c16:uniqueId val="{00000009-9893-40B5-B6F1-B6335B3DB3F3}"/>
                 </c:ext>
               </c:extLst>
             </c:dLbl>
@@ -2406,7 +2552,7 @@
                 <a:lstStyle/>
                 <a:p>
                   <a:pPr>
-                    <a:defRPr sz="1200" b="0" i="0" u="none" strike="noStrike" kern="1200" baseline="0">
+                    <a:defRPr sz="1050" b="0" i="0" u="none" strike="noStrike" kern="1200" baseline="0">
                       <a:solidFill>
                         <a:srgbClr val="FFC000"/>
                       </a:solidFill>
@@ -2426,7 +2572,7 @@
               <c:showBubbleSize val="0"/>
               <c:extLst>
                 <c:ext xmlns:c16="http://schemas.microsoft.com/office/drawing/2014/chart" uri="{C3380CC4-5D6E-409C-BE32-E72D297353CC}">
-                  <c16:uniqueId val="{0000000B-8E47-49E4-89CE-D6553BDDB9BE}"/>
+                  <c16:uniqueId val="{0000000B-9893-40B5-B6F1-B6335B3DB3F3}"/>
                 </c:ext>
               </c:extLst>
             </c:dLbl>
@@ -2446,7 +2592,47 @@
                 <a:lstStyle/>
                 <a:p>
                   <a:pPr>
-                    <a:defRPr sz="1200" b="0" i="0" u="none" strike="noStrike" kern="1200" baseline="0">
+                    <a:defRPr sz="1050" b="0" i="0" u="none" strike="noStrike" kern="1200" baseline="0">
+                      <a:solidFill>
+                        <a:srgbClr val="FFC000"/>
+                      </a:solidFill>
+                      <a:latin typeface="+mn-lt"/>
+                      <a:ea typeface="+mn-ea"/>
+                      <a:cs typeface="+mn-cs"/>
+                    </a:defRPr>
+                  </a:pPr>
+                  <a:endParaRPr lang="en-US"/>
+                </a:p>
+              </c:txPr>
+              <c:showLegendKey val="0"/>
+              <c:showVal val="1"/>
+              <c:showCatName val="0"/>
+              <c:showSerName val="0"/>
+              <c:showPercent val="0"/>
+              <c:showBubbleSize val="0"/>
+              <c:extLst>
+                <c:ext xmlns:c16="http://schemas.microsoft.com/office/drawing/2014/chart" uri="{C3380CC4-5D6E-409C-BE32-E72D297353CC}">
+                  <c16:uniqueId val="{0000000D-9893-40B5-B6F1-B6335B3DB3F3}"/>
+                </c:ext>
+              </c:extLst>
+            </c:dLbl>
+            <c:dLbl>
+              <c:idx val="14"/>
+              <c:spPr>
+                <a:noFill/>
+                <a:ln>
+                  <a:noFill/>
+                </a:ln>
+                <a:effectLst/>
+              </c:spPr>
+              <c:txPr>
+                <a:bodyPr rot="0" spcFirstLastPara="1" vertOverflow="ellipsis" vert="horz" wrap="square" lIns="38100" tIns="19050" rIns="38100" bIns="19050" anchor="ctr" anchorCtr="1">
+                  <a:spAutoFit/>
+                </a:bodyPr>
+                <a:lstStyle/>
+                <a:p>
+                  <a:pPr>
+                    <a:defRPr sz="1050" b="0" i="0" u="none" strike="noStrike" kern="1200" baseline="0">
                       <a:solidFill>
                         <a:srgbClr val="FF0000"/>
                       </a:solidFill>
@@ -2466,12 +2652,12 @@
               <c:showBubbleSize val="0"/>
               <c:extLst>
                 <c:ext xmlns:c16="http://schemas.microsoft.com/office/drawing/2014/chart" uri="{C3380CC4-5D6E-409C-BE32-E72D297353CC}">
-                  <c16:uniqueId val="{0000000D-8E47-49E4-89CE-D6553BDDB9BE}"/>
+                  <c16:uniqueId val="{0000000F-9893-40B5-B6F1-B6335B3DB3F3}"/>
                 </c:ext>
               </c:extLst>
             </c:dLbl>
             <c:dLbl>
-              <c:idx val="16"/>
+              <c:idx val="17"/>
               <c:spPr>
                 <a:noFill/>
                 <a:ln>
@@ -2486,7 +2672,7 @@
                 <a:lstStyle/>
                 <a:p>
                   <a:pPr>
-                    <a:defRPr sz="1200" b="0" i="0" u="none" strike="noStrike" kern="1200" baseline="0">
+                    <a:defRPr sz="1050" b="0" i="0" u="none" strike="noStrike" kern="1200" baseline="0">
                       <a:solidFill>
                         <a:srgbClr val="FF0000"/>
                       </a:solidFill>
@@ -2506,7 +2692,7 @@
               <c:showBubbleSize val="0"/>
               <c:extLst>
                 <c:ext xmlns:c16="http://schemas.microsoft.com/office/drawing/2014/chart" uri="{C3380CC4-5D6E-409C-BE32-E72D297353CC}">
-                  <c16:uniqueId val="{0000000F-8E47-49E4-89CE-D6553BDDB9BE}"/>
+                  <c16:uniqueId val="{00000011-9893-40B5-B6F1-B6335B3DB3F3}"/>
                 </c:ext>
               </c:extLst>
             </c:dLbl>
@@ -2524,7 +2710,7 @@
               <a:lstStyle/>
               <a:p>
                 <a:pPr>
-                  <a:defRPr sz="1200" b="0" i="0" u="none" strike="noStrike" kern="1200" baseline="0">
+                  <a:defRPr sz="1050" b="0" i="0" u="none" strike="noStrike" kern="1200" baseline="0">
                     <a:solidFill>
                       <a:schemeClr val="tx1">
                         <a:lumMod val="75000"/>
@@ -2568,9 +2754,9 @@
           </c:dLbls>
           <c:cat>
             <c:strRef>
-              <c:f>DataAnalysis!$D$350:$D$375</c:f>
+              <c:f>DataAnalysis!$D$361:$D$387</c:f>
               <c:strCache>
-                <c:ptCount val="17"/>
+                <c:ptCount val="18"/>
                 <c:pt idx="0">
                   <c:v>Alcohol</c:v>
                 </c:pt>
@@ -2611,15 +2797,18 @@
                   <c:v>Smoking</c:v>
                 </c:pt>
                 <c:pt idx="13">
-                  <c:v>COVID Anualized</c:v>
+                  <c:v>Vaccine x10</c:v>
                 </c:pt>
                 <c:pt idx="14">
+                  <c:v>COVID Annualized</c:v>
+                </c:pt>
+                <c:pt idx="15">
                   <c:v>Cancer</c:v>
                 </c:pt>
-                <c:pt idx="15">
+                <c:pt idx="16">
                   <c:v>Cardiovascular disease</c:v>
                 </c:pt>
-                <c:pt idx="16">
+                <c:pt idx="17">
                   <c:v>COVID As Reported</c:v>
                 </c:pt>
               </c:strCache>
@@ -2627,10 +2816,10 @@
           </c:cat>
           <c:val>
             <c:numRef>
-              <c:f>DataAnalysis!$E$350:$E$375</c:f>
+              <c:f>DataAnalysis!$E$361:$E$387</c:f>
               <c:numCache>
                 <c:formatCode>_(* #,##0_);_(* \(#,##0\);_(* "-"??_);_(@_)</c:formatCode>
-                <c:ptCount val="17"/>
+                <c:ptCount val="18"/>
                 <c:pt idx="0">
                   <c:v>32.416792799828997</c:v>
                 </c:pt>
@@ -2670,16 +2859,19 @@
                 <c:pt idx="12">
                   <c:v>756.05502745915203</c:v>
                 </c:pt>
-                <c:pt idx="13">
+                <c:pt idx="13" formatCode="_(* #,##0.0_);_(* \(#,##0.0\);_(* &quot;-&quot;??_);_(@_)">
+                  <c:v>1006.8792466725216</c:v>
+                </c:pt>
+                <c:pt idx="14">
                   <c:v>1222.3638676003236</c:v>
                 </c:pt>
-                <c:pt idx="14">
+                <c:pt idx="15">
                   <c:v>1276.43625515697</c:v>
                 </c:pt>
-                <c:pt idx="15">
+                <c:pt idx="16">
                   <c:v>1510.89491949177</c:v>
                 </c:pt>
-                <c:pt idx="16">
+                <c:pt idx="17">
                   <c:v>2003.7342265009818</c:v>
                 </c:pt>
               </c:numCache>
@@ -2687,7 +2879,7 @@
           </c:val>
           <c:extLst>
             <c:ext xmlns:c16="http://schemas.microsoft.com/office/drawing/2014/chart" uri="{C3380CC4-5D6E-409C-BE32-E72D297353CC}">
-              <c16:uniqueId val="{00000010-8E47-49E4-89CE-D6553BDDB9BE}"/>
+              <c16:uniqueId val="{00000012-9893-40B5-B6F1-B6335B3DB3F3}"/>
             </c:ext>
           </c:extLst>
         </c:ser>
@@ -2733,7 +2925,7 @@
           <a:lstStyle/>
           <a:p>
             <a:pPr>
-              <a:defRPr sz="900" b="0" i="0" u="none" strike="noStrike" kern="1200" baseline="0">
+              <a:defRPr sz="1100" b="0" i="0" u="none" strike="noStrike" kern="1200" baseline="0">
                 <a:solidFill>
                   <a:schemeClr val="tx1">
                     <a:lumMod val="65000"/>
@@ -2768,8 +2960,9 @@
           <c:spPr>
             <a:ln w="9525" cap="flat" cmpd="sng" algn="ctr">
               <a:solidFill>
-                <a:schemeClr val="tx2">
-                  <a:lumMod val="25000"/>
+                <a:schemeClr val="bg1">
+                  <a:lumMod val="75000"/>
+                  <a:lumOff val="25000"/>
                 </a:schemeClr>
               </a:solidFill>
               <a:round/>
@@ -2815,11 +3008,7 @@
       <c:spPr>
         <a:noFill/>
         <a:ln>
-          <a:solidFill>
-            <a:schemeClr val="tx2">
-              <a:lumMod val="25000"/>
-            </a:schemeClr>
-          </a:solidFill>
+          <a:noFill/>
         </a:ln>
         <a:effectLst/>
       </c:spPr>
@@ -2879,7 +3068,7 @@
           <a:lstStyle/>
           <a:p>
             <a:pPr>
-              <a:defRPr sz="2400" b="0" i="0" u="none" strike="noStrike" kern="1200" spc="0" baseline="0">
+              <a:defRPr sz="1800" b="0" i="0" u="none" strike="noStrike" kern="1200" spc="0" baseline="0">
                 <a:solidFill>
                   <a:schemeClr val="tx1">
                     <a:lumMod val="65000"/>
@@ -2892,12 +3081,9 @@
               </a:defRPr>
             </a:pPr>
             <a:r>
-              <a:rPr lang="en-US" sz="2400" b="0" i="0" u="none" strike="noStrike" baseline="0">
-                <a:effectLst/>
-              </a:rPr>
-              <a:t>COVID Deaths  If Treated - Per 1 Million</a:t>
-            </a:r>
-            <a:endParaRPr lang="en-US" sz="2400"/>
+              <a:rPr lang="en-US" sz="1800" dirty="0"/>
+              <a:t>Treatment - Deaths Per Million</a:t>
+            </a:r>
           </a:p>
         </c:rich>
       </c:tx>
@@ -2914,7 +3100,7 @@
         <a:lstStyle/>
         <a:p>
           <a:pPr>
-            <a:defRPr sz="2400" b="0" i="0" u="none" strike="noStrike" kern="1200" spc="0" baseline="0">
+            <a:defRPr sz="1800" b="0" i="0" u="none" strike="noStrike" kern="1200" spc="0" baseline="0">
               <a:solidFill>
                 <a:schemeClr val="tx1">
                   <a:lumMod val="65000"/>
@@ -2942,11 +3128,11 @@
           <c:order val="0"/>
           <c:tx>
             <c:strRef>
-              <c:f>DataAnalysis!$D$41</c:f>
+              <c:f>DataAnalysis!$F$50</c:f>
               <c:strCache>
                 <c:ptCount val="1"/>
                 <c:pt idx="0">
-                  <c:v>Deaths Per 1 Million</c:v>
+                  <c:v>Deaths Per Million</c:v>
                 </c:pt>
               </c:strCache>
             </c:strRef>
@@ -2976,7 +3162,7 @@
             </c:spPr>
             <c:extLst>
               <c:ext xmlns:c16="http://schemas.microsoft.com/office/drawing/2014/chart" uri="{C3380CC4-5D6E-409C-BE32-E72D297353CC}">
-                <c16:uniqueId val="{00000001-735C-4D23-9D49-1F2C0EF1D6A7}"/>
+                <c16:uniqueId val="{00000001-C707-4332-877B-20EB2B006A2D}"/>
               </c:ext>
             </c:extLst>
           </c:dPt>
@@ -2995,7 +3181,7 @@
             </c:spPr>
             <c:extLst>
               <c:ext xmlns:c16="http://schemas.microsoft.com/office/drawing/2014/chart" uri="{C3380CC4-5D6E-409C-BE32-E72D297353CC}">
-                <c16:uniqueId val="{00000003-735C-4D23-9D49-1F2C0EF1D6A7}"/>
+                <c16:uniqueId val="{00000003-C707-4332-877B-20EB2B006A2D}"/>
               </c:ext>
             </c:extLst>
           </c:dPt>
@@ -3014,7 +3200,7 @@
             </c:spPr>
             <c:extLst>
               <c:ext xmlns:c16="http://schemas.microsoft.com/office/drawing/2014/chart" uri="{C3380CC4-5D6E-409C-BE32-E72D297353CC}">
-                <c16:uniqueId val="{00000005-735C-4D23-9D49-1F2C0EF1D6A7}"/>
+                <c16:uniqueId val="{00000005-C707-4332-877B-20EB2B006A2D}"/>
               </c:ext>
             </c:extLst>
           </c:dPt>
@@ -3033,7 +3219,7 @@
               <a:lstStyle/>
               <a:p>
                 <a:pPr>
-                  <a:defRPr sz="1200" b="1" i="0" u="none" strike="noStrike" kern="1200" baseline="0">
+                  <a:defRPr sz="900" b="1" i="0" u="none" strike="noStrike" kern="1200" baseline="0">
                     <a:solidFill>
                       <a:schemeClr val="tx1">
                         <a:lumMod val="75000"/>
@@ -3077,26 +3263,26 @@
           </c:dLbls>
           <c:cat>
             <c:strRef>
-              <c:f>DataAnalysis!$C$42:$C$44</c:f>
+              <c:f>DataAnalysis!$E$51:$E$53</c:f>
               <c:strCache>
                 <c:ptCount val="3"/>
                 <c:pt idx="0">
                   <c:v>COVID Treated</c:v>
                 </c:pt>
                 <c:pt idx="1">
-                  <c:v>COVID Anualized</c:v>
+                  <c:v>COVID Annualized</c:v>
                 </c:pt>
                 <c:pt idx="2">
-                  <c:v>COVID As Reported</c:v>
+                  <c:v>COVID Reported</c:v>
                 </c:pt>
               </c:strCache>
             </c:strRef>
           </c:cat>
           <c:val>
             <c:numRef>
-              <c:f>DataAnalysis!$D$42:$D$44</c:f>
+              <c:f>DataAnalysis!$F$51:$F$53</c:f>
               <c:numCache>
-                <c:formatCode>_(* #,##0.0_);_(* \(#,##0.0\);_(* "-"??_);_(@_)</c:formatCode>
+                <c:formatCode>_(* #,##0_);_(* \(#,##0\);_(* "-"??_);_(@_)</c:formatCode>
                 <c:ptCount val="3"/>
                 <c:pt idx="0">
                   <c:v>183.35458014004848</c:v>
@@ -3112,7 +3298,7 @@
           </c:val>
           <c:extLst>
             <c:ext xmlns:c16="http://schemas.microsoft.com/office/drawing/2014/chart" uri="{C3380CC4-5D6E-409C-BE32-E72D297353CC}">
-              <c16:uniqueId val="{00000006-735C-4D23-9D49-1F2C0EF1D6A7}"/>
+              <c16:uniqueId val="{00000006-C707-4332-877B-20EB2B006A2D}"/>
             </c:ext>
           </c:extLst>
         </c:ser>
@@ -3126,11 +3312,11 @@
         </c:dLbls>
         <c:gapWidth val="219"/>
         <c:overlap val="-27"/>
-        <c:axId val="316428304"/>
-        <c:axId val="316440368"/>
+        <c:axId val="114115279"/>
+        <c:axId val="114116111"/>
       </c:barChart>
       <c:catAx>
-        <c:axId val="316428304"/>
+        <c:axId val="114115279"/>
         <c:scaling>
           <c:orientation val="minMax"/>
         </c:scaling>
@@ -3158,7 +3344,7 @@
           <a:lstStyle/>
           <a:p>
             <a:pPr>
-              <a:defRPr sz="1600" b="1" i="0" u="none" strike="noStrike" kern="1200" baseline="0">
+              <a:defRPr sz="1400" b="1" i="0" u="none" strike="noStrike" kern="1200" baseline="0">
                 <a:solidFill>
                   <a:schemeClr val="tx1">
                     <a:lumMod val="65000"/>
@@ -3173,7 +3359,7 @@
             <a:endParaRPr lang="en-US"/>
           </a:p>
         </c:txPr>
-        <c:crossAx val="316440368"/>
+        <c:crossAx val="114116111"/>
         <c:crosses val="autoZero"/>
         <c:auto val="1"/>
         <c:lblAlgn val="ctr"/>
@@ -3181,9 +3367,11 @@
         <c:noMultiLvlLbl val="0"/>
       </c:catAx>
       <c:valAx>
-        <c:axId val="316440368"/>
+        <c:axId val="114116111"/>
         <c:scaling>
           <c:orientation val="minMax"/>
+          <c:max val="2010"/>
+          <c:min val="0"/>
         </c:scaling>
         <c:delete val="0"/>
         <c:axPos val="l"/>
@@ -3191,8 +3379,8 @@
           <c:spPr>
             <a:ln w="9525" cap="flat" cmpd="sng" algn="ctr">
               <a:solidFill>
-                <a:schemeClr val="tx2">
-                  <a:lumMod val="25000"/>
+                <a:schemeClr val="bg2">
+                  <a:lumMod val="50000"/>
                 </a:schemeClr>
               </a:solidFill>
               <a:round/>
@@ -3200,7 +3388,7 @@
             <a:effectLst/>
           </c:spPr>
         </c:majorGridlines>
-        <c:numFmt formatCode="_(* #,##0.0_);_(* \(#,##0.0\);_(* &quot;-&quot;??_);_(@_)" sourceLinked="1"/>
+        <c:numFmt formatCode="_(* #,##0_);_(* \(#,##0\);_(* &quot;-&quot;??_);_(@_)" sourceLinked="1"/>
         <c:majorTickMark val="none"/>
         <c:minorTickMark val="none"/>
         <c:tickLblPos val="nextTo"/>
@@ -3231,7 +3419,7 @@
             <a:endParaRPr lang="en-US"/>
           </a:p>
         </c:txPr>
-        <c:crossAx val="316428304"/>
+        <c:crossAx val="114115279"/>
         <c:crosses val="autoZero"/>
         <c:crossBetween val="between"/>
       </c:valAx>
@@ -6225,7 +6413,7 @@
           <a:lstStyle/>
           <a:p>
             <a:pPr>
-              <a:defRPr sz="1800" b="0" i="0" u="none" strike="noStrike" kern="1200" spc="0" baseline="0">
+              <a:defRPr sz="1400" b="0" i="0" u="none" strike="noStrike" kern="1200" spc="0" baseline="0">
                 <a:solidFill>
                   <a:schemeClr val="tx1">
                     <a:lumMod val="65000"/>
@@ -6238,15 +6426,15 @@
               </a:defRPr>
             </a:pPr>
             <a:r>
-              <a:rPr lang="en-US" sz="1800"/>
+              <a:rPr lang="en-US"/>
               <a:t>COVID vs COVID</a:t>
             </a:r>
             <a:r>
-              <a:rPr lang="en-US" sz="1800" baseline="0"/>
+              <a:rPr lang="en-US" baseline="0"/>
               <a:t> Vaccine - </a:t>
             </a:r>
             <a:r>
-              <a:rPr lang="en-US" sz="1800"/>
+              <a:rPr lang="en-US"/>
               <a:t>Deaths Per 1 Million</a:t>
             </a:r>
           </a:p>
@@ -6265,7 +6453,7 @@
         <a:lstStyle/>
         <a:p>
           <a:pPr>
-            <a:defRPr sz="1800" b="0" i="0" u="none" strike="noStrike" kern="1200" spc="0" baseline="0">
+            <a:defRPr sz="1400" b="0" i="0" u="none" strike="noStrike" kern="1200" spc="0" baseline="0">
               <a:solidFill>
                 <a:schemeClr val="tx1">
                   <a:lumMod val="65000"/>
@@ -6293,7 +6481,7 @@
           <c:order val="0"/>
           <c:tx>
             <c:strRef>
-              <c:f>DataAnalysis!$D$220</c:f>
+              <c:f>DataAnalysis!$D$231</c:f>
               <c:strCache>
                 <c:ptCount val="1"/>
                 <c:pt idx="0">
@@ -6327,7 +6515,7 @@
             </c:spPr>
             <c:extLst>
               <c:ext xmlns:c16="http://schemas.microsoft.com/office/drawing/2014/chart" uri="{C3380CC4-5D6E-409C-BE32-E72D297353CC}">
-                <c16:uniqueId val="{00000001-97C8-4983-AB04-740EF225EE07}"/>
+                <c16:uniqueId val="{00000001-70F4-4558-BCDE-7FC224B27C3F}"/>
               </c:ext>
             </c:extLst>
           </c:dPt>
@@ -6346,7 +6534,7 @@
             </c:spPr>
             <c:extLst>
               <c:ext xmlns:c16="http://schemas.microsoft.com/office/drawing/2014/chart" uri="{C3380CC4-5D6E-409C-BE32-E72D297353CC}">
-                <c16:uniqueId val="{00000003-97C8-4983-AB04-740EF225EE07}"/>
+                <c16:uniqueId val="{00000003-70F4-4558-BCDE-7FC224B27C3F}"/>
               </c:ext>
             </c:extLst>
           </c:dPt>
@@ -6365,7 +6553,7 @@
             </c:spPr>
             <c:extLst>
               <c:ext xmlns:c16="http://schemas.microsoft.com/office/drawing/2014/chart" uri="{C3380CC4-5D6E-409C-BE32-E72D297353CC}">
-                <c16:uniqueId val="{00000005-97C8-4983-AB04-740EF225EE07}"/>
+                <c16:uniqueId val="{00000005-70F4-4558-BCDE-7FC224B27C3F}"/>
               </c:ext>
             </c:extLst>
           </c:dPt>
@@ -6384,7 +6572,7 @@
             </c:spPr>
             <c:extLst>
               <c:ext xmlns:c16="http://schemas.microsoft.com/office/drawing/2014/chart" uri="{C3380CC4-5D6E-409C-BE32-E72D297353CC}">
-                <c16:uniqueId val="{00000007-97C8-4983-AB04-740EF225EE07}"/>
+                <c16:uniqueId val="{00000007-70F4-4558-BCDE-7FC224B27C3F}"/>
               </c:ext>
             </c:extLst>
           </c:dPt>
@@ -6403,7 +6591,26 @@
             </c:spPr>
             <c:extLst>
               <c:ext xmlns:c16="http://schemas.microsoft.com/office/drawing/2014/chart" uri="{C3380CC4-5D6E-409C-BE32-E72D297353CC}">
-                <c16:uniqueId val="{00000009-97C8-4983-AB04-740EF225EE07}"/>
+                <c16:uniqueId val="{00000009-70F4-4558-BCDE-7FC224B27C3F}"/>
+              </c:ext>
+            </c:extLst>
+          </c:dPt>
+          <c:dPt>
+            <c:idx val="6"/>
+            <c:invertIfNegative val="0"/>
+            <c:bubble3D val="0"/>
+            <c:spPr>
+              <a:solidFill>
+                <a:srgbClr val="FFC000"/>
+              </a:solidFill>
+              <a:ln>
+                <a:noFill/>
+              </a:ln>
+              <a:effectLst/>
+            </c:spPr>
+            <c:extLst>
+              <c:ext xmlns:c16="http://schemas.microsoft.com/office/drawing/2014/chart" uri="{C3380CC4-5D6E-409C-BE32-E72D297353CC}">
+                <c16:uniqueId val="{0000000B-70F4-4558-BCDE-7FC224B27C3F}"/>
               </c:ext>
             </c:extLst>
           </c:dPt>
@@ -6422,7 +6629,7 @@
               <a:lstStyle/>
               <a:p>
                 <a:pPr>
-                  <a:defRPr sz="1400" b="0" i="0" u="none" strike="noStrike" kern="1200" baseline="0">
+                  <a:defRPr sz="900" b="0" i="0" u="none" strike="noStrike" kern="1200" baseline="0">
                     <a:solidFill>
                       <a:schemeClr val="tx1">
                         <a:lumMod val="75000"/>
@@ -6466,9 +6673,9 @@
           </c:dLbls>
           <c:cat>
             <c:strRef>
-              <c:f>DataAnalysis!$C$221:$C$230</c:f>
+              <c:f>DataAnalysis!$C$232:$C$242</c:f>
               <c:strCache>
-                <c:ptCount val="8"/>
+                <c:ptCount val="9"/>
                 <c:pt idx="0">
                   <c:v>COVID Age &lt; 65 Treated</c:v>
                 </c:pt>
@@ -6488,9 +6695,12 @@
                   <c:v>Vaccine x5</c:v>
                 </c:pt>
                 <c:pt idx="6">
-                  <c:v>COVID Anualized</c:v>
+                  <c:v>Vaccine x10</c:v>
                 </c:pt>
                 <c:pt idx="7">
+                  <c:v>COVID Annualized</c:v>
+                </c:pt>
+                <c:pt idx="8">
                   <c:v>COVID As Reported</c:v>
                 </c:pt>
               </c:strCache>
@@ -6498,10 +6708,10 @@
           </c:cat>
           <c:val>
             <c:numRef>
-              <c:f>DataAnalysis!$D$221:$D$230</c:f>
+              <c:f>DataAnalysis!$D$232:$D$242</c:f>
               <c:numCache>
                 <c:formatCode>_(* #,##0_);_(* \(#,##0\);_(* "-"??_);_(@_)</c:formatCode>
-                <c:ptCount val="8"/>
+                <c:ptCount val="9"/>
                 <c:pt idx="0">
                   <c:v>48.361666312641852</c:v>
                 </c:pt>
@@ -6521,9 +6731,12 @@
                   <c:v>503.43962333626081</c:v>
                 </c:pt>
                 <c:pt idx="6">
+                  <c:v>1006.8792466725216</c:v>
+                </c:pt>
+                <c:pt idx="7">
                   <c:v>1222.3638676003236</c:v>
                 </c:pt>
-                <c:pt idx="7">
+                <c:pt idx="8">
                   <c:v>2003.7342265009818</c:v>
                 </c:pt>
               </c:numCache>
@@ -6531,7 +6744,7 @@
           </c:val>
           <c:extLst>
             <c:ext xmlns:c16="http://schemas.microsoft.com/office/drawing/2014/chart" uri="{C3380CC4-5D6E-409C-BE32-E72D297353CC}">
-              <c16:uniqueId val="{0000000A-97C8-4983-AB04-740EF225EE07}"/>
+              <c16:uniqueId val="{0000000C-70F4-4558-BCDE-7FC224B27C3F}"/>
             </c:ext>
           </c:extLst>
         </c:ser>
@@ -6577,7 +6790,7 @@
           <a:lstStyle/>
           <a:p>
             <a:pPr>
-              <a:defRPr sz="1400" b="0" i="0" u="none" strike="noStrike" kern="1200" baseline="0">
+              <a:defRPr sz="1200" b="0" i="0" u="none" strike="noStrike" kern="1200" baseline="0">
                 <a:solidFill>
                   <a:schemeClr val="tx1">
                     <a:lumMod val="65000"/>
@@ -6612,8 +6825,9 @@
           <c:spPr>
             <a:ln w="9525" cap="flat" cmpd="sng" algn="ctr">
               <a:solidFill>
-                <a:schemeClr val="tx2">
-                  <a:lumMod val="25000"/>
+                <a:schemeClr val="bg1">
+                  <a:lumMod val="75000"/>
+                  <a:lumOff val="25000"/>
                 </a:schemeClr>
               </a:solidFill>
               <a:round/>
@@ -13345,7 +13559,7 @@
           <a:p>
             <a:fld id="{040A9F85-DB90-4103-AF81-7F368867726C}" type="datetimeFigureOut">
               <a:rPr lang="en-US" smtClean="0"/>
-              <a:t>9/17/2021</a:t>
+              <a:t>9/18/2021</a:t>
             </a:fld>
             <a:endParaRPr lang="en-US"/>
           </a:p>
@@ -13518,7 +13732,7 @@
           <a:p>
             <a:fld id="{040A9F85-DB90-4103-AF81-7F368867726C}" type="datetimeFigureOut">
               <a:rPr lang="en-US" smtClean="0"/>
-              <a:t>9/17/2021</a:t>
+              <a:t>9/18/2021</a:t>
             </a:fld>
             <a:endParaRPr lang="en-US"/>
           </a:p>
@@ -13701,7 +13915,7 @@
           <a:p>
             <a:fld id="{040A9F85-DB90-4103-AF81-7F368867726C}" type="datetimeFigureOut">
               <a:rPr lang="en-US" smtClean="0"/>
-              <a:t>9/17/2021</a:t>
+              <a:t>9/18/2021</a:t>
             </a:fld>
             <a:endParaRPr lang="en-US"/>
           </a:p>
@@ -13874,7 +14088,7 @@
           <a:p>
             <a:fld id="{040A9F85-DB90-4103-AF81-7F368867726C}" type="datetimeFigureOut">
               <a:rPr lang="en-US" smtClean="0"/>
-              <a:t>9/17/2021</a:t>
+              <a:t>9/18/2021</a:t>
             </a:fld>
             <a:endParaRPr lang="en-US"/>
           </a:p>
@@ -14123,7 +14337,7 @@
           <a:p>
             <a:fld id="{040A9F85-DB90-4103-AF81-7F368867726C}" type="datetimeFigureOut">
               <a:rPr lang="en-US" smtClean="0"/>
-              <a:t>9/17/2021</a:t>
+              <a:t>9/18/2021</a:t>
             </a:fld>
             <a:endParaRPr lang="en-US"/>
           </a:p>
@@ -14358,7 +14572,7 @@
           <a:p>
             <a:fld id="{040A9F85-DB90-4103-AF81-7F368867726C}" type="datetimeFigureOut">
               <a:rPr lang="en-US" smtClean="0"/>
-              <a:t>9/17/2021</a:t>
+              <a:t>9/18/2021</a:t>
             </a:fld>
             <a:endParaRPr lang="en-US"/>
           </a:p>
@@ -14728,7 +14942,7 @@
           <a:p>
             <a:fld id="{040A9F85-DB90-4103-AF81-7F368867726C}" type="datetimeFigureOut">
               <a:rPr lang="en-US" smtClean="0"/>
-              <a:t>9/17/2021</a:t>
+              <a:t>9/18/2021</a:t>
             </a:fld>
             <a:endParaRPr lang="en-US"/>
           </a:p>
@@ -14849,7 +15063,7 @@
           <a:p>
             <a:fld id="{040A9F85-DB90-4103-AF81-7F368867726C}" type="datetimeFigureOut">
               <a:rPr lang="en-US" smtClean="0"/>
-              <a:t>9/17/2021</a:t>
+              <a:t>9/18/2021</a:t>
             </a:fld>
             <a:endParaRPr lang="en-US"/>
           </a:p>
@@ -15213,7 +15427,7 @@
           <a:p>
             <a:fld id="{040A9F85-DB90-4103-AF81-7F368867726C}" type="datetimeFigureOut">
               <a:rPr lang="en-US" smtClean="0"/>
-              <a:t>9/17/2021</a:t>
+              <a:t>9/18/2021</a:t>
             </a:fld>
             <a:endParaRPr lang="en-US"/>
           </a:p>
@@ -15473,7 +15687,7 @@
           <a:p>
             <a:fld id="{040A9F85-DB90-4103-AF81-7F368867726C}" type="datetimeFigureOut">
               <a:rPr lang="en-US" smtClean="0"/>
-              <a:t>9/17/2021</a:t>
+              <a:t>9/18/2021</a:t>
             </a:fld>
             <a:endParaRPr lang="en-US"/>
           </a:p>
@@ -15689,7 +15903,7 @@
           <a:p>
             <a:fld id="{040A9F85-DB90-4103-AF81-7F368867726C}" type="datetimeFigureOut">
               <a:rPr lang="en-US" smtClean="0"/>
-              <a:t>9/17/2021</a:t>
+              <a:t>9/18/2021</a:t>
             </a:fld>
             <a:endParaRPr lang="en-US"/>
           </a:p>
@@ -16702,10 +16916,10 @@
       </p:grpSpPr>
       <p:graphicFrame>
         <p:nvGraphicFramePr>
-          <p:cNvPr id="3" name="Chart 2">
+          <p:cNvPr id="4" name="Chart 3">
             <a:extLst>
               <a:ext uri="{FF2B5EF4-FFF2-40B4-BE49-F238E27FC236}">
-                <a16:creationId xmlns:a16="http://schemas.microsoft.com/office/drawing/2014/main" id="{8C04D2F5-82F5-42AD-ABB3-A4A7ED586217}"/>
+                <a16:creationId xmlns:a16="http://schemas.microsoft.com/office/drawing/2014/main" id="{4E57F2B4-AEE0-4A92-A401-5029EEFB0861}"/>
               </a:ext>
             </a:extLst>
           </p:cNvPr>
@@ -16715,7 +16929,7 @@
           <p:nvPr>
             <p:extLst>
               <p:ext uri="{D42A27DB-BD31-4B8C-83A1-F6EECF244321}">
-                <p14:modId xmlns:p14="http://schemas.microsoft.com/office/powerpoint/2010/main" val="1987303637"/>
+                <p14:modId xmlns:p14="http://schemas.microsoft.com/office/powerpoint/2010/main" val="1903822226"/>
               </p:ext>
             </p:extLst>
           </p:nvPr>
@@ -18181,10 +18395,10 @@
       </p:sp>
       <p:graphicFrame>
         <p:nvGraphicFramePr>
-          <p:cNvPr id="6" name="Chart 5">
+          <p:cNvPr id="4" name="Chart 3">
             <a:extLst>
               <a:ext uri="{FF2B5EF4-FFF2-40B4-BE49-F238E27FC236}">
-                <a16:creationId xmlns:a16="http://schemas.microsoft.com/office/drawing/2014/main" id="{8C04D2F5-82F5-42AD-ABB3-A4A7ED586217}"/>
+                <a16:creationId xmlns:a16="http://schemas.microsoft.com/office/drawing/2014/main" id="{DD63491B-1CE0-4CC0-8560-10A51B04CB97}"/>
               </a:ext>
             </a:extLst>
           </p:cNvPr>
@@ -18194,14 +18408,14 @@
           <p:nvPr>
             <p:extLst>
               <p:ext uri="{D42A27DB-BD31-4B8C-83A1-F6EECF244321}">
-                <p14:modId xmlns:p14="http://schemas.microsoft.com/office/powerpoint/2010/main" val="3582685509"/>
+                <p14:modId xmlns:p14="http://schemas.microsoft.com/office/powerpoint/2010/main" val="4019128161"/>
               </p:ext>
             </p:extLst>
           </p:nvPr>
         </p:nvGraphicFramePr>
         <p:xfrm>
-          <a:off x="0" y="0"/>
-          <a:ext cx="7315198" cy="4572000"/>
+          <a:off x="-1" y="0"/>
+          <a:ext cx="7315199" cy="4572000"/>
         </p:xfrm>
         <a:graphic>
           <a:graphicData uri="http://schemas.openxmlformats.org/drawingml/2006/chart">
@@ -20550,7 +20764,7 @@
         </p:spPr>
         <p:txBody>
           <a:bodyPr wrap="square" anchor="ctr">
-            <a:normAutofit fontScale="92500" lnSpcReduction="20000"/>
+            <a:normAutofit fontScale="85000" lnSpcReduction="10000"/>
           </a:bodyPr>
           <a:lstStyle/>
           <a:p>
@@ -20571,7 +20785,7 @@
               <a:rPr lang="en-US" sz="3200" dirty="0"/>
             </a:br>
             <a:br>
-              <a:rPr lang="en-US" sz="3200" dirty="0"/>
+              <a:rPr lang="en-US" sz="1200" dirty="0"/>
             </a:br>
             <a:r>
               <a:rPr lang="en-US" sz="2600" i="1" dirty="0"/>
@@ -20580,7 +20794,7 @@
             <a:br>
               <a:rPr lang="en-US" sz="2600" i="1" dirty="0"/>
             </a:br>
-            <a:endParaRPr lang="en-US" sz="2600" i="1" dirty="0"/>
+            <a:endParaRPr lang="en-US" sz="1700" i="1" dirty="0"/>
           </a:p>
           <a:p>
             <a:pPr marL="571500" indent="-571500">
@@ -20620,37 +20834,6 @@
               <a:buChar char="•"/>
             </a:pPr>
             <a:r>
-              <a:rPr lang="en-US" sz="1600" b="0" i="0" dirty="0">
-                <a:effectLst/>
-                <a:latin typeface="catamaran"/>
-              </a:rPr>
-              <a:t>Dr. James says the research says VAERS captures, at best, 1-10% at most of the actual complications, and that Doctors are pressured not to report in VAERS</a:t>
-            </a:r>
-            <a:br>
-              <a:rPr lang="en-US" sz="1600" b="0" i="0" dirty="0">
-                <a:effectLst/>
-                <a:latin typeface="catamaran"/>
-              </a:rPr>
-            </a:br>
-            <a:r>
-              <a:rPr lang="en-US" sz="800" b="0" i="0" dirty="0">
-                <a:effectLst/>
-                <a:latin typeface="catamaran"/>
-                <a:hlinkClick r:id="rId2"/>
-              </a:rPr>
-              <a:t>https://www.thegatewaypundit.com/2021/09/covid-whistleblower-wu-flu-fraud-vaers-reporting-database-tracking-vaccine-complications-wrong-factor-100/</a:t>
-            </a:r>
-            <a:endParaRPr lang="en-US" sz="800" b="0" i="0" dirty="0">
-              <a:effectLst/>
-              <a:latin typeface="catamaran"/>
-            </a:endParaRPr>
-          </a:p>
-          <a:p>
-            <a:pPr marL="571500" indent="-571500">
-              <a:buFont typeface="Arial" panose="020B0604020202020204" pitchFamily="34" charset="0"/>
-              <a:buChar char="•"/>
-            </a:pPr>
-            <a:r>
               <a:rPr lang="en-US" sz="1700" dirty="0"/>
               <a:t>Whistle-blowers from inside the CDC have filed sworn affidavits stating:</a:t>
             </a:r>
@@ -20659,27 +20842,27 @@
               <a:t> </a:t>
             </a:r>
             <a:r>
-              <a:rPr lang="en-US" sz="2200" i="1" dirty="0"/>
+              <a:rPr lang="en-US" sz="1900" i="1" dirty="0"/>
               <a:t>“</a:t>
             </a:r>
             <a:r>
-              <a:rPr lang="en-US" sz="3000" i="1" dirty="0"/>
+              <a:rPr lang="en-US" sz="2600" i="1" dirty="0"/>
               <a:t>…</a:t>
             </a:r>
             <a:r>
-              <a:rPr lang="en-US" sz="1900" i="1" dirty="0"/>
+              <a:rPr lang="en-US" sz="1700" i="1" dirty="0"/>
               <a:t>deaths occurring within 3 days of vaccination </a:t>
             </a:r>
             <a:r>
-              <a:rPr lang="en-US" sz="1900" i="1" u="sng" dirty="0"/>
+              <a:rPr lang="en-US" sz="1700" i="1" u="sng" dirty="0"/>
               <a:t>are higher</a:t>
             </a:r>
             <a:r>
-              <a:rPr lang="en-US" sz="1900" i="1" dirty="0"/>
+              <a:rPr lang="en-US" sz="1700" i="1" dirty="0"/>
               <a:t> than those reported in VAERS </a:t>
             </a:r>
             <a:r>
-              <a:rPr lang="en-US" sz="1900" i="1" u="sng" dirty="0">
+              <a:rPr lang="en-US" sz="1700" i="1" u="sng" dirty="0">
                 <a:solidFill>
                   <a:srgbClr val="FF0000"/>
                 </a:solidFill>
@@ -20687,23 +20870,74 @@
               <a:t>by a factor of at least 5</a:t>
             </a:r>
             <a:r>
-              <a:rPr lang="en-US" sz="1900" i="1" u="sng" dirty="0"/>
+              <a:rPr lang="en-US" sz="1700" i="1" u="sng" dirty="0"/>
               <a:t>.</a:t>
             </a:r>
             <a:r>
-              <a:rPr lang="en-US" sz="2200" i="1" dirty="0"/>
+              <a:rPr lang="en-US" sz="1900" i="1" dirty="0"/>
               <a:t>”</a:t>
             </a:r>
             <a:br>
-              <a:rPr lang="en-US" sz="2200" dirty="0"/>
+              <a:rPr lang="en-US" sz="1900" dirty="0"/>
             </a:br>
             <a:r>
               <a:rPr lang="en-US" sz="1000" dirty="0"/>
               <a:t>Page 41 of Case 2:21-cv-00702-CLM   filed 2021 Jul-19  in U.S. DISTRICT COURT N.D. OF ALABAMA</a:t>
             </a:r>
+          </a:p>
+          <a:p>
+            <a:pPr marL="571500" indent="-571500">
+              <a:buFont typeface="Arial" panose="020B0604020202020204" pitchFamily="34" charset="0"/>
+              <a:buChar char="•"/>
+            </a:pPr>
+            <a:r>
+              <a:rPr lang="en-US" sz="1900" dirty="0"/>
+              <a:t>One thorough analysis </a:t>
+            </a:r>
+            <a:r>
+              <a:rPr lang="en-US" sz="3600" dirty="0"/>
+              <a:t> </a:t>
+            </a:r>
+            <a:r>
+              <a:rPr lang="en-US" sz="1200" dirty="0"/>
+              <a:t>(offering a $1M bounty if proven wrong)</a:t>
+            </a:r>
+            <a:r>
+              <a:rPr lang="en-US" sz="3600" dirty="0"/>
+              <a:t> </a:t>
+            </a:r>
+            <a:r>
+              <a:rPr lang="en-US" sz="1900" dirty="0"/>
+              <a:t>validated by 5 external data points puts estimates of excess COVID Vaccine deaths at 150,000.</a:t>
+            </a:r>
             <a:br>
-              <a:rPr lang="en-US" sz="1000" dirty="0"/>
+              <a:rPr lang="en-US" sz="1900" dirty="0"/>
             </a:br>
+            <a:r>
+              <a:rPr lang="en-US" sz="1900" dirty="0"/>
+              <a:t>… </a:t>
+            </a:r>
+            <a:r>
+              <a:rPr lang="en-US" sz="1900" dirty="0">
+                <a:solidFill>
+                  <a:srgbClr val="FF0000"/>
+                </a:solidFill>
+              </a:rPr>
+              <a:t>10x the VAERS numbers.   </a:t>
+            </a:r>
+            <a:r>
+              <a:rPr lang="en-US" sz="1000" dirty="0">
+                <a:hlinkClick r:id="rId2"/>
+              </a:rPr>
+              <a:t>https://www.skirsch.com/covid/Deaths.pdf</a:t>
+            </a:r>
+            <a:endParaRPr lang="en-US" sz="1000" dirty="0"/>
+          </a:p>
+          <a:p>
+            <a:pPr marL="571500" indent="-571500">
+              <a:buFont typeface="Arial" panose="020B0604020202020204" pitchFamily="34" charset="0"/>
+              <a:buChar char="•"/>
+            </a:pPr>
             <a:br>
               <a:rPr lang="en-US" sz="1500" dirty="0"/>
             </a:br>
@@ -20718,6 +20952,18 @@
                 </a:solidFill>
               </a:rPr>
               <a:t>5X</a:t>
+            </a:r>
+            <a:r>
+              <a:rPr lang="en-US" sz="2200" dirty="0"/>
+              <a:t> &amp; </a:t>
+            </a:r>
+            <a:r>
+              <a:rPr lang="en-US" sz="2200" dirty="0">
+                <a:solidFill>
+                  <a:srgbClr val="FF0000"/>
+                </a:solidFill>
+              </a:rPr>
+              <a:t>10X</a:t>
             </a:r>
             <a:r>
               <a:rPr lang="en-US" sz="2200" dirty="0"/>
@@ -20805,7 +21051,7 @@
         <p:spPr>
           <a:xfrm>
             <a:off x="3467581" y="-59220"/>
-            <a:ext cx="3625801" cy="4793620"/>
+            <a:ext cx="3625801" cy="4885953"/>
           </a:xfrm>
           <a:prstGeom prst="rect">
             <a:avLst/>
@@ -20866,53 +21112,150 @@
             <a:br>
               <a:rPr lang="en-US" sz="3200" b="1" dirty="0"/>
             </a:br>
-            <a:r>
-              <a:rPr lang="en-US" sz="1200" b="1" dirty="0"/>
-              <a:t>[~ 50 per day]</a:t>
+            <a:endParaRPr lang="en-US" sz="3200" b="1" dirty="0"/>
+          </a:p>
+          <a:p>
+            <a:pPr algn="ctr"/>
+            <a:endParaRPr lang="en-US" sz="2000" b="1" dirty="0"/>
+          </a:p>
+          <a:p>
+            <a:pPr algn="ctr"/>
+            <a:endParaRPr lang="en-US" sz="3200" b="1" dirty="0"/>
+          </a:p>
+          <a:p>
+            <a:pPr algn="ctr"/>
+            <a:endParaRPr lang="en-US" sz="500" b="1" dirty="0"/>
+          </a:p>
+          <a:p>
+            <a:pPr algn="ctr"/>
+            <a:r>
+              <a:rPr lang="en-US" sz="2400" dirty="0"/>
+              <a:t>Population fully vaccinated:</a:t>
+            </a:r>
+          </a:p>
+          <a:p>
+            <a:pPr algn="ctr"/>
+            <a:r>
+              <a:rPr lang="en-US" sz="3200" b="1" dirty="0"/>
+              <a:t>180 M</a:t>
+            </a:r>
+          </a:p>
+        </p:txBody>
+      </p:sp>
+      <p:sp>
+        <p:nvSpPr>
+          <p:cNvPr id="2" name="TextBox 1">
+            <a:extLst>
+              <a:ext uri="{FF2B5EF4-FFF2-40B4-BE49-F238E27FC236}">
+                <a16:creationId xmlns:a16="http://schemas.microsoft.com/office/drawing/2014/main" id="{5B3A2141-F3BC-4376-B1DB-71103E6B9132}"/>
+              </a:ext>
+            </a:extLst>
+          </p:cNvPr>
+          <p:cNvSpPr txBox="1"/>
+          <p:nvPr/>
+        </p:nvSpPr>
+        <p:spPr>
+          <a:xfrm>
+            <a:off x="3744682" y="2286000"/>
+            <a:ext cx="1332416" cy="1569660"/>
+          </a:xfrm>
+          <a:prstGeom prst="rect">
+            <a:avLst/>
+          </a:prstGeom>
+          <a:noFill/>
+        </p:spPr>
+        <p:txBody>
+          <a:bodyPr wrap="none" rtlCol="0">
+            <a:spAutoFit/>
+          </a:bodyPr>
+          <a:lstStyle/>
+          <a:p>
+            <a:pPr algn="ctr"/>
+            <a:r>
+              <a:rPr lang="en-US" sz="3200" dirty="0">
+                <a:solidFill>
+                  <a:srgbClr val="FF0000"/>
+                </a:solidFill>
+              </a:rPr>
+              <a:t>5x: </a:t>
             </a:r>
             <a:br>
-              <a:rPr lang="en-US" sz="2400" b="1" dirty="0"/>
-            </a:br>
-            <a:endParaRPr lang="en-US" sz="200" b="1" dirty="0"/>
-          </a:p>
-          <a:p>
-            <a:pPr algn="ctr"/>
-            <a:r>
-              <a:rPr lang="en-US" sz="2400" dirty="0"/>
-              <a:t>Whistle Blower x5: </a:t>
-            </a:r>
-            <a:br>
-              <a:rPr lang="en-US" sz="2400" dirty="0"/>
+              <a:rPr lang="en-US" sz="3200" dirty="0"/>
             </a:br>
             <a:r>
               <a:rPr lang="en-US" sz="3200" b="1" dirty="0"/>
               <a:t>90,662</a:t>
+            </a:r>
+            <a:br>
+              <a:rPr lang="en-US" sz="4000" b="1" dirty="0"/>
+            </a:br>
+            <a:r>
+              <a:rPr lang="en-US" sz="1200" b="1" dirty="0"/>
+              <a:t>[~ 250 per day]</a:t>
+            </a:r>
+            <a:endParaRPr lang="en-US" sz="1800" b="1" dirty="0"/>
+          </a:p>
+          <a:p>
+            <a:pPr algn="ctr"/>
+            <a:endParaRPr lang="en-US" dirty="0"/>
+          </a:p>
+        </p:txBody>
+      </p:sp>
+      <p:sp>
+        <p:nvSpPr>
+          <p:cNvPr id="6" name="TextBox 5">
+            <a:extLst>
+              <a:ext uri="{FF2B5EF4-FFF2-40B4-BE49-F238E27FC236}">
+                <a16:creationId xmlns:a16="http://schemas.microsoft.com/office/drawing/2014/main" id="{7736310A-F6F5-45D5-A69F-DEA894166572}"/>
+              </a:ext>
+            </a:extLst>
+          </p:cNvPr>
+          <p:cNvSpPr txBox="1"/>
+          <p:nvPr/>
+        </p:nvSpPr>
+        <p:spPr>
+          <a:xfrm>
+            <a:off x="5446796" y="2286000"/>
+            <a:ext cx="1540806" cy="1538883"/>
+          </a:xfrm>
+          <a:prstGeom prst="rect">
+            <a:avLst/>
+          </a:prstGeom>
+          <a:noFill/>
+        </p:spPr>
+        <p:txBody>
+          <a:bodyPr wrap="none" rtlCol="0">
+            <a:spAutoFit/>
+          </a:bodyPr>
+          <a:lstStyle/>
+          <a:p>
+            <a:pPr algn="ctr"/>
+            <a:r>
+              <a:rPr lang="en-US" sz="3200" dirty="0">
+                <a:solidFill>
+                  <a:srgbClr val="FF0000"/>
+                </a:solidFill>
+              </a:rPr>
+              <a:t>10x: </a:t>
+            </a:r>
+            <a:br>
+              <a:rPr lang="en-US" sz="3200" dirty="0"/>
+            </a:br>
+            <a:r>
+              <a:rPr lang="en-US" sz="3200" b="1" dirty="0"/>
+              <a:t>181,330</a:t>
             </a:r>
             <a:br>
               <a:rPr lang="en-US" sz="3200" b="1" dirty="0"/>
             </a:br>
             <a:r>
-              <a:rPr lang="en-US" sz="1400" b="1" dirty="0"/>
-              <a:t>[~ 250 per day]</a:t>
+              <a:rPr lang="en-US" sz="1200" b="1" dirty="0"/>
+              <a:t>[~ 500 per day]</a:t>
             </a:r>
           </a:p>
           <a:p>
             <a:pPr algn="ctr"/>
-            <a:endParaRPr lang="en-US" sz="500" b="1" dirty="0"/>
-          </a:p>
-          <a:p>
-            <a:pPr algn="ctr"/>
-            <a:r>
-              <a:rPr lang="en-US" sz="2400" dirty="0"/>
-              <a:t>Population fully vaccinated:</a:t>
-            </a:r>
-          </a:p>
-          <a:p>
-            <a:pPr algn="ctr"/>
-            <a:r>
-              <a:rPr lang="en-US" sz="3200" b="1" dirty="0"/>
-              <a:t>180 M</a:t>
-            </a:r>
+            <a:endParaRPr lang="en-US" dirty="0"/>
           </a:p>
         </p:txBody>
       </p:sp>
@@ -20949,36 +21292,6 @@
           <a:chExt cx="0" cy="0"/>
         </a:xfrm>
       </p:grpSpPr>
-      <p:graphicFrame>
-        <p:nvGraphicFramePr>
-          <p:cNvPr id="4" name="Chart 3">
-            <a:extLst>
-              <a:ext uri="{FF2B5EF4-FFF2-40B4-BE49-F238E27FC236}">
-                <a16:creationId xmlns:a16="http://schemas.microsoft.com/office/drawing/2014/main" id="{90DA82AD-AA24-4D1F-B875-B7423F23D82F}"/>
-              </a:ext>
-            </a:extLst>
-          </p:cNvPr>
-          <p:cNvGraphicFramePr>
-            <a:graphicFrameLocks/>
-          </p:cNvGraphicFramePr>
-          <p:nvPr>
-            <p:extLst>
-              <p:ext uri="{D42A27DB-BD31-4B8C-83A1-F6EECF244321}">
-                <p14:modId xmlns:p14="http://schemas.microsoft.com/office/powerpoint/2010/main" val="2126574013"/>
-              </p:ext>
-            </p:extLst>
-          </p:nvPr>
-        </p:nvGraphicFramePr>
-        <p:xfrm>
-          <a:off x="1" y="0"/>
-          <a:ext cx="7315200" cy="4571999"/>
-        </p:xfrm>
-        <a:graphic>
-          <a:graphicData uri="http://schemas.openxmlformats.org/drawingml/2006/chart">
-            <c:chart xmlns:c="http://schemas.openxmlformats.org/drawingml/2006/chart" xmlns:r="http://schemas.openxmlformats.org/officeDocument/2006/relationships" r:id="rId2"/>
-          </a:graphicData>
-        </a:graphic>
-      </p:graphicFrame>
       <p:cxnSp>
         <p:nvCxnSpPr>
           <p:cNvPr id="5" name="Straight Connector 4">
@@ -20995,7 +21308,7 @@
         </p:nvCxnSpPr>
         <p:spPr>
           <a:xfrm>
-            <a:off x="510540" y="3566160"/>
+            <a:off x="510540" y="3658756"/>
             <a:ext cx="6682740" cy="0"/>
           </a:xfrm>
           <a:prstGeom prst="line">
@@ -21036,7 +21349,78 @@
         </p:nvCxnSpPr>
         <p:spPr>
           <a:xfrm>
-            <a:off x="518160" y="2918460"/>
+            <a:off x="518160" y="2987907"/>
+            <a:ext cx="6682740" cy="0"/>
+          </a:xfrm>
+          <a:prstGeom prst="line">
+            <a:avLst/>
+          </a:prstGeom>
+          <a:ln w="12700">
+            <a:prstDash val="dash"/>
+          </a:ln>
+        </p:spPr>
+        <p:style>
+          <a:lnRef idx="1">
+            <a:schemeClr val="accent4"/>
+          </a:lnRef>
+          <a:fillRef idx="0">
+            <a:schemeClr val="accent4"/>
+          </a:fillRef>
+          <a:effectRef idx="0">
+            <a:schemeClr val="accent4"/>
+          </a:effectRef>
+          <a:fontRef idx="minor">
+            <a:schemeClr val="tx1"/>
+          </a:fontRef>
+        </p:style>
+      </p:cxnSp>
+      <p:graphicFrame>
+        <p:nvGraphicFramePr>
+          <p:cNvPr id="7" name="Chart 6">
+            <a:extLst>
+              <a:ext uri="{FF2B5EF4-FFF2-40B4-BE49-F238E27FC236}">
+                <a16:creationId xmlns:a16="http://schemas.microsoft.com/office/drawing/2014/main" id="{90DA82AD-AA24-4D1F-B875-B7423F23D82F}"/>
+              </a:ext>
+            </a:extLst>
+          </p:cNvPr>
+          <p:cNvGraphicFramePr>
+            <a:graphicFrameLocks/>
+          </p:cNvGraphicFramePr>
+          <p:nvPr>
+            <p:extLst>
+              <p:ext uri="{D42A27DB-BD31-4B8C-83A1-F6EECF244321}">
+                <p14:modId xmlns:p14="http://schemas.microsoft.com/office/powerpoint/2010/main" val="492213737"/>
+              </p:ext>
+            </p:extLst>
+          </p:nvPr>
+        </p:nvGraphicFramePr>
+        <p:xfrm>
+          <a:off x="1" y="0"/>
+          <a:ext cx="7315200" cy="4571999"/>
+        </p:xfrm>
+        <a:graphic>
+          <a:graphicData uri="http://schemas.openxmlformats.org/drawingml/2006/chart">
+            <c:chart xmlns:c="http://schemas.openxmlformats.org/drawingml/2006/chart" xmlns:r="http://schemas.openxmlformats.org/officeDocument/2006/relationships" r:id="rId2"/>
+          </a:graphicData>
+        </a:graphic>
+      </p:graphicFrame>
+      <p:cxnSp>
+        <p:nvCxnSpPr>
+          <p:cNvPr id="8" name="Straight Connector 7">
+            <a:extLst>
+              <a:ext uri="{FF2B5EF4-FFF2-40B4-BE49-F238E27FC236}">
+                <a16:creationId xmlns:a16="http://schemas.microsoft.com/office/drawing/2014/main" id="{B8339D62-BEEB-4A0F-ADBA-EE84BD50EC86}"/>
+              </a:ext>
+            </a:extLst>
+          </p:cNvPr>
+          <p:cNvCxnSpPr>
+            <a:cxnSpLocks/>
+          </p:cNvCxnSpPr>
+          <p:nvPr/>
+        </p:nvCxnSpPr>
+        <p:spPr>
+          <a:xfrm>
+            <a:off x="473788" y="2139097"/>
             <a:ext cx="6682740" cy="0"/>
           </a:xfrm>
           <a:prstGeom prst="line">
@@ -21108,8 +21492,8 @@
         </p:nvSpPr>
         <p:spPr>
           <a:xfrm>
-            <a:off x="5885858" y="3194484"/>
-            <a:ext cx="1345522" cy="1187016"/>
+            <a:off x="5425440" y="3194484"/>
+            <a:ext cx="1805940" cy="1187016"/>
           </a:xfrm>
           <a:prstGeom prst="roundRect">
             <a:avLst/>
@@ -21202,7 +21586,7 @@
       </p:sp>
       <p:graphicFrame>
         <p:nvGraphicFramePr>
-          <p:cNvPr id="8" name="Chart 7">
+          <p:cNvPr id="6" name="Chart 5">
             <a:extLst>
               <a:ext uri="{FF2B5EF4-FFF2-40B4-BE49-F238E27FC236}">
                 <a16:creationId xmlns:a16="http://schemas.microsoft.com/office/drawing/2014/main" id="{8E6B7211-A27C-4F91-B476-BF316488F4F5}"/>
@@ -21215,7 +21599,7 @@
           <p:nvPr>
             <p:extLst>
               <p:ext uri="{D42A27DB-BD31-4B8C-83A1-F6EECF244321}">
-                <p14:modId xmlns:p14="http://schemas.microsoft.com/office/powerpoint/2010/main" val="2836442343"/>
+                <p14:modId xmlns:p14="http://schemas.microsoft.com/office/powerpoint/2010/main" val="1599513995"/>
               </p:ext>
             </p:extLst>
           </p:nvPr>
@@ -21301,7 +21685,18 @@
             </a:br>
             <a:r>
               <a:rPr lang="en-US" sz="3600" u="sng" dirty="0"/>
-              <a:t>Those over the age of 65 have a significantly higher risk of dying from COVID than from the COVID Vaccine.</a:t>
+              <a:t>Those over the age of 50 have a significantly higher risk of dying from COVID than from the COVID Vaccine.</a:t>
+            </a:r>
+            <a:br>
+              <a:rPr lang="en-US" sz="3600" u="sng" dirty="0"/>
+            </a:br>
+            <a:r>
+              <a:rPr lang="en-US" sz="3600" u="sng" dirty="0"/>
+              <a:t>(</a:t>
+            </a:r>
+            <a:r>
+              <a:rPr lang="en-US" sz="3600" dirty="0"/>
+              <a:t>If they do not seek early treatment)</a:t>
             </a:r>
           </a:p>
           <a:p>
@@ -21358,6 +21753,47 @@
           <a:chExt cx="0" cy="0"/>
         </a:xfrm>
       </p:grpSpPr>
+      <p:cxnSp>
+        <p:nvCxnSpPr>
+          <p:cNvPr id="7" name="Straight Connector 6">
+            <a:extLst>
+              <a:ext uri="{FF2B5EF4-FFF2-40B4-BE49-F238E27FC236}">
+                <a16:creationId xmlns:a16="http://schemas.microsoft.com/office/drawing/2014/main" id="{D8D0F3FA-62AC-4298-8FE7-8C11E335FC4C}"/>
+              </a:ext>
+            </a:extLst>
+          </p:cNvPr>
+          <p:cNvCxnSpPr>
+            <a:cxnSpLocks/>
+          </p:cNvCxnSpPr>
+          <p:nvPr/>
+        </p:nvCxnSpPr>
+        <p:spPr>
+          <a:xfrm>
+            <a:off x="518160" y="762492"/>
+            <a:ext cx="6682740" cy="0"/>
+          </a:xfrm>
+          <a:prstGeom prst="line">
+            <a:avLst/>
+          </a:prstGeom>
+          <a:ln w="12700">
+            <a:prstDash val="dash"/>
+          </a:ln>
+        </p:spPr>
+        <p:style>
+          <a:lnRef idx="1">
+            <a:schemeClr val="accent4"/>
+          </a:lnRef>
+          <a:fillRef idx="0">
+            <a:schemeClr val="accent4"/>
+          </a:fillRef>
+          <a:effectRef idx="0">
+            <a:schemeClr val="accent4"/>
+          </a:effectRef>
+          <a:fontRef idx="minor">
+            <a:schemeClr val="tx1"/>
+          </a:fontRef>
+        </p:style>
+      </p:cxnSp>
       <p:cxnSp>
         <p:nvCxnSpPr>
           <p:cNvPr id="4" name="Straight Connector 3">
@@ -21442,7 +21878,7 @@
       </p:cxnSp>
       <p:graphicFrame>
         <p:nvGraphicFramePr>
-          <p:cNvPr id="6" name="Chart 5">
+          <p:cNvPr id="5" name="Chart 4">
             <a:extLst>
               <a:ext uri="{FF2B5EF4-FFF2-40B4-BE49-F238E27FC236}">
                 <a16:creationId xmlns:a16="http://schemas.microsoft.com/office/drawing/2014/main" id="{47B2EED2-DE99-4871-9785-D80E0D21C0DB}"/>
@@ -21455,7 +21891,7 @@
           <p:nvPr>
             <p:extLst>
               <p:ext uri="{D42A27DB-BD31-4B8C-83A1-F6EECF244321}">
-                <p14:modId xmlns:p14="http://schemas.microsoft.com/office/powerpoint/2010/main" val="3101387428"/>
+                <p14:modId xmlns:p14="http://schemas.microsoft.com/office/powerpoint/2010/main" val="1660411634"/>
               </p:ext>
             </p:extLst>
           </p:nvPr>
@@ -21738,7 +22174,7 @@
             <a:pPr algn="ctr"/>
             <a:r>
               <a:rPr lang="en-US" sz="3600" u="sng" dirty="0"/>
-              <a:t>If the whistle-blower(s) are accurate:</a:t>
+              <a:t>If the 5x Estimate is accurate:</a:t>
             </a:r>
             <a:br>
               <a:rPr lang="en-US" sz="3600" u="sng" dirty="0"/>
@@ -21949,7 +22385,7 @@
         </p:nvSpPr>
         <p:spPr>
           <a:xfrm>
-            <a:off x="0" y="0"/>
+            <a:off x="0" y="7620"/>
             <a:ext cx="7315199" cy="4572000"/>
           </a:xfrm>
           <a:prstGeom prst="rect">
@@ -21959,9 +22395,164 @@
         </p:spPr>
         <p:txBody>
           <a:bodyPr wrap="square" anchor="ctr">
-            <a:normAutofit/>
+            <a:normAutofit fontScale="70000" lnSpcReduction="20000"/>
           </a:bodyPr>
           <a:lstStyle/>
+          <a:p>
+            <a:pPr algn="ctr"/>
+            <a:r>
+              <a:rPr lang="en-US" sz="3600" u="sng" dirty="0"/>
+              <a:t>If the 10x Estimates are accurate:</a:t>
+            </a:r>
+            <a:br>
+              <a:rPr lang="en-US" sz="3600" u="sng" dirty="0"/>
+            </a:br>
+            <a:br>
+              <a:rPr lang="en-US" sz="3600" u="sng" dirty="0"/>
+            </a:br>
+            <a:r>
+              <a:rPr lang="en-US" sz="3200" dirty="0"/>
+              <a:t>Ages 0-17  are </a:t>
+            </a:r>
+            <a:r>
+              <a:rPr lang="en-US" sz="3200" u="sng" dirty="0"/>
+              <a:t>2,000 times</a:t>
+            </a:r>
+            <a:r>
+              <a:rPr lang="en-US" sz="3200" dirty="0"/>
+              <a:t> more likely…</a:t>
+            </a:r>
+            <a:br>
+              <a:rPr lang="en-US" sz="3200" dirty="0"/>
+            </a:br>
+            <a:endParaRPr lang="en-US" sz="3200" dirty="0"/>
+          </a:p>
+          <a:p>
+            <a:pPr algn="ctr"/>
+            <a:r>
+              <a:rPr lang="en-US" sz="3200" dirty="0"/>
+              <a:t>   Ages 18-29 are </a:t>
+            </a:r>
+            <a:r>
+              <a:rPr lang="en-US" sz="3200" u="sng" dirty="0"/>
+              <a:t>200 times</a:t>
+            </a:r>
+            <a:r>
+              <a:rPr lang="en-US" sz="3200" dirty="0"/>
+              <a:t> more likely…</a:t>
+            </a:r>
+            <a:br>
+              <a:rPr lang="en-US" sz="3200" dirty="0"/>
+            </a:br>
+            <a:endParaRPr lang="en-US" sz="3200" dirty="0"/>
+          </a:p>
+          <a:p>
+            <a:pPr algn="ctr"/>
+            <a:r>
+              <a:rPr lang="en-US" sz="3200" dirty="0"/>
+              <a:t>  Ages  30-39 are </a:t>
+            </a:r>
+            <a:r>
+              <a:rPr lang="en-US" sz="3200" u="sng" dirty="0"/>
+              <a:t>55 times</a:t>
+            </a:r>
+            <a:r>
+              <a:rPr lang="en-US" sz="3200" dirty="0"/>
+              <a:t> more likely…</a:t>
+            </a:r>
+            <a:br>
+              <a:rPr lang="en-US" sz="3200" dirty="0"/>
+            </a:br>
+            <a:endParaRPr lang="en-US" sz="3200" dirty="0"/>
+          </a:p>
+          <a:p>
+            <a:pPr algn="ctr"/>
+            <a:r>
+              <a:rPr lang="en-US" sz="3200" dirty="0"/>
+              <a:t>    Ages 40-49 are </a:t>
+            </a:r>
+            <a:r>
+              <a:rPr lang="en-US" sz="3200" u="sng" dirty="0"/>
+              <a:t>20 times</a:t>
+            </a:r>
+            <a:r>
+              <a:rPr lang="en-US" sz="3200" dirty="0"/>
+              <a:t> more likely…</a:t>
+            </a:r>
+          </a:p>
+          <a:p>
+            <a:pPr algn="ctr"/>
+            <a:endParaRPr lang="en-US" sz="3600" dirty="0"/>
+          </a:p>
+          <a:p>
+            <a:pPr algn="ctr"/>
+            <a:r>
+              <a:rPr lang="en-US" sz="3200" dirty="0"/>
+              <a:t>    Ages 50-65 are </a:t>
+            </a:r>
+            <a:r>
+              <a:rPr lang="en-US" sz="3200" u="sng" dirty="0"/>
+              <a:t>6.3 times</a:t>
+            </a:r>
+            <a:r>
+              <a:rPr lang="en-US" sz="3200" dirty="0"/>
+              <a:t> more likely…</a:t>
+            </a:r>
+          </a:p>
+          <a:p>
+            <a:pPr algn="ctr"/>
+            <a:br>
+              <a:rPr lang="en-US" sz="1400" dirty="0"/>
+            </a:br>
+            <a:r>
+              <a:rPr lang="en-US" sz="3200" dirty="0">
+                <a:solidFill>
+                  <a:srgbClr val="FF0000"/>
+                </a:solidFill>
+              </a:rPr>
+              <a:t>To die from the </a:t>
+            </a:r>
+            <a:r>
+              <a:rPr lang="en-US" sz="3200" dirty="0">
+                <a:solidFill>
+                  <a:srgbClr val="FFC000"/>
+                </a:solidFill>
+              </a:rPr>
+              <a:t>COVID Vaccine </a:t>
+            </a:r>
+            <a:br>
+              <a:rPr lang="en-US" sz="3200" dirty="0">
+                <a:solidFill>
+                  <a:srgbClr val="FF0000"/>
+                </a:solidFill>
+              </a:rPr>
+            </a:br>
+            <a:r>
+              <a:rPr lang="en-US" sz="3200" dirty="0">
+                <a:solidFill>
+                  <a:srgbClr val="FF0000"/>
+                </a:solidFill>
+              </a:rPr>
+              <a:t>than from </a:t>
+            </a:r>
+            <a:r>
+              <a:rPr lang="en-US" sz="3200" dirty="0">
+                <a:solidFill>
+                  <a:srgbClr val="00B050"/>
+                </a:solidFill>
+              </a:rPr>
+              <a:t>Treated COVID</a:t>
+            </a:r>
+            <a:endParaRPr lang="en-US" sz="3200" dirty="0">
+              <a:solidFill>
+                <a:srgbClr val="FF0000"/>
+              </a:solidFill>
+            </a:endParaRPr>
+          </a:p>
+          <a:p>
+            <a:pPr algn="ctr"/>
+            <a:endParaRPr lang="en-US" sz="2600" dirty="0"/>
+          </a:p>
           <a:p>
             <a:pPr algn="ctr"/>
             <a:r>
@@ -21972,132 +22563,13 @@
               </a:rPr>
               <a:t>*</a:t>
             </a:r>
-            <a:r>
-              <a:rPr lang="en-US" sz="3200" i="1" dirty="0"/>
-              <a:t>Vaccine Notes:</a:t>
-            </a:r>
-          </a:p>
-          <a:p>
-            <a:pPr marL="457200" indent="-457200">
-              <a:buFont typeface="Arial" panose="020B0604020202020204" pitchFamily="34" charset="0"/>
-              <a:buChar char="•"/>
-            </a:pPr>
-            <a:r>
-              <a:rPr lang="en-US" u="sng" dirty="0"/>
-              <a:t>We do not have long-term safety data.</a:t>
-            </a:r>
-            <a:r>
-              <a:rPr lang="en-US" dirty="0"/>
-              <a:t>  None of the COVID vaccines have had 10-15 year standard development and testing cycles. </a:t>
-            </a:r>
-          </a:p>
-          <a:p>
-            <a:pPr marL="457200" indent="-457200">
-              <a:buFont typeface="Arial" panose="020B0604020202020204" pitchFamily="34" charset="0"/>
-              <a:buChar char="•"/>
-            </a:pPr>
-            <a:r>
-              <a:rPr lang="en-US" sz="2000" u="sng" dirty="0"/>
-              <a:t>We only looked at ‘deaths’</a:t>
-            </a:r>
-            <a:r>
-              <a:rPr lang="en-US" sz="2000" dirty="0"/>
-              <a:t> reportedly due to the vaccine. </a:t>
-            </a:r>
-            <a:br>
-              <a:rPr lang="en-US" sz="2000" dirty="0"/>
-            </a:br>
-            <a:r>
-              <a:rPr lang="en-US" sz="2000" dirty="0"/>
-              <a:t>Many other “adverse affects” are severe, and/or permanent</a:t>
-            </a:r>
-          </a:p>
-          <a:p>
-            <a:pPr marL="457200" indent="-457200">
-              <a:buFont typeface="Arial" panose="020B0604020202020204" pitchFamily="34" charset="0"/>
-              <a:buChar char="•"/>
-            </a:pPr>
-            <a:r>
-              <a:rPr lang="en-US" sz="2000" u="sng" dirty="0"/>
-              <a:t>Many Doctors &amp; Scientists have been censored</a:t>
-            </a:r>
-            <a:r>
-              <a:rPr lang="en-US" sz="2000" dirty="0"/>
-              <a:t> heavily for trying to publicize their concerns of the vaccine.</a:t>
-            </a:r>
-          </a:p>
-          <a:p>
-            <a:pPr marL="457200" indent="-457200">
-              <a:buFont typeface="Arial" panose="020B0604020202020204" pitchFamily="34" charset="0"/>
-              <a:buChar char="•"/>
-            </a:pPr>
-            <a:r>
-              <a:rPr lang="en-US" sz="2000" u="sng" dirty="0"/>
-              <a:t>The EU is reporting over 23K deaths</a:t>
-            </a:r>
-            <a:r>
-              <a:rPr lang="en-US" sz="2000" dirty="0"/>
-              <a:t> from the vaccine</a:t>
-            </a:r>
-            <a:br>
-              <a:rPr lang="en-US" sz="2000" dirty="0"/>
-            </a:br>
-            <a:r>
-              <a:rPr lang="en-US" sz="800" dirty="0">
-                <a:hlinkClick r:id="rId2"/>
-              </a:rPr>
-              <a:t>https://healthimpactnews.com/2021/23252-deaths-2189537-injured-following-covid-shots-reported-in-european-unions-database-of-adverse-drug-reactions/</a:t>
-            </a:r>
-            <a:endParaRPr lang="en-US" sz="800" dirty="0"/>
-          </a:p>
-          <a:p>
-            <a:pPr marL="457200" indent="-457200">
-              <a:buFont typeface="Arial" panose="020B0604020202020204" pitchFamily="34" charset="0"/>
-              <a:buChar char="•"/>
-            </a:pPr>
-            <a:r>
-              <a:rPr lang="en-US" sz="2000" u="sng" dirty="0"/>
-              <a:t>The vaccine effectiveness seems to be decreasing</a:t>
-            </a:r>
-            <a:r>
-              <a:rPr lang="en-US" sz="2000" dirty="0"/>
-              <a:t> over time. </a:t>
-            </a:r>
-            <a:br>
-              <a:rPr lang="en-US" sz="2000" dirty="0"/>
-            </a:br>
-            <a:r>
-              <a:rPr lang="en-US" sz="2000" dirty="0"/>
-              <a:t>There is a good probability catching COVID after being vaccinated.  Factoring in Death from COVID after vaccination is too speculative to include here.   </a:t>
-            </a:r>
-          </a:p>
-          <a:p>
-            <a:pPr marL="457200" indent="-457200">
-              <a:buFont typeface="Arial" panose="020B0604020202020204" pitchFamily="34" charset="0"/>
-              <a:buChar char="•"/>
-            </a:pPr>
-            <a:r>
-              <a:rPr lang="en-US" sz="2000" dirty="0"/>
-              <a:t>Again… </a:t>
-            </a:r>
-            <a:r>
-              <a:rPr lang="en-US" sz="2000" u="sng" dirty="0"/>
-              <a:t>The data set we have is very poor</a:t>
-            </a:r>
-          </a:p>
-          <a:p>
-            <a:pPr marL="457200" indent="-457200" algn="ctr">
-              <a:buFont typeface="Arial" panose="020B0604020202020204" pitchFamily="34" charset="0"/>
-              <a:buChar char="•"/>
-            </a:pPr>
-            <a:endParaRPr lang="en-US" sz="2000" dirty="0"/>
           </a:p>
         </p:txBody>
       </p:sp>
     </p:spTree>
     <p:extLst>
       <p:ext uri="{BB962C8B-B14F-4D97-AF65-F5344CB8AC3E}">
-        <p14:creationId xmlns:p14="http://schemas.microsoft.com/office/powerpoint/2010/main" val="2659965800"/>
+        <p14:creationId xmlns:p14="http://schemas.microsoft.com/office/powerpoint/2010/main" val="2124566053"/>
       </p:ext>
     </p:extLst>
   </p:cSld>
@@ -22206,6 +22678,198 @@
           <a:chExt cx="0" cy="0"/>
         </a:xfrm>
       </p:grpSpPr>
+      <p:sp>
+        <p:nvSpPr>
+          <p:cNvPr id="3" name="TextBox 2">
+            <a:extLst>
+              <a:ext uri="{FF2B5EF4-FFF2-40B4-BE49-F238E27FC236}">
+                <a16:creationId xmlns:a16="http://schemas.microsoft.com/office/drawing/2014/main" id="{E9BCD9FD-98E7-4688-AABB-18382A5D765E}"/>
+              </a:ext>
+            </a:extLst>
+          </p:cNvPr>
+          <p:cNvSpPr txBox="1"/>
+          <p:nvPr/>
+        </p:nvSpPr>
+        <p:spPr>
+          <a:xfrm>
+            <a:off x="0" y="0"/>
+            <a:ext cx="7315199" cy="4572000"/>
+          </a:xfrm>
+          <a:prstGeom prst="rect">
+            <a:avLst/>
+          </a:prstGeom>
+          <a:noFill/>
+        </p:spPr>
+        <p:txBody>
+          <a:bodyPr wrap="square" anchor="ctr">
+            <a:normAutofit/>
+          </a:bodyPr>
+          <a:lstStyle/>
+          <a:p>
+            <a:pPr algn="ctr"/>
+            <a:r>
+              <a:rPr lang="en-US" sz="3200" dirty="0">
+                <a:solidFill>
+                  <a:srgbClr val="FF0000"/>
+                </a:solidFill>
+              </a:rPr>
+              <a:t>*</a:t>
+            </a:r>
+            <a:r>
+              <a:rPr lang="en-US" sz="3200" i="1" dirty="0"/>
+              <a:t>Vaccine Notes:</a:t>
+            </a:r>
+          </a:p>
+          <a:p>
+            <a:pPr marL="457200" indent="-457200">
+              <a:buFont typeface="Arial" panose="020B0604020202020204" pitchFamily="34" charset="0"/>
+              <a:buChar char="•"/>
+            </a:pPr>
+            <a:r>
+              <a:rPr lang="en-US" u="sng" dirty="0"/>
+              <a:t>We do not have long-term safety data.</a:t>
+            </a:r>
+            <a:r>
+              <a:rPr lang="en-US" dirty="0"/>
+              <a:t>  None of the COVID vaccines have had 10-15 year standard development and testing cycles. </a:t>
+            </a:r>
+          </a:p>
+          <a:p>
+            <a:pPr marL="457200" indent="-457200">
+              <a:buFont typeface="Arial" panose="020B0604020202020204" pitchFamily="34" charset="0"/>
+              <a:buChar char="•"/>
+            </a:pPr>
+            <a:r>
+              <a:rPr lang="en-US" sz="2000" u="sng" dirty="0"/>
+              <a:t>We only looked at ‘deaths’</a:t>
+            </a:r>
+            <a:r>
+              <a:rPr lang="en-US" sz="2000" dirty="0"/>
+              <a:t> reportedly due to the vaccine. </a:t>
+            </a:r>
+            <a:br>
+              <a:rPr lang="en-US" sz="2000" dirty="0"/>
+            </a:br>
+            <a:r>
+              <a:rPr lang="en-US" sz="2000" dirty="0"/>
+              <a:t>Many other “adverse affects” are severe, and/or permanent</a:t>
+            </a:r>
+          </a:p>
+          <a:p>
+            <a:pPr marL="457200" indent="-457200">
+              <a:buFont typeface="Arial" panose="020B0604020202020204" pitchFamily="34" charset="0"/>
+              <a:buChar char="•"/>
+            </a:pPr>
+            <a:r>
+              <a:rPr lang="en-US" sz="2000" u="sng" dirty="0"/>
+              <a:t>Many Doctors &amp; Scientists have been censored</a:t>
+            </a:r>
+            <a:r>
+              <a:rPr lang="en-US" sz="2000" dirty="0"/>
+              <a:t> heavily for trying to publicize their concerns of the vaccine.</a:t>
+            </a:r>
+          </a:p>
+          <a:p>
+            <a:pPr marL="457200" indent="-457200">
+              <a:buFont typeface="Arial" panose="020B0604020202020204" pitchFamily="34" charset="0"/>
+              <a:buChar char="•"/>
+            </a:pPr>
+            <a:r>
+              <a:rPr lang="en-US" sz="2000" u="sng" dirty="0"/>
+              <a:t>The EU is reporting over 23K deaths</a:t>
+            </a:r>
+            <a:r>
+              <a:rPr lang="en-US" sz="2000" dirty="0"/>
+              <a:t> from the vaccine</a:t>
+            </a:r>
+            <a:br>
+              <a:rPr lang="en-US" sz="2000" dirty="0"/>
+            </a:br>
+            <a:r>
+              <a:rPr lang="en-US" sz="800" dirty="0">
+                <a:hlinkClick r:id="rId2"/>
+              </a:rPr>
+              <a:t>https://healthimpactnews.com/2021/23252-deaths-2189537-injured-following-covid-shots-reported-in-european-unions-database-of-adverse-drug-reactions/</a:t>
+            </a:r>
+            <a:endParaRPr lang="en-US" sz="800" dirty="0"/>
+          </a:p>
+          <a:p>
+            <a:pPr marL="457200" indent="-457200">
+              <a:buFont typeface="Arial" panose="020B0604020202020204" pitchFamily="34" charset="0"/>
+              <a:buChar char="•"/>
+            </a:pPr>
+            <a:r>
+              <a:rPr lang="en-US" sz="2000" u="sng" dirty="0"/>
+              <a:t>The vaccine effectiveness seems to be decreasing</a:t>
+            </a:r>
+            <a:r>
+              <a:rPr lang="en-US" sz="2000" dirty="0"/>
+              <a:t> over time. </a:t>
+            </a:r>
+            <a:br>
+              <a:rPr lang="en-US" sz="2000" dirty="0"/>
+            </a:br>
+            <a:r>
+              <a:rPr lang="en-US" sz="2000" dirty="0"/>
+              <a:t>There is a good probability catching COVID after being vaccinated.  Factoring in Death from COVID after vaccination is too speculative to include here.   </a:t>
+            </a:r>
+          </a:p>
+          <a:p>
+            <a:pPr marL="457200" indent="-457200">
+              <a:buFont typeface="Arial" panose="020B0604020202020204" pitchFamily="34" charset="0"/>
+              <a:buChar char="•"/>
+            </a:pPr>
+            <a:r>
+              <a:rPr lang="en-US" sz="2000" dirty="0"/>
+              <a:t>Again… </a:t>
+            </a:r>
+            <a:r>
+              <a:rPr lang="en-US" sz="2000" u="sng" dirty="0"/>
+              <a:t>The data set we have is very poor</a:t>
+            </a:r>
+          </a:p>
+          <a:p>
+            <a:pPr marL="457200" indent="-457200" algn="ctr">
+              <a:buFont typeface="Arial" panose="020B0604020202020204" pitchFamily="34" charset="0"/>
+              <a:buChar char="•"/>
+            </a:pPr>
+            <a:endParaRPr lang="en-US" sz="2000" dirty="0"/>
+          </a:p>
+        </p:txBody>
+      </p:sp>
+    </p:spTree>
+    <p:extLst>
+      <p:ext uri="{BB962C8B-B14F-4D97-AF65-F5344CB8AC3E}">
+        <p14:creationId xmlns:p14="http://schemas.microsoft.com/office/powerpoint/2010/main" val="2659965800"/>
+      </p:ext>
+    </p:extLst>
+  </p:cSld>
+  <p:clrMapOvr>
+    <a:masterClrMapping/>
+  </p:clrMapOvr>
+  <p:transition spd="slow" advClick="0" advTm="5000">
+    <p:fade thruBlk="1"/>
+  </p:transition>
+</p:sld>
+</file>
+
+<file path=ppt/slides/slide51.xml><?xml version="1.0" encoding="utf-8"?>
+<p:sld xmlns:a="http://schemas.openxmlformats.org/drawingml/2006/main" xmlns:r="http://schemas.openxmlformats.org/officeDocument/2006/relationships" xmlns:p="http://schemas.openxmlformats.org/presentationml/2006/main">
+  <p:cSld>
+    <p:spTree>
+      <p:nvGrpSpPr>
+        <p:cNvPr id="1" name=""/>
+        <p:cNvGrpSpPr/>
+        <p:nvPr/>
+      </p:nvGrpSpPr>
+      <p:grpSpPr>
+        <a:xfrm>
+          <a:off x="0" y="0"/>
+          <a:ext cx="0" cy="0"/>
+          <a:chOff x="0" y="0"/>
+          <a:chExt cx="0" cy="0"/>
+        </a:xfrm>
+      </p:grpSpPr>
       <p:cxnSp>
         <p:nvCxnSpPr>
           <p:cNvPr id="4" name="Straight Connector 3">
@@ -22222,7 +22886,7 @@
         </p:nvCxnSpPr>
         <p:spPr>
           <a:xfrm>
-            <a:off x="491924" y="3248176"/>
+            <a:off x="491924" y="3034040"/>
             <a:ext cx="6678208" cy="0"/>
           </a:xfrm>
           <a:prstGeom prst="line">
@@ -22263,7 +22927,7 @@
         </p:nvCxnSpPr>
         <p:spPr>
           <a:xfrm>
-            <a:off x="501983" y="2631037"/>
+            <a:off x="501983" y="2544220"/>
             <a:ext cx="6610660" cy="0"/>
           </a:xfrm>
           <a:prstGeom prst="line">
@@ -22290,7 +22954,7 @@
       </p:cxnSp>
       <p:graphicFrame>
         <p:nvGraphicFramePr>
-          <p:cNvPr id="5" name="Chart 4">
+          <p:cNvPr id="6" name="Chart 5">
             <a:extLst>
               <a:ext uri="{FF2B5EF4-FFF2-40B4-BE49-F238E27FC236}">
                 <a16:creationId xmlns:a16="http://schemas.microsoft.com/office/drawing/2014/main" id="{22A63F2D-5895-4F6B-A43B-849E8B3092B1}"/>
@@ -22303,14 +22967,14 @@
           <p:nvPr>
             <p:extLst>
               <p:ext uri="{D42A27DB-BD31-4B8C-83A1-F6EECF244321}">
-                <p14:modId xmlns:p14="http://schemas.microsoft.com/office/powerpoint/2010/main" val="4043865578"/>
+                <p14:modId xmlns:p14="http://schemas.microsoft.com/office/powerpoint/2010/main" val="115972629"/>
               </p:ext>
             </p:extLst>
           </p:nvPr>
         </p:nvGraphicFramePr>
         <p:xfrm>
-          <a:off x="0" y="-109958"/>
-          <a:ext cx="7315200" cy="4681958"/>
+          <a:off x="0" y="-1"/>
+          <a:ext cx="7315200" cy="4572001"/>
         </p:xfrm>
         <a:graphic>
           <a:graphicData uri="http://schemas.openxmlformats.org/drawingml/2006/chart">
@@ -22318,170 +22982,51 @@
           </a:graphicData>
         </a:graphic>
       </p:graphicFrame>
+      <p:cxnSp>
+        <p:nvCxnSpPr>
+          <p:cNvPr id="7" name="Straight Connector 6">
+            <a:extLst>
+              <a:ext uri="{FF2B5EF4-FFF2-40B4-BE49-F238E27FC236}">
+                <a16:creationId xmlns:a16="http://schemas.microsoft.com/office/drawing/2014/main" id="{46DC11B2-A190-46FC-A3F4-FCE67AF518C3}"/>
+              </a:ext>
+            </a:extLst>
+          </p:cNvPr>
+          <p:cNvCxnSpPr>
+            <a:cxnSpLocks/>
+          </p:cNvCxnSpPr>
+          <p:nvPr/>
+        </p:nvCxnSpPr>
+        <p:spPr>
+          <a:xfrm>
+            <a:off x="491924" y="1944267"/>
+            <a:ext cx="6610660" cy="0"/>
+          </a:xfrm>
+          <a:prstGeom prst="line">
+            <a:avLst/>
+          </a:prstGeom>
+          <a:ln w="12700">
+            <a:prstDash val="dash"/>
+          </a:ln>
+        </p:spPr>
+        <p:style>
+          <a:lnRef idx="1">
+            <a:schemeClr val="accent4"/>
+          </a:lnRef>
+          <a:fillRef idx="0">
+            <a:schemeClr val="accent4"/>
+          </a:fillRef>
+          <a:effectRef idx="0">
+            <a:schemeClr val="accent4"/>
+          </a:effectRef>
+          <a:fontRef idx="minor">
+            <a:schemeClr val="tx1"/>
+          </a:fontRef>
+        </p:style>
+      </p:cxnSp>
     </p:spTree>
     <p:extLst>
       <p:ext uri="{BB962C8B-B14F-4D97-AF65-F5344CB8AC3E}">
         <p14:creationId xmlns:p14="http://schemas.microsoft.com/office/powerpoint/2010/main" val="1889493451"/>
-      </p:ext>
-    </p:extLst>
-  </p:cSld>
-  <p:clrMapOvr>
-    <a:masterClrMapping/>
-  </p:clrMapOvr>
-  <p:transition spd="slow" advClick="0" advTm="5000">
-    <p:fade thruBlk="1"/>
-  </p:transition>
-</p:sld>
-</file>
-
-<file path=ppt/slides/slide51.xml><?xml version="1.0" encoding="utf-8"?>
-<p:sld xmlns:a="http://schemas.openxmlformats.org/drawingml/2006/main" xmlns:r="http://schemas.openxmlformats.org/officeDocument/2006/relationships" xmlns:p="http://schemas.openxmlformats.org/presentationml/2006/main">
-  <p:cSld>
-    <p:spTree>
-      <p:nvGrpSpPr>
-        <p:cNvPr id="1" name=""/>
-        <p:cNvGrpSpPr/>
-        <p:nvPr/>
-      </p:nvGrpSpPr>
-      <p:grpSpPr>
-        <a:xfrm>
-          <a:off x="0" y="0"/>
-          <a:ext cx="0" cy="0"/>
-          <a:chOff x="0" y="0"/>
-          <a:chExt cx="0" cy="0"/>
-        </a:xfrm>
-      </p:grpSpPr>
-      <p:sp>
-        <p:nvSpPr>
-          <p:cNvPr id="3" name="TextBox 2">
-            <a:extLst>
-              <a:ext uri="{FF2B5EF4-FFF2-40B4-BE49-F238E27FC236}">
-                <a16:creationId xmlns:a16="http://schemas.microsoft.com/office/drawing/2014/main" id="{E9BCD9FD-98E7-4688-AABB-18382A5D765E}"/>
-              </a:ext>
-            </a:extLst>
-          </p:cNvPr>
-          <p:cNvSpPr txBox="1"/>
-          <p:nvPr/>
-        </p:nvSpPr>
-        <p:spPr>
-          <a:xfrm>
-            <a:off x="0" y="0"/>
-            <a:ext cx="7315199" cy="4572000"/>
-          </a:xfrm>
-          <a:prstGeom prst="rect">
-            <a:avLst/>
-          </a:prstGeom>
-          <a:noFill/>
-        </p:spPr>
-        <p:txBody>
-          <a:bodyPr wrap="square" anchor="ctr">
-            <a:normAutofit/>
-          </a:bodyPr>
-          <a:lstStyle/>
-          <a:p>
-            <a:pPr algn="ctr"/>
-            <a:endParaRPr lang="en-US" sz="2400" dirty="0"/>
-          </a:p>
-        </p:txBody>
-      </p:sp>
-      <p:sp>
-        <p:nvSpPr>
-          <p:cNvPr id="2" name="TextBox 1">
-            <a:extLst>
-              <a:ext uri="{FF2B5EF4-FFF2-40B4-BE49-F238E27FC236}">
-                <a16:creationId xmlns:a16="http://schemas.microsoft.com/office/drawing/2014/main" id="{251237F5-C95A-43F2-A32E-E66EF2934244}"/>
-              </a:ext>
-            </a:extLst>
-          </p:cNvPr>
-          <p:cNvSpPr txBox="1"/>
-          <p:nvPr/>
-        </p:nvSpPr>
-        <p:spPr>
-          <a:xfrm>
-            <a:off x="0" y="0"/>
-            <a:ext cx="7315200" cy="3970318"/>
-          </a:xfrm>
-          <a:prstGeom prst="rect">
-            <a:avLst/>
-          </a:prstGeom>
-          <a:noFill/>
-        </p:spPr>
-        <p:txBody>
-          <a:bodyPr wrap="square" rtlCol="0">
-            <a:spAutoFit/>
-          </a:bodyPr>
-          <a:lstStyle/>
-          <a:p>
-            <a:pPr algn="ctr"/>
-            <a:br>
-              <a:rPr lang="en-US" sz="2800" dirty="0"/>
-            </a:br>
-            <a:r>
-              <a:rPr lang="en-US" sz="2800" dirty="0"/>
-              <a:t> Rational Data ------&gt; Rational Decisions</a:t>
-            </a:r>
-          </a:p>
-          <a:p>
-            <a:pPr algn="ctr"/>
-            <a:r>
-              <a:rPr lang="en-US" sz="2800" dirty="0"/>
-              <a:t> Poor Data ------&gt; Poor Decisions</a:t>
-            </a:r>
-          </a:p>
-          <a:p>
-            <a:pPr algn="ctr"/>
-            <a:r>
-              <a:rPr lang="en-US" sz="2800" dirty="0">
-                <a:sym typeface="Wingdings" panose="05000000000000000000" pitchFamily="2" charset="2"/>
-              </a:rPr>
-              <a:t>Deceptive Data ------&gt; Justifies Destruction</a:t>
-            </a:r>
-          </a:p>
-          <a:p>
-            <a:pPr algn="ctr"/>
-            <a:endParaRPr lang="en-US" sz="2800" dirty="0">
-              <a:sym typeface="Wingdings" panose="05000000000000000000" pitchFamily="2" charset="2"/>
-            </a:endParaRPr>
-          </a:p>
-          <a:p>
-            <a:pPr algn="ctr"/>
-            <a:r>
-              <a:rPr lang="en-US" sz="2800" dirty="0">
-                <a:sym typeface="Wingdings" panose="05000000000000000000" pitchFamily="2" charset="2"/>
-              </a:rPr>
-              <a:t>Irrational, Poor, or Deceptive “COVID Data”</a:t>
-            </a:r>
-          </a:p>
-          <a:p>
-            <a:pPr algn="ctr"/>
-            <a:r>
-              <a:rPr lang="en-US" sz="2800" dirty="0">
-                <a:sym typeface="Wingdings" panose="05000000000000000000" pitchFamily="2" charset="2"/>
-              </a:rPr>
-              <a:t>Has, Is, and Will continue DESTROY life.</a:t>
-            </a:r>
-          </a:p>
-          <a:p>
-            <a:pPr algn="ctr"/>
-            <a:endParaRPr lang="en-US" sz="2800" dirty="0">
-              <a:sym typeface="Wingdings" panose="05000000000000000000" pitchFamily="2" charset="2"/>
-            </a:endParaRPr>
-          </a:p>
-          <a:p>
-            <a:pPr algn="ctr"/>
-            <a:r>
-              <a:rPr lang="en-US" sz="2800" dirty="0">
-                <a:sym typeface="Wingdings" panose="05000000000000000000" pitchFamily="2" charset="2"/>
-              </a:rPr>
-              <a:t>Get the Data! Check the Data! Make your Choice!</a:t>
-            </a:r>
-          </a:p>
-        </p:txBody>
-      </p:sp>
-    </p:spTree>
-    <p:extLst>
-      <p:ext uri="{BB962C8B-B14F-4D97-AF65-F5344CB8AC3E}">
-        <p14:creationId xmlns:p14="http://schemas.microsoft.com/office/powerpoint/2010/main" val="1524123263"/>
       </p:ext>
     </p:extLst>
   </p:cSld>
@@ -22535,13 +23080,173 @@
         </p:spPr>
         <p:txBody>
           <a:bodyPr wrap="square" anchor="ctr">
+            <a:normAutofit/>
+          </a:bodyPr>
+          <a:lstStyle/>
+          <a:p>
+            <a:pPr algn="ctr"/>
+            <a:endParaRPr lang="en-US" sz="2400" dirty="0"/>
+          </a:p>
+        </p:txBody>
+      </p:sp>
+      <p:sp>
+        <p:nvSpPr>
+          <p:cNvPr id="2" name="TextBox 1">
+            <a:extLst>
+              <a:ext uri="{FF2B5EF4-FFF2-40B4-BE49-F238E27FC236}">
+                <a16:creationId xmlns:a16="http://schemas.microsoft.com/office/drawing/2014/main" id="{251237F5-C95A-43F2-A32E-E66EF2934244}"/>
+              </a:ext>
+            </a:extLst>
+          </p:cNvPr>
+          <p:cNvSpPr txBox="1"/>
+          <p:nvPr/>
+        </p:nvSpPr>
+        <p:spPr>
+          <a:xfrm>
+            <a:off x="0" y="0"/>
+            <a:ext cx="7315200" cy="3970318"/>
+          </a:xfrm>
+          <a:prstGeom prst="rect">
+            <a:avLst/>
+          </a:prstGeom>
+          <a:noFill/>
+        </p:spPr>
+        <p:txBody>
+          <a:bodyPr wrap="square" rtlCol="0">
+            <a:spAutoFit/>
+          </a:bodyPr>
+          <a:lstStyle/>
+          <a:p>
+            <a:pPr algn="ctr"/>
+            <a:br>
+              <a:rPr lang="en-US" sz="2800" dirty="0"/>
+            </a:br>
+            <a:r>
+              <a:rPr lang="en-US" sz="2800" dirty="0"/>
+              <a:t> Rational Data ------&gt; Rational Decisions</a:t>
+            </a:r>
+          </a:p>
+          <a:p>
+            <a:pPr algn="ctr"/>
+            <a:r>
+              <a:rPr lang="en-US" sz="2800" dirty="0"/>
+              <a:t> Poor Data ------&gt; Poor Decisions</a:t>
+            </a:r>
+          </a:p>
+          <a:p>
+            <a:pPr algn="ctr"/>
+            <a:r>
+              <a:rPr lang="en-US" sz="2800" dirty="0">
+                <a:sym typeface="Wingdings" panose="05000000000000000000" pitchFamily="2" charset="2"/>
+              </a:rPr>
+              <a:t>Deceptive Data ------&gt; Justifies Destruction</a:t>
+            </a:r>
+          </a:p>
+          <a:p>
+            <a:pPr algn="ctr"/>
+            <a:endParaRPr lang="en-US" sz="2800" dirty="0">
+              <a:sym typeface="Wingdings" panose="05000000000000000000" pitchFamily="2" charset="2"/>
+            </a:endParaRPr>
+          </a:p>
+          <a:p>
+            <a:pPr algn="ctr"/>
+            <a:r>
+              <a:rPr lang="en-US" sz="2800" dirty="0">
+                <a:sym typeface="Wingdings" panose="05000000000000000000" pitchFamily="2" charset="2"/>
+              </a:rPr>
+              <a:t>Irrational, Poor, or Deceptive “COVID Data”</a:t>
+            </a:r>
+          </a:p>
+          <a:p>
+            <a:pPr algn="ctr"/>
+            <a:r>
+              <a:rPr lang="en-US" sz="2800" dirty="0">
+                <a:sym typeface="Wingdings" panose="05000000000000000000" pitchFamily="2" charset="2"/>
+              </a:rPr>
+              <a:t>Has, Is, and Will continue DESTROY life.</a:t>
+            </a:r>
+          </a:p>
+          <a:p>
+            <a:pPr algn="ctr"/>
+            <a:endParaRPr lang="en-US" sz="2800" dirty="0">
+              <a:sym typeface="Wingdings" panose="05000000000000000000" pitchFamily="2" charset="2"/>
+            </a:endParaRPr>
+          </a:p>
+          <a:p>
+            <a:pPr algn="ctr"/>
+            <a:r>
+              <a:rPr lang="en-US" sz="2800" dirty="0">
+                <a:sym typeface="Wingdings" panose="05000000000000000000" pitchFamily="2" charset="2"/>
+              </a:rPr>
+              <a:t>Get the Data! Check the Data! Make your Choice!</a:t>
+            </a:r>
+          </a:p>
+        </p:txBody>
+      </p:sp>
+    </p:spTree>
+    <p:extLst>
+      <p:ext uri="{BB962C8B-B14F-4D97-AF65-F5344CB8AC3E}">
+        <p14:creationId xmlns:p14="http://schemas.microsoft.com/office/powerpoint/2010/main" val="1524123263"/>
+      </p:ext>
+    </p:extLst>
+  </p:cSld>
+  <p:clrMapOvr>
+    <a:masterClrMapping/>
+  </p:clrMapOvr>
+  <p:transition spd="slow" advClick="0" advTm="5000">
+    <p:fade thruBlk="1"/>
+  </p:transition>
+</p:sld>
+</file>
+
+<file path=ppt/slides/slide53.xml><?xml version="1.0" encoding="utf-8"?>
+<p:sld xmlns:a="http://schemas.openxmlformats.org/drawingml/2006/main" xmlns:r="http://schemas.openxmlformats.org/officeDocument/2006/relationships" xmlns:p="http://schemas.openxmlformats.org/presentationml/2006/main">
+  <p:cSld>
+    <p:spTree>
+      <p:nvGrpSpPr>
+        <p:cNvPr id="1" name=""/>
+        <p:cNvGrpSpPr/>
+        <p:nvPr/>
+      </p:nvGrpSpPr>
+      <p:grpSpPr>
+        <a:xfrm>
+          <a:off x="0" y="0"/>
+          <a:ext cx="0" cy="0"/>
+          <a:chOff x="0" y="0"/>
+          <a:chExt cx="0" cy="0"/>
+        </a:xfrm>
+      </p:grpSpPr>
+      <p:sp>
+        <p:nvSpPr>
+          <p:cNvPr id="3" name="TextBox 2">
+            <a:extLst>
+              <a:ext uri="{FF2B5EF4-FFF2-40B4-BE49-F238E27FC236}">
+                <a16:creationId xmlns:a16="http://schemas.microsoft.com/office/drawing/2014/main" id="{E9BCD9FD-98E7-4688-AABB-18382A5D765E}"/>
+              </a:ext>
+            </a:extLst>
+          </p:cNvPr>
+          <p:cNvSpPr txBox="1"/>
+          <p:nvPr/>
+        </p:nvSpPr>
+        <p:spPr>
+          <a:xfrm>
+            <a:off x="0" y="0"/>
+            <a:ext cx="7315199" cy="4572000"/>
+          </a:xfrm>
+          <a:prstGeom prst="rect">
+            <a:avLst/>
+          </a:prstGeom>
+          <a:noFill/>
+        </p:spPr>
+        <p:txBody>
+          <a:bodyPr wrap="square" anchor="ctr">
             <a:normAutofit fontScale="92500" lnSpcReduction="20000"/>
           </a:bodyPr>
           <a:lstStyle/>
           <a:p>
             <a:pPr algn="ctr"/>
             <a:r>
-              <a:rPr lang="en-US" sz="3200" u="sng" dirty="0">
+              <a:rPr lang="en-US" sz="3200" dirty="0">
                 <a:solidFill>
                   <a:srgbClr val="FF0000"/>
                 </a:solidFill>
@@ -22677,7 +23382,7 @@
 </p:sld>
 </file>
 
-<file path=ppt/slides/slide53.xml><?xml version="1.0" encoding="utf-8"?>
+<file path=ppt/slides/slide54.xml><?xml version="1.0" encoding="utf-8"?>
 <p:sld xmlns:a="http://schemas.openxmlformats.org/drawingml/2006/main" xmlns:r="http://schemas.openxmlformats.org/officeDocument/2006/relationships" xmlns:p="http://schemas.openxmlformats.org/presentationml/2006/main">
   <p:cSld>
     <p:spTree>

</xml_diff>